<commit_message>
Add chart for throughput
</commit_message>
<xml_diff>
--- a/docs/measurements.pptx
+++ b/docs/measurements.pptx
@@ -115,6 +115,871 @@
     </p:ext>
   </p:extLst>
 </p:presentation>
+</file>
+
+<file path=ppt/charts/chart1.xml><?xml version="1.0" encoding="utf-8"?>
+<c:chartSpace xmlns:c="http://schemas.openxmlformats.org/drawingml/2006/chart" xmlns:a="http://schemas.openxmlformats.org/drawingml/2006/main" xmlns:r="http://schemas.openxmlformats.org/officeDocument/2006/relationships" xmlns:c16r2="http://schemas.microsoft.com/office/drawing/2015/06/chart">
+  <c:date1904 val="0"/>
+  <c:lang val="en-GB"/>
+  <c:roundedCorners val="0"/>
+  <mc:AlternateContent xmlns:mc="http://schemas.openxmlformats.org/markup-compatibility/2006">
+    <mc:Choice xmlns:c14="http://schemas.microsoft.com/office/drawing/2007/8/2/chart" Requires="c14">
+      <c14:style val="102"/>
+    </mc:Choice>
+    <mc:Fallback>
+      <c:style val="2"/>
+    </mc:Fallback>
+  </mc:AlternateContent>
+  <c:chart>
+    <c:title>
+      <c:overlay val="0"/>
+      <c:spPr>
+        <a:noFill/>
+        <a:ln>
+          <a:noFill/>
+        </a:ln>
+        <a:effectLst/>
+      </c:spPr>
+      <c:txPr>
+        <a:bodyPr rot="0" spcFirstLastPara="1" vertOverflow="ellipsis" vert="horz" wrap="square" anchor="ctr" anchorCtr="1"/>
+        <a:lstStyle/>
+        <a:p>
+          <a:pPr>
+            <a:defRPr sz="1862" b="0" i="0" u="none" strike="noStrike" kern="1200" spc="0" baseline="0">
+              <a:solidFill>
+                <a:schemeClr val="tx1">
+                  <a:lumMod val="65000"/>
+                  <a:lumOff val="35000"/>
+                </a:schemeClr>
+              </a:solidFill>
+              <a:latin typeface="+mn-lt"/>
+              <a:ea typeface="+mn-ea"/>
+              <a:cs typeface="+mn-cs"/>
+            </a:defRPr>
+          </a:pPr>
+          <a:endParaRPr lang="en-US"/>
+        </a:p>
+      </c:txPr>
+    </c:title>
+    <c:autoTitleDeleted val="0"/>
+    <c:plotArea>
+      <c:layout/>
+      <c:barChart>
+        <c:barDir val="bar"/>
+        <c:grouping val="clustered"/>
+        <c:varyColors val="0"/>
+        <c:ser>
+          <c:idx val="0"/>
+          <c:order val="0"/>
+          <c:tx>
+            <c:strRef>
+              <c:f>Sheet1!$B$1</c:f>
+              <c:strCache>
+                <c:ptCount val="1"/>
+                <c:pt idx="0">
+                  <c:v>Throughput (Mpps)</c:v>
+                </c:pt>
+              </c:strCache>
+            </c:strRef>
+          </c:tx>
+          <c:spPr>
+            <a:solidFill>
+              <a:schemeClr val="accent1"/>
+            </a:solidFill>
+            <a:ln>
+              <a:noFill/>
+            </a:ln>
+            <a:effectLst/>
+          </c:spPr>
+          <c:invertIfNegative val="0"/>
+          <c:cat>
+            <c:strRef>
+              <c:f>Sheet1!$A$2:$A$6</c:f>
+              <c:strCache>
+                <c:ptCount val="5"/>
+                <c:pt idx="0">
+                  <c:v>pmacct</c:v>
+                </c:pt>
+                <c:pt idx="1">
+                  <c:v>tcpdump</c:v>
+                </c:pt>
+                <c:pt idx="2">
+                  <c:v>netobserv-ebpf-agent_v1</c:v>
+                </c:pt>
+                <c:pt idx="3">
+                  <c:v>netobserv-ebpf-agent_v2</c:v>
+                </c:pt>
+                <c:pt idx="4">
+                  <c:v>None</c:v>
+                </c:pt>
+              </c:strCache>
+            </c:strRef>
+          </c:cat>
+          <c:val>
+            <c:numRef>
+              <c:f>Sheet1!$B$2:$B$6</c:f>
+              <c:numCache>
+                <c:formatCode>General</c:formatCode>
+                <c:ptCount val="5"/>
+                <c:pt idx="0">
+                  <c:v>2.3199999999999998</c:v>
+                </c:pt>
+                <c:pt idx="1">
+                  <c:v>1.65</c:v>
+                </c:pt>
+                <c:pt idx="2">
+                  <c:v>2.6</c:v>
+                </c:pt>
+                <c:pt idx="3">
+                  <c:v>4.45</c:v>
+                </c:pt>
+                <c:pt idx="4">
+                  <c:v>4.7</c:v>
+                </c:pt>
+              </c:numCache>
+            </c:numRef>
+          </c:val>
+          <c:extLst>
+            <c:ext xmlns:c16="http://schemas.microsoft.com/office/drawing/2014/chart" uri="{C3380CC4-5D6E-409C-BE32-E72D297353CC}">
+              <c16:uniqueId val="{00000000-EFBD-5B44-A8B1-FB73D2CC3D84}"/>
+            </c:ext>
+          </c:extLst>
+        </c:ser>
+        <c:dLbls>
+          <c:showLegendKey val="0"/>
+          <c:showVal val="0"/>
+          <c:showCatName val="0"/>
+          <c:showSerName val="0"/>
+          <c:showPercent val="0"/>
+          <c:showBubbleSize val="0"/>
+        </c:dLbls>
+        <c:gapWidth val="182"/>
+        <c:axId val="1851669215"/>
+        <c:axId val="1851522399"/>
+      </c:barChart>
+      <c:catAx>
+        <c:axId val="1851669215"/>
+        <c:scaling>
+          <c:orientation val="minMax"/>
+        </c:scaling>
+        <c:delete val="0"/>
+        <c:axPos val="l"/>
+        <c:numFmt formatCode="General" sourceLinked="1"/>
+        <c:majorTickMark val="none"/>
+        <c:minorTickMark val="none"/>
+        <c:tickLblPos val="nextTo"/>
+        <c:spPr>
+          <a:noFill/>
+          <a:ln w="9525" cap="flat" cmpd="sng" algn="ctr">
+            <a:solidFill>
+              <a:schemeClr val="tx1">
+                <a:lumMod val="15000"/>
+                <a:lumOff val="85000"/>
+              </a:schemeClr>
+            </a:solidFill>
+            <a:round/>
+          </a:ln>
+          <a:effectLst/>
+        </c:spPr>
+        <c:txPr>
+          <a:bodyPr rot="-60000000" spcFirstLastPara="1" vertOverflow="ellipsis" vert="horz" wrap="square" anchor="ctr" anchorCtr="1"/>
+          <a:lstStyle/>
+          <a:p>
+            <a:pPr>
+              <a:defRPr sz="1197" b="0" i="0" u="none" strike="noStrike" kern="1200" baseline="0">
+                <a:solidFill>
+                  <a:schemeClr val="tx1">
+                    <a:lumMod val="65000"/>
+                    <a:lumOff val="35000"/>
+                  </a:schemeClr>
+                </a:solidFill>
+                <a:latin typeface="+mn-lt"/>
+                <a:ea typeface="+mn-ea"/>
+                <a:cs typeface="+mn-cs"/>
+              </a:defRPr>
+            </a:pPr>
+            <a:endParaRPr lang="en-US"/>
+          </a:p>
+        </c:txPr>
+        <c:crossAx val="1851522399"/>
+        <c:crosses val="autoZero"/>
+        <c:auto val="1"/>
+        <c:lblAlgn val="ctr"/>
+        <c:lblOffset val="100"/>
+        <c:noMultiLvlLbl val="0"/>
+      </c:catAx>
+      <c:valAx>
+        <c:axId val="1851522399"/>
+        <c:scaling>
+          <c:orientation val="minMax"/>
+        </c:scaling>
+        <c:delete val="0"/>
+        <c:axPos val="b"/>
+        <c:majorGridlines>
+          <c:spPr>
+            <a:ln w="9525" cap="flat" cmpd="sng" algn="ctr">
+              <a:solidFill>
+                <a:schemeClr val="tx1">
+                  <a:lumMod val="15000"/>
+                  <a:lumOff val="85000"/>
+                </a:schemeClr>
+              </a:solidFill>
+              <a:round/>
+            </a:ln>
+            <a:effectLst/>
+          </c:spPr>
+        </c:majorGridlines>
+        <c:numFmt formatCode="General" sourceLinked="1"/>
+        <c:majorTickMark val="none"/>
+        <c:minorTickMark val="none"/>
+        <c:tickLblPos val="nextTo"/>
+        <c:spPr>
+          <a:noFill/>
+          <a:ln>
+            <a:noFill/>
+          </a:ln>
+          <a:effectLst/>
+        </c:spPr>
+        <c:txPr>
+          <a:bodyPr rot="-60000000" spcFirstLastPara="1" vertOverflow="ellipsis" vert="horz" wrap="square" anchor="ctr" anchorCtr="1"/>
+          <a:lstStyle/>
+          <a:p>
+            <a:pPr>
+              <a:defRPr sz="1197" b="0" i="0" u="none" strike="noStrike" kern="1200" baseline="0">
+                <a:solidFill>
+                  <a:schemeClr val="tx1">
+                    <a:lumMod val="65000"/>
+                    <a:lumOff val="35000"/>
+                  </a:schemeClr>
+                </a:solidFill>
+                <a:latin typeface="+mn-lt"/>
+                <a:ea typeface="+mn-ea"/>
+                <a:cs typeface="+mn-cs"/>
+              </a:defRPr>
+            </a:pPr>
+            <a:endParaRPr lang="en-US"/>
+          </a:p>
+        </c:txPr>
+        <c:crossAx val="1851669215"/>
+        <c:crosses val="autoZero"/>
+        <c:crossBetween val="between"/>
+      </c:valAx>
+      <c:spPr>
+        <a:noFill/>
+        <a:ln>
+          <a:noFill/>
+        </a:ln>
+        <a:effectLst/>
+      </c:spPr>
+    </c:plotArea>
+    <c:legend>
+      <c:legendPos val="b"/>
+      <c:overlay val="0"/>
+      <c:spPr>
+        <a:noFill/>
+        <a:ln>
+          <a:noFill/>
+        </a:ln>
+        <a:effectLst/>
+      </c:spPr>
+      <c:txPr>
+        <a:bodyPr rot="0" spcFirstLastPara="1" vertOverflow="ellipsis" vert="horz" wrap="square" anchor="ctr" anchorCtr="1"/>
+        <a:lstStyle/>
+        <a:p>
+          <a:pPr>
+            <a:defRPr sz="1197" b="0" i="0" u="none" strike="noStrike" kern="1200" baseline="0">
+              <a:solidFill>
+                <a:schemeClr val="tx1">
+                  <a:lumMod val="65000"/>
+                  <a:lumOff val="35000"/>
+                </a:schemeClr>
+              </a:solidFill>
+              <a:latin typeface="+mn-lt"/>
+              <a:ea typeface="+mn-ea"/>
+              <a:cs typeface="+mn-cs"/>
+            </a:defRPr>
+          </a:pPr>
+          <a:endParaRPr lang="en-US"/>
+        </a:p>
+      </c:txPr>
+    </c:legend>
+    <c:plotVisOnly val="1"/>
+    <c:dispBlanksAs val="gap"/>
+    <c:extLst>
+      <c:ext xmlns:c16r3="http://schemas.microsoft.com/office/drawing/2017/03/chart" uri="{56B9EC1D-385E-4148-901F-78D8002777C0}">
+        <c16r3:dataDisplayOptions16>
+          <c16r3:dispNaAsBlank val="1"/>
+        </c16r3:dataDisplayOptions16>
+      </c:ext>
+    </c:extLst>
+    <c:showDLblsOverMax val="0"/>
+  </c:chart>
+  <c:spPr>
+    <a:noFill/>
+    <a:ln>
+      <a:noFill/>
+    </a:ln>
+    <a:effectLst/>
+  </c:spPr>
+  <c:txPr>
+    <a:bodyPr/>
+    <a:lstStyle/>
+    <a:p>
+      <a:pPr>
+        <a:defRPr/>
+      </a:pPr>
+      <a:endParaRPr lang="en-US"/>
+    </a:p>
+  </c:txPr>
+  <c:externalData r:id="rId3">
+    <c:autoUpdate val="0"/>
+  </c:externalData>
+</c:chartSpace>
+</file>
+
+<file path=ppt/charts/colors1.xml><?xml version="1.0" encoding="utf-8"?>
+<cs:colorStyle xmlns:cs="http://schemas.microsoft.com/office/drawing/2012/chartStyle" xmlns:a="http://schemas.openxmlformats.org/drawingml/2006/main" meth="cycle" id="10">
+  <a:schemeClr val="accent1"/>
+  <a:schemeClr val="accent2"/>
+  <a:schemeClr val="accent3"/>
+  <a:schemeClr val="accent4"/>
+  <a:schemeClr val="accent5"/>
+  <a:schemeClr val="accent6"/>
+  <cs:variation/>
+  <cs:variation>
+    <a:lumMod val="60000"/>
+  </cs:variation>
+  <cs:variation>
+    <a:lumMod val="80000"/>
+    <a:lumOff val="20000"/>
+  </cs:variation>
+  <cs:variation>
+    <a:lumMod val="80000"/>
+  </cs:variation>
+  <cs:variation>
+    <a:lumMod val="60000"/>
+    <a:lumOff val="40000"/>
+  </cs:variation>
+  <cs:variation>
+    <a:lumMod val="50000"/>
+  </cs:variation>
+  <cs:variation>
+    <a:lumMod val="70000"/>
+    <a:lumOff val="30000"/>
+  </cs:variation>
+  <cs:variation>
+    <a:lumMod val="70000"/>
+  </cs:variation>
+  <cs:variation>
+    <a:lumMod val="50000"/>
+    <a:lumOff val="50000"/>
+  </cs:variation>
+</cs:colorStyle>
+</file>
+
+<file path=ppt/charts/style1.xml><?xml version="1.0" encoding="utf-8"?>
+<cs:chartStyle xmlns:cs="http://schemas.microsoft.com/office/drawing/2012/chartStyle" xmlns:a="http://schemas.openxmlformats.org/drawingml/2006/main" id="216">
+  <cs:axisTitle>
+    <cs:lnRef idx="0"/>
+    <cs:fillRef idx="0"/>
+    <cs:effectRef idx="0"/>
+    <cs:fontRef idx="minor">
+      <a:schemeClr val="tx1">
+        <a:lumMod val="65000"/>
+        <a:lumOff val="35000"/>
+      </a:schemeClr>
+    </cs:fontRef>
+    <cs:defRPr sz="1330" kern="1200"/>
+  </cs:axisTitle>
+  <cs:categoryAxis>
+    <cs:lnRef idx="0"/>
+    <cs:fillRef idx="0"/>
+    <cs:effectRef idx="0"/>
+    <cs:fontRef idx="minor">
+      <a:schemeClr val="tx1">
+        <a:lumMod val="65000"/>
+        <a:lumOff val="35000"/>
+      </a:schemeClr>
+    </cs:fontRef>
+    <cs:spPr>
+      <a:ln w="9525" cap="flat" cmpd="sng" algn="ctr">
+        <a:solidFill>
+          <a:schemeClr val="tx1">
+            <a:lumMod val="15000"/>
+            <a:lumOff val="85000"/>
+          </a:schemeClr>
+        </a:solidFill>
+        <a:round/>
+      </a:ln>
+    </cs:spPr>
+    <cs:defRPr sz="1197" kern="1200"/>
+  </cs:categoryAxis>
+  <cs:chartArea mods="allowNoFillOverride allowNoLineOverride">
+    <cs:lnRef idx="0"/>
+    <cs:fillRef idx="0"/>
+    <cs:effectRef idx="0"/>
+    <cs:fontRef idx="minor">
+      <a:schemeClr val="tx1"/>
+    </cs:fontRef>
+    <cs:spPr>
+      <a:solidFill>
+        <a:schemeClr val="bg1"/>
+      </a:solidFill>
+      <a:ln w="9525" cap="flat" cmpd="sng" algn="ctr">
+        <a:solidFill>
+          <a:schemeClr val="tx1">
+            <a:lumMod val="15000"/>
+            <a:lumOff val="85000"/>
+          </a:schemeClr>
+        </a:solidFill>
+        <a:round/>
+      </a:ln>
+    </cs:spPr>
+    <cs:defRPr sz="1330" kern="1200"/>
+  </cs:chartArea>
+  <cs:dataLabel>
+    <cs:lnRef idx="0"/>
+    <cs:fillRef idx="0"/>
+    <cs:effectRef idx="0"/>
+    <cs:fontRef idx="minor">
+      <a:schemeClr val="tx1">
+        <a:lumMod val="75000"/>
+        <a:lumOff val="25000"/>
+      </a:schemeClr>
+    </cs:fontRef>
+    <cs:defRPr sz="1197" kern="1200"/>
+  </cs:dataLabel>
+  <cs:dataLabelCallout>
+    <cs:lnRef idx="0"/>
+    <cs:fillRef idx="0"/>
+    <cs:effectRef idx="0"/>
+    <cs:fontRef idx="minor">
+      <a:schemeClr val="dk1">
+        <a:lumMod val="65000"/>
+        <a:lumOff val="35000"/>
+      </a:schemeClr>
+    </cs:fontRef>
+    <cs:spPr>
+      <a:solidFill>
+        <a:schemeClr val="lt1"/>
+      </a:solidFill>
+      <a:ln>
+        <a:solidFill>
+          <a:schemeClr val="dk1">
+            <a:lumMod val="25000"/>
+            <a:lumOff val="75000"/>
+          </a:schemeClr>
+        </a:solidFill>
+      </a:ln>
+    </cs:spPr>
+    <cs:defRPr sz="1197" kern="1200"/>
+    <cs:bodyPr rot="0" spcFirstLastPara="1" vertOverflow="clip" horzOverflow="clip" vert="horz" wrap="square" lIns="36576" tIns="18288" rIns="36576" bIns="18288" anchor="ctr" anchorCtr="1">
+      <a:spAutoFit/>
+    </cs:bodyPr>
+  </cs:dataLabelCallout>
+  <cs:dataPoint>
+    <cs:lnRef idx="0"/>
+    <cs:fillRef idx="1">
+      <cs:styleClr val="auto"/>
+    </cs:fillRef>
+    <cs:effectRef idx="0"/>
+    <cs:fontRef idx="minor">
+      <a:schemeClr val="tx1"/>
+    </cs:fontRef>
+  </cs:dataPoint>
+  <cs:dataPoint3D>
+    <cs:lnRef idx="0"/>
+    <cs:fillRef idx="1">
+      <cs:styleClr val="auto"/>
+    </cs:fillRef>
+    <cs:effectRef idx="0"/>
+    <cs:fontRef idx="minor">
+      <a:schemeClr val="tx1"/>
+    </cs:fontRef>
+  </cs:dataPoint3D>
+  <cs:dataPointLine>
+    <cs:lnRef idx="0">
+      <cs:styleClr val="auto"/>
+    </cs:lnRef>
+    <cs:fillRef idx="1"/>
+    <cs:effectRef idx="0"/>
+    <cs:fontRef idx="minor">
+      <a:schemeClr val="tx1"/>
+    </cs:fontRef>
+    <cs:spPr>
+      <a:ln w="28575" cap="rnd">
+        <a:solidFill>
+          <a:schemeClr val="phClr"/>
+        </a:solidFill>
+        <a:round/>
+      </a:ln>
+    </cs:spPr>
+  </cs:dataPointLine>
+  <cs:dataPointMarker>
+    <cs:lnRef idx="0">
+      <cs:styleClr val="auto"/>
+    </cs:lnRef>
+    <cs:fillRef idx="1">
+      <cs:styleClr val="auto"/>
+    </cs:fillRef>
+    <cs:effectRef idx="0"/>
+    <cs:fontRef idx="minor">
+      <a:schemeClr val="tx1"/>
+    </cs:fontRef>
+    <cs:spPr>
+      <a:ln w="9525">
+        <a:solidFill>
+          <a:schemeClr val="phClr"/>
+        </a:solidFill>
+      </a:ln>
+    </cs:spPr>
+  </cs:dataPointMarker>
+  <cs:dataPointMarkerLayout symbol="circle" size="5"/>
+  <cs:dataPointWireframe>
+    <cs:lnRef idx="0">
+      <cs:styleClr val="auto"/>
+    </cs:lnRef>
+    <cs:fillRef idx="1"/>
+    <cs:effectRef idx="0"/>
+    <cs:fontRef idx="minor">
+      <a:schemeClr val="tx1"/>
+    </cs:fontRef>
+    <cs:spPr>
+      <a:ln w="9525" cap="rnd">
+        <a:solidFill>
+          <a:schemeClr val="phClr"/>
+        </a:solidFill>
+        <a:round/>
+      </a:ln>
+    </cs:spPr>
+  </cs:dataPointWireframe>
+  <cs:dataTable>
+    <cs:lnRef idx="0"/>
+    <cs:fillRef idx="0"/>
+    <cs:effectRef idx="0"/>
+    <cs:fontRef idx="minor">
+      <a:schemeClr val="tx1">
+        <a:lumMod val="65000"/>
+        <a:lumOff val="35000"/>
+      </a:schemeClr>
+    </cs:fontRef>
+    <cs:spPr>
+      <a:noFill/>
+      <a:ln w="9525" cap="flat" cmpd="sng" algn="ctr">
+        <a:solidFill>
+          <a:schemeClr val="tx1">
+            <a:lumMod val="15000"/>
+            <a:lumOff val="85000"/>
+          </a:schemeClr>
+        </a:solidFill>
+        <a:round/>
+      </a:ln>
+    </cs:spPr>
+    <cs:defRPr sz="1197" kern="1200"/>
+  </cs:dataTable>
+  <cs:downBar>
+    <cs:lnRef idx="0"/>
+    <cs:fillRef idx="0"/>
+    <cs:effectRef idx="0"/>
+    <cs:fontRef idx="minor">
+      <a:schemeClr val="tx1"/>
+    </cs:fontRef>
+    <cs:spPr>
+      <a:solidFill>
+        <a:schemeClr val="dk1">
+          <a:lumMod val="75000"/>
+          <a:lumOff val="25000"/>
+        </a:schemeClr>
+      </a:solidFill>
+      <a:ln w="9525" cap="flat" cmpd="sng" algn="ctr">
+        <a:solidFill>
+          <a:schemeClr val="tx1">
+            <a:lumMod val="65000"/>
+            <a:lumOff val="35000"/>
+          </a:schemeClr>
+        </a:solidFill>
+        <a:round/>
+      </a:ln>
+    </cs:spPr>
+  </cs:downBar>
+  <cs:dropLine>
+    <cs:lnRef idx="0"/>
+    <cs:fillRef idx="0"/>
+    <cs:effectRef idx="0"/>
+    <cs:fontRef idx="minor">
+      <a:schemeClr val="tx1"/>
+    </cs:fontRef>
+    <cs:spPr>
+      <a:ln w="9525" cap="flat" cmpd="sng" algn="ctr">
+        <a:solidFill>
+          <a:schemeClr val="tx1">
+            <a:lumMod val="35000"/>
+            <a:lumOff val="65000"/>
+          </a:schemeClr>
+        </a:solidFill>
+        <a:round/>
+      </a:ln>
+    </cs:spPr>
+  </cs:dropLine>
+  <cs:errorBar>
+    <cs:lnRef idx="0"/>
+    <cs:fillRef idx="0"/>
+    <cs:effectRef idx="0"/>
+    <cs:fontRef idx="minor">
+      <a:schemeClr val="tx1"/>
+    </cs:fontRef>
+    <cs:spPr>
+      <a:ln w="9525" cap="flat" cmpd="sng" algn="ctr">
+        <a:solidFill>
+          <a:schemeClr val="tx1">
+            <a:lumMod val="65000"/>
+            <a:lumOff val="35000"/>
+          </a:schemeClr>
+        </a:solidFill>
+        <a:round/>
+      </a:ln>
+    </cs:spPr>
+  </cs:errorBar>
+  <cs:floor>
+    <cs:lnRef idx="0"/>
+    <cs:fillRef idx="0"/>
+    <cs:effectRef idx="0"/>
+    <cs:fontRef idx="minor">
+      <a:schemeClr val="tx1"/>
+    </cs:fontRef>
+    <cs:spPr>
+      <a:noFill/>
+      <a:ln>
+        <a:noFill/>
+      </a:ln>
+    </cs:spPr>
+  </cs:floor>
+  <cs:gridlineMajor>
+    <cs:lnRef idx="0"/>
+    <cs:fillRef idx="0"/>
+    <cs:effectRef idx="0"/>
+    <cs:fontRef idx="minor">
+      <a:schemeClr val="tx1"/>
+    </cs:fontRef>
+    <cs:spPr>
+      <a:ln w="9525" cap="flat" cmpd="sng" algn="ctr">
+        <a:solidFill>
+          <a:schemeClr val="tx1">
+            <a:lumMod val="15000"/>
+            <a:lumOff val="85000"/>
+          </a:schemeClr>
+        </a:solidFill>
+        <a:round/>
+      </a:ln>
+    </cs:spPr>
+  </cs:gridlineMajor>
+  <cs:gridlineMinor>
+    <cs:lnRef idx="0"/>
+    <cs:fillRef idx="0"/>
+    <cs:effectRef idx="0"/>
+    <cs:fontRef idx="minor">
+      <a:schemeClr val="tx1"/>
+    </cs:fontRef>
+    <cs:spPr>
+      <a:ln w="9525" cap="flat" cmpd="sng" algn="ctr">
+        <a:solidFill>
+          <a:schemeClr val="tx1">
+            <a:lumMod val="5000"/>
+            <a:lumOff val="95000"/>
+          </a:schemeClr>
+        </a:solidFill>
+        <a:round/>
+      </a:ln>
+    </cs:spPr>
+  </cs:gridlineMinor>
+  <cs:hiLoLine>
+    <cs:lnRef idx="0"/>
+    <cs:fillRef idx="0"/>
+    <cs:effectRef idx="0"/>
+    <cs:fontRef idx="minor">
+      <a:schemeClr val="tx1"/>
+    </cs:fontRef>
+    <cs:spPr>
+      <a:ln w="9525" cap="flat" cmpd="sng" algn="ctr">
+        <a:solidFill>
+          <a:schemeClr val="tx1">
+            <a:lumMod val="50000"/>
+            <a:lumOff val="50000"/>
+          </a:schemeClr>
+        </a:solidFill>
+        <a:round/>
+      </a:ln>
+    </cs:spPr>
+  </cs:hiLoLine>
+  <cs:leaderLine>
+    <cs:lnRef idx="0"/>
+    <cs:fillRef idx="0"/>
+    <cs:effectRef idx="0"/>
+    <cs:fontRef idx="minor">
+      <a:schemeClr val="tx1"/>
+    </cs:fontRef>
+    <cs:spPr>
+      <a:ln w="9525" cap="flat" cmpd="sng" algn="ctr">
+        <a:solidFill>
+          <a:schemeClr val="tx1">
+            <a:lumMod val="35000"/>
+            <a:lumOff val="65000"/>
+          </a:schemeClr>
+        </a:solidFill>
+        <a:round/>
+      </a:ln>
+    </cs:spPr>
+  </cs:leaderLine>
+  <cs:legend>
+    <cs:lnRef idx="0"/>
+    <cs:fillRef idx="0"/>
+    <cs:effectRef idx="0"/>
+    <cs:fontRef idx="minor">
+      <a:schemeClr val="tx1">
+        <a:lumMod val="65000"/>
+        <a:lumOff val="35000"/>
+      </a:schemeClr>
+    </cs:fontRef>
+    <cs:defRPr sz="1197" kern="1200"/>
+  </cs:legend>
+  <cs:plotArea mods="allowNoFillOverride allowNoLineOverride">
+    <cs:lnRef idx="0"/>
+    <cs:fillRef idx="0"/>
+    <cs:effectRef idx="0"/>
+    <cs:fontRef idx="minor">
+      <a:schemeClr val="tx1"/>
+    </cs:fontRef>
+  </cs:plotArea>
+  <cs:plotArea3D mods="allowNoFillOverride allowNoLineOverride">
+    <cs:lnRef idx="0"/>
+    <cs:fillRef idx="0"/>
+    <cs:effectRef idx="0"/>
+    <cs:fontRef idx="minor">
+      <a:schemeClr val="tx1"/>
+    </cs:fontRef>
+  </cs:plotArea3D>
+  <cs:seriesAxis>
+    <cs:lnRef idx="0"/>
+    <cs:fillRef idx="0"/>
+    <cs:effectRef idx="0"/>
+    <cs:fontRef idx="minor">
+      <a:schemeClr val="tx1">
+        <a:lumMod val="65000"/>
+        <a:lumOff val="35000"/>
+      </a:schemeClr>
+    </cs:fontRef>
+    <cs:defRPr sz="1197" kern="1200"/>
+  </cs:seriesAxis>
+  <cs:seriesLine>
+    <cs:lnRef idx="0"/>
+    <cs:fillRef idx="0"/>
+    <cs:effectRef idx="0"/>
+    <cs:fontRef idx="minor">
+      <a:schemeClr val="tx1"/>
+    </cs:fontRef>
+    <cs:spPr>
+      <a:ln w="9525" cap="flat" cmpd="sng" algn="ctr">
+        <a:solidFill>
+          <a:schemeClr val="tx1">
+            <a:lumMod val="35000"/>
+            <a:lumOff val="65000"/>
+          </a:schemeClr>
+        </a:solidFill>
+        <a:round/>
+      </a:ln>
+    </cs:spPr>
+  </cs:seriesLine>
+  <cs:title>
+    <cs:lnRef idx="0"/>
+    <cs:fillRef idx="0"/>
+    <cs:effectRef idx="0"/>
+    <cs:fontRef idx="minor">
+      <a:schemeClr val="tx1">
+        <a:lumMod val="65000"/>
+        <a:lumOff val="35000"/>
+      </a:schemeClr>
+    </cs:fontRef>
+    <cs:defRPr sz="1862" b="0" kern="1200" spc="0" baseline="0"/>
+  </cs:title>
+  <cs:trendline>
+    <cs:lnRef idx="0">
+      <cs:styleClr val="auto"/>
+    </cs:lnRef>
+    <cs:fillRef idx="0"/>
+    <cs:effectRef idx="0"/>
+    <cs:fontRef idx="minor">
+      <a:schemeClr val="tx1"/>
+    </cs:fontRef>
+    <cs:spPr>
+      <a:ln w="19050" cap="rnd">
+        <a:solidFill>
+          <a:schemeClr val="phClr"/>
+        </a:solidFill>
+        <a:prstDash val="sysDot"/>
+      </a:ln>
+    </cs:spPr>
+  </cs:trendline>
+  <cs:trendlineLabel>
+    <cs:lnRef idx="0"/>
+    <cs:fillRef idx="0"/>
+    <cs:effectRef idx="0"/>
+    <cs:fontRef idx="minor">
+      <a:schemeClr val="tx1">
+        <a:lumMod val="65000"/>
+        <a:lumOff val="35000"/>
+      </a:schemeClr>
+    </cs:fontRef>
+    <cs:defRPr sz="1197" kern="1200"/>
+  </cs:trendlineLabel>
+  <cs:upBar>
+    <cs:lnRef idx="0"/>
+    <cs:fillRef idx="0"/>
+    <cs:effectRef idx="0"/>
+    <cs:fontRef idx="minor">
+      <a:schemeClr val="tx1"/>
+    </cs:fontRef>
+    <cs:spPr>
+      <a:solidFill>
+        <a:schemeClr val="lt1"/>
+      </a:solidFill>
+      <a:ln w="9525" cap="flat" cmpd="sng" algn="ctr">
+        <a:solidFill>
+          <a:schemeClr val="tx1">
+            <a:lumMod val="65000"/>
+            <a:lumOff val="35000"/>
+          </a:schemeClr>
+        </a:solidFill>
+        <a:round/>
+      </a:ln>
+    </cs:spPr>
+  </cs:upBar>
+  <cs:valueAxis>
+    <cs:lnRef idx="0"/>
+    <cs:fillRef idx="0"/>
+    <cs:effectRef idx="0"/>
+    <cs:fontRef idx="minor">
+      <a:schemeClr val="tx1">
+        <a:lumMod val="65000"/>
+        <a:lumOff val="35000"/>
+      </a:schemeClr>
+    </cs:fontRef>
+    <cs:defRPr sz="1197" kern="1200"/>
+  </cs:valueAxis>
+  <cs:wall>
+    <cs:lnRef idx="0"/>
+    <cs:fillRef idx="0"/>
+    <cs:effectRef idx="0"/>
+    <cs:fontRef idx="minor">
+      <a:schemeClr val="tx1"/>
+    </cs:fontRef>
+    <cs:spPr>
+      <a:noFill/>
+      <a:ln>
+        <a:noFill/>
+      </a:ln>
+    </cs:spPr>
+  </cs:wall>
+</cs:chartStyle>
 </file>
 
 <file path=ppt/slideLayouts/slideLayout1.xml><?xml version="1.0" encoding="utf-8"?>
@@ -10487,6 +11352,34 @@
           </a:p>
         </p:txBody>
       </p:sp>
+      <p:graphicFrame>
+        <p:nvGraphicFramePr>
+          <p:cNvPr id="6" name="Chart 5">
+            <a:extLst>
+              <a:ext uri="{FF2B5EF4-FFF2-40B4-BE49-F238E27FC236}">
+                <a16:creationId xmlns:a16="http://schemas.microsoft.com/office/drawing/2014/main" id="{7F4DB418-3492-EA5C-DE6B-C25676370501}"/>
+              </a:ext>
+            </a:extLst>
+          </p:cNvPr>
+          <p:cNvGraphicFramePr/>
+          <p:nvPr>
+            <p:extLst>
+              <p:ext uri="{D42A27DB-BD31-4B8C-83A1-F6EECF244321}">
+                <p14:modId xmlns:p14="http://schemas.microsoft.com/office/powerpoint/2010/main" val="2269038632"/>
+              </p:ext>
+            </p:extLst>
+          </p:nvPr>
+        </p:nvGraphicFramePr>
+        <p:xfrm>
+          <a:off x="7848105" y="0"/>
+          <a:ext cx="4237603" cy="2217061"/>
+        </p:xfrm>
+        <a:graphic>
+          <a:graphicData uri="http://schemas.openxmlformats.org/drawingml/2006/chart">
+            <c:chart xmlns:c="http://schemas.openxmlformats.org/drawingml/2006/chart" xmlns:r="http://schemas.openxmlformats.org/officeDocument/2006/relationships" r:id="rId2"/>
+          </a:graphicData>
+        </a:graphic>
+      </p:graphicFrame>
     </p:spTree>
     <p:extLst>
       <p:ext uri="{BB962C8B-B14F-4D97-AF65-F5344CB8AC3E}">

</xml_diff>

<commit_message>
Cosmetic changes to measurements
</commit_message>
<xml_diff>
--- a/docs/measurements.pptx
+++ b/docs/measurements.pptx
@@ -6,9 +6,9 @@
   </p:sldMasterIdLst>
   <p:sldIdLst>
     <p:sldId id="256" r:id="rId2"/>
-    <p:sldId id="258" r:id="rId3"/>
+    <p:sldId id="262" r:id="rId3"/>
     <p:sldId id="260" r:id="rId4"/>
-    <p:sldId id="257" r:id="rId5"/>
+    <p:sldId id="263" r:id="rId5"/>
     <p:sldId id="259" r:id="rId6"/>
     <p:sldId id="261" r:id="rId7"/>
   </p:sldIdLst>
@@ -131,37 +131,7 @@
     </mc:Fallback>
   </mc:AlternateContent>
   <c:chart>
-    <c:title>
-      <c:overlay val="0"/>
-      <c:spPr>
-        <a:noFill/>
-        <a:ln>
-          <a:noFill/>
-        </a:ln>
-        <a:effectLst/>
-      </c:spPr>
-      <c:txPr>
-        <a:bodyPr rot="0" spcFirstLastPara="1" vertOverflow="ellipsis" vert="horz" wrap="square" anchor="ctr" anchorCtr="1"/>
-        <a:lstStyle/>
-        <a:p>
-          <a:pPr>
-            <a:defRPr sz="1862" b="0" i="0" u="none" strike="noStrike" kern="1200" spc="0" baseline="0">
-              <a:solidFill>
-                <a:schemeClr val="tx1">
-                  <a:lumMod val="65000"/>
-                  <a:lumOff val="35000"/>
-                </a:schemeClr>
-              </a:solidFill>
-              <a:latin typeface="+mn-lt"/>
-              <a:ea typeface="+mn-ea"/>
-              <a:cs typeface="+mn-cs"/>
-            </a:defRPr>
-          </a:pPr>
-          <a:endParaRPr lang="en-US"/>
-        </a:p>
-      </c:txPr>
-    </c:title>
-    <c:autoTitleDeleted val="0"/>
+    <c:autoTitleDeleted val="1"/>
     <c:plotArea>
       <c:layout/>
       <c:barChart>
@@ -1131,7 +1101,7 @@
           <a:p>
             <a:fld id="{861A233C-30F2-024D-AC2A-712D8D9BEB28}" type="datetimeFigureOut">
               <a:rPr lang="en-US" smtClean="0"/>
-              <a:t>6/15/22</a:t>
+              <a:t>6/21/22</a:t>
             </a:fld>
             <a:endParaRPr lang="en-US"/>
           </a:p>
@@ -1331,7 +1301,7 @@
           <a:p>
             <a:fld id="{861A233C-30F2-024D-AC2A-712D8D9BEB28}" type="datetimeFigureOut">
               <a:rPr lang="en-US" smtClean="0"/>
-              <a:t>6/15/22</a:t>
+              <a:t>6/21/22</a:t>
             </a:fld>
             <a:endParaRPr lang="en-US"/>
           </a:p>
@@ -1541,7 +1511,7 @@
           <a:p>
             <a:fld id="{861A233C-30F2-024D-AC2A-712D8D9BEB28}" type="datetimeFigureOut">
               <a:rPr lang="en-US" smtClean="0"/>
-              <a:t>6/15/22</a:t>
+              <a:t>6/21/22</a:t>
             </a:fld>
             <a:endParaRPr lang="en-US"/>
           </a:p>
@@ -1741,7 +1711,7 @@
           <a:p>
             <a:fld id="{861A233C-30F2-024D-AC2A-712D8D9BEB28}" type="datetimeFigureOut">
               <a:rPr lang="en-US" smtClean="0"/>
-              <a:t>6/15/22</a:t>
+              <a:t>6/21/22</a:t>
             </a:fld>
             <a:endParaRPr lang="en-US"/>
           </a:p>
@@ -2017,7 +1987,7 @@
           <a:p>
             <a:fld id="{861A233C-30F2-024D-AC2A-712D8D9BEB28}" type="datetimeFigureOut">
               <a:rPr lang="en-US" smtClean="0"/>
-              <a:t>6/15/22</a:t>
+              <a:t>6/21/22</a:t>
             </a:fld>
             <a:endParaRPr lang="en-US"/>
           </a:p>
@@ -2285,7 +2255,7 @@
           <a:p>
             <a:fld id="{861A233C-30F2-024D-AC2A-712D8D9BEB28}" type="datetimeFigureOut">
               <a:rPr lang="en-US" smtClean="0"/>
-              <a:t>6/15/22</a:t>
+              <a:t>6/21/22</a:t>
             </a:fld>
             <a:endParaRPr lang="en-US"/>
           </a:p>
@@ -2700,7 +2670,7 @@
           <a:p>
             <a:fld id="{861A233C-30F2-024D-AC2A-712D8D9BEB28}" type="datetimeFigureOut">
               <a:rPr lang="en-US" smtClean="0"/>
-              <a:t>6/15/22</a:t>
+              <a:t>6/21/22</a:t>
             </a:fld>
             <a:endParaRPr lang="en-US"/>
           </a:p>
@@ -2842,7 +2812,7 @@
           <a:p>
             <a:fld id="{861A233C-30F2-024D-AC2A-712D8D9BEB28}" type="datetimeFigureOut">
               <a:rPr lang="en-US" smtClean="0"/>
-              <a:t>6/15/22</a:t>
+              <a:t>6/21/22</a:t>
             </a:fld>
             <a:endParaRPr lang="en-US"/>
           </a:p>
@@ -2955,7 +2925,7 @@
           <a:p>
             <a:fld id="{861A233C-30F2-024D-AC2A-712D8D9BEB28}" type="datetimeFigureOut">
               <a:rPr lang="en-US" smtClean="0"/>
-              <a:t>6/15/22</a:t>
+              <a:t>6/21/22</a:t>
             </a:fld>
             <a:endParaRPr lang="en-US"/>
           </a:p>
@@ -3268,7 +3238,7 @@
           <a:p>
             <a:fld id="{861A233C-30F2-024D-AC2A-712D8D9BEB28}" type="datetimeFigureOut">
               <a:rPr lang="en-US" smtClean="0"/>
-              <a:t>6/15/22</a:t>
+              <a:t>6/21/22</a:t>
             </a:fld>
             <a:endParaRPr lang="en-US"/>
           </a:p>
@@ -3557,7 +3527,7 @@
           <a:p>
             <a:fld id="{861A233C-30F2-024D-AC2A-712D8D9BEB28}" type="datetimeFigureOut">
               <a:rPr lang="en-US" smtClean="0"/>
-              <a:t>6/15/22</a:t>
+              <a:t>6/21/22</a:t>
             </a:fld>
             <a:endParaRPr lang="en-US"/>
           </a:p>
@@ -3800,7 +3770,7 @@
           <a:p>
             <a:fld id="{861A233C-30F2-024D-AC2A-712D8D9BEB28}" type="datetimeFigureOut">
               <a:rPr lang="en-US" smtClean="0"/>
-              <a:t>6/15/22</a:t>
+              <a:t>6/21/22</a:t>
             </a:fld>
             <a:endParaRPr lang="en-US"/>
           </a:p>
@@ -4240,7 +4210,14 @@
           <a:p>
             <a:r>
               <a:rPr lang="en-US" dirty="0"/>
-              <a:t>Network Observability Measurements</a:t>
+              <a:t>Network Observability :</a:t>
+            </a:r>
+            <a:br>
+              <a:rPr lang="en-US" dirty="0"/>
+            </a:br>
+            <a:r>
+              <a:rPr lang="en-US" dirty="0"/>
+              <a:t>Performance Measurements</a:t>
             </a:r>
           </a:p>
         </p:txBody>
@@ -4266,7 +4243,14 @@
           <a:bodyPr/>
           <a:lstStyle/>
           <a:p>
-            <a:endParaRPr lang="en-US"/>
+            <a:r>
+              <a:rPr lang="en-US" dirty="0" err="1"/>
+              <a:t>Pravein</a:t>
+            </a:r>
+            <a:r>
+              <a:rPr lang="en-US" dirty="0"/>
+              <a:t> Govindan Kannan</a:t>
+            </a:r>
           </a:p>
         </p:txBody>
       </p:sp>
@@ -4464,7 +4448,7 @@
             <a:pPr algn="ctr"/>
             <a:r>
               <a:rPr lang="en-US" dirty="0"/>
-              <a:t>receiver</a:t>
+              <a:t>Receiver</a:t>
             </a:r>
           </a:p>
         </p:txBody>
@@ -4512,8 +4496,12 @@
           <a:p>
             <a:pPr algn="ctr"/>
             <a:r>
-              <a:rPr lang="en-US" dirty="0" err="1"/>
+              <a:rPr lang="en-US" dirty="0"/>
               <a:t>Pktgen</a:t>
+            </a:r>
+            <a:r>
+              <a:rPr lang="en-US" baseline="30000" dirty="0"/>
+              <a:t>1</a:t>
             </a:r>
             <a:endParaRPr lang="en-US" dirty="0"/>
           </a:p>
@@ -4628,7 +4616,7 @@
         <p:spPr>
           <a:xfrm>
             <a:off x="3226389" y="1712466"/>
-            <a:ext cx="1248099" cy="646331"/>
+            <a:ext cx="1025537" cy="584775"/>
           </a:xfrm>
           <a:prstGeom prst="rect">
             <a:avLst/>
@@ -4648,7 +4636,11 @@
           </a:p>
           <a:p>
             <a:r>
-              <a:rPr lang="en-US" dirty="0"/>
+              <a:rPr lang="en-US" sz="1400" dirty="0">
+                <a:solidFill>
+                  <a:schemeClr val="bg1"/>
+                </a:solidFill>
+              </a:rPr>
               <a:t>Kernel 5.13</a:t>
             </a:r>
           </a:p>
@@ -4669,7 +4661,7 @@
         <p:spPr>
           <a:xfrm>
             <a:off x="8361953" y="1712466"/>
-            <a:ext cx="1131079" cy="646331"/>
+            <a:ext cx="972639" cy="584775"/>
           </a:xfrm>
           <a:prstGeom prst="rect">
             <a:avLst/>
@@ -4689,7 +4681,11 @@
           </a:p>
           <a:p>
             <a:r>
-              <a:rPr lang="en-US" dirty="0"/>
+              <a:rPr lang="en-US" sz="1400" dirty="0">
+                <a:solidFill>
+                  <a:schemeClr val="bg1"/>
+                </a:solidFill>
+              </a:rPr>
               <a:t>Kernel 5.4</a:t>
             </a:r>
           </a:p>
@@ -4723,6 +4719,7 @@
           </a:bodyPr>
           <a:lstStyle/>
           <a:p>
+            <a:pPr algn="ctr"/>
             <a:r>
               <a:rPr lang="en-US" b="1" dirty="0"/>
               <a:t>Questions?</a:t>
@@ -4734,7 +4731,23 @@
             </a:pPr>
             <a:r>
               <a:rPr lang="en-US" dirty="0"/>
-              <a:t>How much % of traffic is successfully monitored by “</a:t>
+              <a:t>How much </a:t>
+            </a:r>
+            <a:r>
+              <a:rPr lang="en-US" b="1" dirty="0"/>
+              <a:t>%</a:t>
+            </a:r>
+            <a:r>
+              <a:rPr lang="en-US" dirty="0"/>
+              <a:t> of traffic is </a:t>
+            </a:r>
+            <a:r>
+              <a:rPr lang="en-US" b="1" dirty="0"/>
+              <a:t>successfully monitored </a:t>
+            </a:r>
+            <a:r>
+              <a:rPr lang="en-US" dirty="0"/>
+              <a:t>by “</a:t>
             </a:r>
             <a:r>
               <a:rPr lang="en-US" dirty="0" err="1"/>
@@ -4751,7 +4764,15 @@
             </a:pPr>
             <a:r>
               <a:rPr lang="en-US" dirty="0"/>
-              <a:t>What are the overheads?</a:t>
+              <a:t>What are the </a:t>
+            </a:r>
+            <a:r>
+              <a:rPr lang="en-US" b="1" dirty="0"/>
+              <a:t>overheads</a:t>
+            </a:r>
+            <a:r>
+              <a:rPr lang="en-US" dirty="0"/>
+              <a:t>?</a:t>
             </a:r>
           </a:p>
         </p:txBody>
@@ -4770,12 +4791,23 @@
         </p:nvSpPr>
         <p:spPr>
           <a:xfrm>
-            <a:off x="28775" y="3429000"/>
-            <a:ext cx="2634912" cy="3429000"/>
+            <a:off x="28775" y="4083332"/>
+            <a:ext cx="2634912" cy="2774668"/>
           </a:xfrm>
           <a:prstGeom prst="snipRoundRect">
             <a:avLst/>
           </a:prstGeom>
+          <a:solidFill>
+            <a:schemeClr val="accent2">
+              <a:lumMod val="60000"/>
+              <a:lumOff val="40000"/>
+            </a:schemeClr>
+          </a:solidFill>
+          <a:ln>
+            <a:solidFill>
+              <a:srgbClr val="0070C0"/>
+            </a:solidFill>
+          </a:ln>
         </p:spPr>
         <p:style>
           <a:lnRef idx="2">
@@ -4799,139 +4831,182 @@
           <a:p>
             <a:pPr algn="ctr"/>
             <a:r>
-              <a:rPr lang="en-US" b="1" dirty="0" err="1"/>
+              <a:rPr lang="en-US" b="1" dirty="0" err="1">
+                <a:solidFill>
+                  <a:schemeClr val="tx1"/>
+                </a:solidFill>
+              </a:rPr>
               <a:t>Observ</a:t>
             </a:r>
             <a:r>
-              <a:rPr lang="en-US" b="1" dirty="0"/>
+              <a:rPr lang="en-US" b="1" dirty="0">
+                <a:solidFill>
+                  <a:schemeClr val="tx1"/>
+                </a:solidFill>
+              </a:rPr>
               <a:t> Logs/Metrics</a:t>
             </a:r>
           </a:p>
           <a:p>
             <a:pPr algn="ctr"/>
-            <a:endParaRPr lang="en-US" dirty="0"/>
+            <a:endParaRPr lang="en-US" dirty="0">
+              <a:solidFill>
+                <a:schemeClr val="tx1"/>
+              </a:solidFill>
+            </a:endParaRPr>
           </a:p>
           <a:p>
             <a:pPr algn="ctr"/>
             <a:r>
-              <a:rPr lang="en-US" dirty="0" err="1"/>
+              <a:rPr lang="en-US" dirty="0" err="1">
+                <a:solidFill>
+                  <a:schemeClr val="tx1"/>
+                </a:solidFill>
+              </a:rPr>
               <a:t>Eth_protocol</a:t>
             </a:r>
             <a:r>
-              <a:rPr lang="en-US" dirty="0"/>
+              <a:rPr lang="en-US" dirty="0">
+                <a:solidFill>
+                  <a:schemeClr val="tx1"/>
+                </a:solidFill>
+              </a:rPr>
               <a:t>, </a:t>
             </a:r>
             <a:r>
-              <a:rPr lang="en-US" dirty="0" err="1"/>
+              <a:rPr lang="en-US" dirty="0" err="1">
+                <a:solidFill>
+                  <a:schemeClr val="tx1"/>
+                </a:solidFill>
+              </a:rPr>
               <a:t>Src_Mac</a:t>
             </a:r>
             <a:r>
-              <a:rPr lang="en-US" dirty="0"/>
+              <a:rPr lang="en-US" dirty="0">
+                <a:solidFill>
+                  <a:schemeClr val="tx1"/>
+                </a:solidFill>
+              </a:rPr>
               <a:t>, </a:t>
             </a:r>
             <a:r>
-              <a:rPr lang="en-US" dirty="0" err="1"/>
+              <a:rPr lang="en-US" dirty="0" err="1">
+                <a:solidFill>
+                  <a:schemeClr val="tx1"/>
+                </a:solidFill>
+              </a:rPr>
               <a:t>Dst_Mac</a:t>
             </a:r>
             <a:r>
-              <a:rPr lang="en-US" dirty="0"/>
+              <a:rPr lang="en-US" dirty="0">
+                <a:solidFill>
+                  <a:schemeClr val="tx1"/>
+                </a:solidFill>
+              </a:rPr>
               <a:t>, </a:t>
             </a:r>
             <a:r>
-              <a:rPr lang="en-US" dirty="0" err="1"/>
+              <a:rPr lang="en-US" dirty="0" err="1">
+                <a:solidFill>
+                  <a:schemeClr val="tx1"/>
+                </a:solidFill>
+              </a:rPr>
               <a:t>Src_IP</a:t>
             </a:r>
             <a:r>
-              <a:rPr lang="en-US" dirty="0"/>
+              <a:rPr lang="en-US" dirty="0">
+                <a:solidFill>
+                  <a:schemeClr val="tx1"/>
+                </a:solidFill>
+              </a:rPr>
               <a:t>, </a:t>
             </a:r>
             <a:r>
-              <a:rPr lang="en-US" dirty="0" err="1"/>
+              <a:rPr lang="en-US" dirty="0" err="1">
+                <a:solidFill>
+                  <a:schemeClr val="tx1"/>
+                </a:solidFill>
+              </a:rPr>
               <a:t>Dest_IP</a:t>
             </a:r>
             <a:r>
-              <a:rPr lang="en-US" dirty="0"/>
+              <a:rPr lang="en-US" dirty="0">
+                <a:solidFill>
+                  <a:schemeClr val="tx1"/>
+                </a:solidFill>
+              </a:rPr>
               <a:t>, </a:t>
             </a:r>
             <a:r>
-              <a:rPr lang="en-US" dirty="0" err="1"/>
+              <a:rPr lang="en-US" dirty="0" err="1">
+                <a:solidFill>
+                  <a:schemeClr val="tx1"/>
+                </a:solidFill>
+              </a:rPr>
               <a:t>Src_Port</a:t>
             </a:r>
             <a:r>
-              <a:rPr lang="en-US" dirty="0"/>
+              <a:rPr lang="en-US" dirty="0">
+                <a:solidFill>
+                  <a:schemeClr val="tx1"/>
+                </a:solidFill>
+              </a:rPr>
               <a:t>, </a:t>
             </a:r>
             <a:r>
-              <a:rPr lang="en-US" dirty="0" err="1"/>
+              <a:rPr lang="en-US" dirty="0" err="1">
+                <a:solidFill>
+                  <a:schemeClr val="tx1"/>
+                </a:solidFill>
+              </a:rPr>
               <a:t>Dst_port</a:t>
             </a:r>
             <a:r>
-              <a:rPr lang="en-US" dirty="0"/>
-              <a:t>, Protocol =&gt;</a:t>
+              <a:rPr lang="en-US" dirty="0">
+                <a:solidFill>
+                  <a:schemeClr val="tx1"/>
+                </a:solidFill>
+              </a:rPr>
+              <a:t>, Protocol =&gt; </a:t>
             </a:r>
           </a:p>
           <a:p>
             <a:pPr algn="ctr"/>
             <a:r>
-              <a:rPr lang="en-US" dirty="0">
-                <a:ln>
-                  <a:solidFill>
-                    <a:schemeClr val="bg1"/>
-                  </a:solidFill>
-                </a:ln>
+              <a:rPr lang="en-US" b="1" dirty="0">
                 <a:solidFill>
-                  <a:srgbClr val="FFFF00"/>
+                  <a:srgbClr val="002060"/>
                 </a:solidFill>
               </a:rPr>
               <a:t>Packets, Bytes, </a:t>
             </a:r>
             <a:r>
-              <a:rPr lang="en-US" dirty="0" err="1">
-                <a:ln>
-                  <a:solidFill>
-                    <a:schemeClr val="bg1"/>
-                  </a:solidFill>
-                </a:ln>
+              <a:rPr lang="en-US" b="1" dirty="0" err="1">
                 <a:solidFill>
-                  <a:srgbClr val="FFFF00"/>
+                  <a:srgbClr val="002060"/>
                 </a:solidFill>
               </a:rPr>
               <a:t>FlowStartTime</a:t>
             </a:r>
             <a:r>
-              <a:rPr lang="en-US" dirty="0">
-                <a:ln>
-                  <a:solidFill>
-                    <a:schemeClr val="bg1"/>
-                  </a:solidFill>
-                </a:ln>
+              <a:rPr lang="en-US" b="1" dirty="0">
                 <a:solidFill>
-                  <a:srgbClr val="FFFF00"/>
+                  <a:srgbClr val="002060"/>
                 </a:solidFill>
               </a:rPr>
               <a:t>, </a:t>
             </a:r>
             <a:r>
-              <a:rPr lang="en-US" dirty="0" err="1">
-                <a:ln>
-                  <a:solidFill>
-                    <a:schemeClr val="bg1"/>
-                  </a:solidFill>
-                </a:ln>
+              <a:rPr lang="en-US" b="1" dirty="0" err="1">
                 <a:solidFill>
-                  <a:srgbClr val="FFFF00"/>
+                  <a:srgbClr val="002060"/>
                 </a:solidFill>
               </a:rPr>
               <a:t>FlowEndTime</a:t>
             </a:r>
-            <a:endParaRPr lang="en-US" dirty="0">
-              <a:ln>
-                <a:solidFill>
-                  <a:schemeClr val="bg1"/>
-                </a:solidFill>
-              </a:ln>
+            <a:endParaRPr lang="en-US" b="1" dirty="0">
               <a:solidFill>
-                <a:srgbClr val="FFFF00"/>
+                <a:srgbClr val="002060"/>
               </a:solidFill>
             </a:endParaRPr>
           </a:p>
@@ -4951,8 +5026,8 @@
         </p:nvSpPr>
         <p:spPr>
           <a:xfrm>
-            <a:off x="9740348" y="2432928"/>
-            <a:ext cx="2372573" cy="1477328"/>
+            <a:off x="9663155" y="2125102"/>
+            <a:ext cx="2604559" cy="2031325"/>
           </a:xfrm>
           <a:prstGeom prst="rect">
             <a:avLst/>
@@ -4966,14 +5041,22 @@
           <a:lstStyle/>
           <a:p>
             <a:r>
+              <a:rPr lang="en-US" dirty="0">
+                <a:solidFill>
+                  <a:srgbClr val="FF0000"/>
+                </a:solidFill>
+              </a:rPr>
+              <a:t>Total Packets </a:t>
+            </a:r>
+            <a:r>
               <a:rPr lang="en-US" dirty="0"/>
-              <a:t>100M</a:t>
+              <a:t>= 100 M</a:t>
             </a:r>
           </a:p>
           <a:p>
             <a:r>
               <a:rPr lang="en-US" dirty="0"/>
-              <a:t>3.7 Mpps (64B packets)</a:t>
+              <a:t>   (75B/1000B packets)</a:t>
             </a:r>
           </a:p>
           <a:p>
@@ -4981,14 +5064,39 @@
           </a:p>
           <a:p>
             <a:r>
+              <a:rPr lang="en-US" dirty="0">
+                <a:solidFill>
+                  <a:srgbClr val="FF0000"/>
+                </a:solidFill>
+              </a:rPr>
+              <a:t>Packet Rate </a:t>
+            </a:r>
+            <a:r>
               <a:rPr lang="en-US" dirty="0"/>
-              <a:t>40 Flows:</a:t>
-            </a:r>
-          </a:p>
-          <a:p>
+              <a:t>= ~3.7 Mpps </a:t>
+            </a:r>
+          </a:p>
+          <a:p>
+            <a:endParaRPr lang="en-US" dirty="0"/>
+          </a:p>
+          <a:p>
+            <a:r>
+              <a:rPr lang="en-US" dirty="0">
+                <a:solidFill>
+                  <a:srgbClr val="FF0000"/>
+                </a:solidFill>
+              </a:rPr>
+              <a:t>Total threads </a:t>
+            </a:r>
             <a:r>
               <a:rPr lang="en-US" dirty="0"/>
-              <a:t>1 Flow/Thread</a:t>
+              <a:t>= 40</a:t>
+            </a:r>
+          </a:p>
+          <a:p>
+            <a:r>
+              <a:rPr lang="en-US" dirty="0"/>
+              <a:t>(1 UDP Flow per thread)</a:t>
             </a:r>
           </a:p>
         </p:txBody>
@@ -5028,10 +5136,147 @@
           </a:p>
         </p:txBody>
       </p:sp>
+      <p:sp>
+        <p:nvSpPr>
+          <p:cNvPr id="12" name="Rectangle 11">
+            <a:extLst>
+              <a:ext uri="{FF2B5EF4-FFF2-40B4-BE49-F238E27FC236}">
+                <a16:creationId xmlns:a16="http://schemas.microsoft.com/office/drawing/2014/main" id="{9610990F-D200-F4BA-10D9-8B48E31C8DAA}"/>
+              </a:ext>
+            </a:extLst>
+          </p:cNvPr>
+          <p:cNvSpPr/>
+          <p:nvPr/>
+        </p:nvSpPr>
+        <p:spPr>
+          <a:xfrm>
+            <a:off x="4350190" y="6596390"/>
+            <a:ext cx="5274201" cy="261610"/>
+          </a:xfrm>
+          <a:prstGeom prst="rect">
+            <a:avLst/>
+          </a:prstGeom>
+        </p:spPr>
+        <p:txBody>
+          <a:bodyPr wrap="none">
+            <a:spAutoFit/>
+          </a:bodyPr>
+          <a:lstStyle/>
+          <a:p>
+            <a:r>
+              <a:rPr lang="en-US" sz="1100" baseline="30000" dirty="0"/>
+              <a:t>1</a:t>
+            </a:r>
+            <a:r>
+              <a:rPr lang="en-US" sz="1100" dirty="0">
+                <a:hlinkClick r:id="rId2"/>
+              </a:rPr>
+              <a:t>https://</a:t>
+            </a:r>
+            <a:r>
+              <a:rPr lang="en-US" sz="1100" dirty="0" err="1">
+                <a:hlinkClick r:id="rId2"/>
+              </a:rPr>
+              <a:t>github.com</a:t>
+            </a:r>
+            <a:r>
+              <a:rPr lang="en-US" sz="1100" dirty="0">
+                <a:hlinkClick r:id="rId2"/>
+              </a:rPr>
+              <a:t>/</a:t>
+            </a:r>
+            <a:r>
+              <a:rPr lang="en-US" sz="1100" dirty="0" err="1">
+                <a:hlinkClick r:id="rId2"/>
+              </a:rPr>
+              <a:t>netobserv</a:t>
+            </a:r>
+            <a:r>
+              <a:rPr lang="en-US" sz="1100" dirty="0">
+                <a:hlinkClick r:id="rId2"/>
+              </a:rPr>
+              <a:t>/</a:t>
+            </a:r>
+            <a:r>
+              <a:rPr lang="en-US" sz="1100" dirty="0" err="1">
+                <a:hlinkClick r:id="rId2"/>
+              </a:rPr>
+              <a:t>ebpf</a:t>
+            </a:r>
+            <a:r>
+              <a:rPr lang="en-US" sz="1100" dirty="0">
+                <a:hlinkClick r:id="rId2"/>
+              </a:rPr>
+              <a:t>-research/tree/main/</a:t>
+            </a:r>
+            <a:r>
+              <a:rPr lang="en-US" sz="1100" dirty="0" err="1">
+                <a:hlinkClick r:id="rId2"/>
+              </a:rPr>
+              <a:t>PcapPlusPlus</a:t>
+            </a:r>
+            <a:r>
+              <a:rPr lang="en-US" sz="1100" dirty="0">
+                <a:hlinkClick r:id="rId2"/>
+              </a:rPr>
+              <a:t>/Examples/</a:t>
+            </a:r>
+            <a:r>
+              <a:rPr lang="en-US" sz="1100" dirty="0" err="1">
+                <a:hlinkClick r:id="rId2"/>
+              </a:rPr>
+              <a:t>pktgen</a:t>
+            </a:r>
+            <a:r>
+              <a:rPr lang="en-US" sz="1100" dirty="0">
+                <a:hlinkClick r:id="rId2"/>
+              </a:rPr>
+              <a:t> </a:t>
+            </a:r>
+            <a:endParaRPr lang="en-US" sz="1100" dirty="0"/>
+          </a:p>
+        </p:txBody>
+      </p:sp>
+      <p:pic>
+        <p:nvPicPr>
+          <p:cNvPr id="14" name="Graphic 13" descr="Magnifying glass with solid fill">
+            <a:extLst>
+              <a:ext uri="{FF2B5EF4-FFF2-40B4-BE49-F238E27FC236}">
+                <a16:creationId xmlns:a16="http://schemas.microsoft.com/office/drawing/2014/main" id="{2B75908F-7BEC-D39B-E611-27D0F9CF7B65}"/>
+              </a:ext>
+            </a:extLst>
+          </p:cNvPr>
+          <p:cNvPicPr>
+            <a:picLocks noChangeAspect="1"/>
+          </p:cNvPicPr>
+          <p:nvPr/>
+        </p:nvPicPr>
+        <p:blipFill>
+          <a:blip r:embed="rId3">
+            <a:extLst>
+              <a:ext uri="{96DAC541-7B7A-43D3-8B79-37D633B846F1}">
+                <asvg:svgBlip xmlns:asvg="http://schemas.microsoft.com/office/drawing/2016/SVG/main" r:embed="rId4"/>
+              </a:ext>
+            </a:extLst>
+          </a:blip>
+          <a:stretch>
+            <a:fillRect/>
+          </a:stretch>
+        </p:blipFill>
+        <p:spPr>
+          <a:xfrm>
+            <a:off x="4314027" y="3626132"/>
+            <a:ext cx="457200" cy="457200"/>
+          </a:xfrm>
+          <a:prstGeom prst="rect">
+            <a:avLst/>
+          </a:prstGeom>
+        </p:spPr>
+      </p:pic>
     </p:spTree>
     <p:extLst>
       <p:ext uri="{BB962C8B-B14F-4D97-AF65-F5344CB8AC3E}">
-        <p14:creationId xmlns:p14="http://schemas.microsoft.com/office/powerpoint/2010/main" val="1878772979"/>
+        <p14:creationId xmlns:p14="http://schemas.microsoft.com/office/powerpoint/2010/main" val="3595756887"/>
       </p:ext>
     </p:extLst>
   </p:cSld>
@@ -7775,7 +8020,7 @@
             <a:pPr algn="ctr"/>
             <a:r>
               <a:rPr lang="en-US" dirty="0" err="1"/>
-              <a:t>pktgen</a:t>
+              <a:t>Pktgen</a:t>
             </a:r>
             <a:endParaRPr lang="en-US" dirty="0"/>
           </a:p>
@@ -7825,7 +8070,7 @@
             <a:pPr algn="ctr"/>
             <a:r>
               <a:rPr lang="en-US" dirty="0"/>
-              <a:t>receiver</a:t>
+              <a:t>Receiver</a:t>
             </a:r>
           </a:p>
         </p:txBody>
@@ -7940,7 +8185,7 @@
         <p:spPr>
           <a:xfrm>
             <a:off x="3226389" y="1712466"/>
-            <a:ext cx="1248099" cy="923330"/>
+            <a:ext cx="1011752" cy="861774"/>
           </a:xfrm>
           <a:prstGeom prst="rect">
             <a:avLst/>
@@ -7960,7 +8205,11 @@
           </a:p>
           <a:p>
             <a:r>
-              <a:rPr lang="en-US" dirty="0"/>
+              <a:rPr lang="en-US" sz="1400" dirty="0">
+                <a:solidFill>
+                  <a:schemeClr val="bg1"/>
+                </a:solidFill>
+              </a:rPr>
               <a:t>Kernel 5.13</a:t>
             </a:r>
           </a:p>
@@ -7984,7 +8233,7 @@
         <p:spPr>
           <a:xfrm>
             <a:off x="8361953" y="1712466"/>
-            <a:ext cx="1131079" cy="923330"/>
+            <a:ext cx="972639" cy="861774"/>
           </a:xfrm>
           <a:prstGeom prst="rect">
             <a:avLst/>
@@ -8004,7 +8253,11 @@
           </a:p>
           <a:p>
             <a:r>
-              <a:rPr lang="en-US" dirty="0"/>
+              <a:rPr lang="en-US" sz="1400" dirty="0">
+                <a:solidFill>
+                  <a:schemeClr val="bg1"/>
+                </a:solidFill>
+              </a:rPr>
               <a:t>Kernel 5.4</a:t>
             </a:r>
           </a:p>
@@ -8028,7 +8281,7 @@
         <p:spPr>
           <a:xfrm>
             <a:off x="3359427" y="5335702"/>
-            <a:ext cx="8369920" cy="923330"/>
+            <a:ext cx="6942670" cy="923330"/>
           </a:xfrm>
           <a:prstGeom prst="rect">
             <a:avLst/>
@@ -8060,11 +8313,19 @@
             </a:r>
             <a:r>
               <a:rPr lang="en-US" dirty="0"/>
-              <a:t> agent” slow down “</a:t>
+              <a:t> agent” </a:t>
+            </a:r>
+            <a:r>
+              <a:rPr lang="en-US" b="1" dirty="0"/>
+              <a:t>slow down throughput </a:t>
+            </a:r>
+            <a:r>
+              <a:rPr lang="en-US" dirty="0"/>
+              <a:t>of “</a:t>
             </a:r>
             <a:r>
               <a:rPr lang="en-US" dirty="0" err="1"/>
-              <a:t>pktgen</a:t>
+              <a:t>Pktgen</a:t>
             </a:r>
             <a:r>
               <a:rPr lang="en-US" dirty="0"/>
@@ -8077,7 +8338,23 @@
             </a:pPr>
             <a:r>
               <a:rPr lang="en-US" dirty="0"/>
-              <a:t>How much % of traffic is successfully monitored by “</a:t>
+              <a:t>How much </a:t>
+            </a:r>
+            <a:r>
+              <a:rPr lang="en-US" b="1" dirty="0"/>
+              <a:t>%</a:t>
+            </a:r>
+            <a:r>
+              <a:rPr lang="en-US" dirty="0"/>
+              <a:t> of traffic is </a:t>
+            </a:r>
+            <a:r>
+              <a:rPr lang="en-US" b="1" dirty="0"/>
+              <a:t>successfully monitored </a:t>
+            </a:r>
+            <a:r>
+              <a:rPr lang="en-US" dirty="0"/>
+              <a:t>by “</a:t>
             </a:r>
             <a:r>
               <a:rPr lang="en-US" dirty="0" err="1"/>
@@ -8085,244 +8362,7 @@
             </a:r>
             <a:r>
               <a:rPr lang="en-US" dirty="0"/>
-              <a:t> agent” (monitoring rate)</a:t>
-            </a:r>
-          </a:p>
-        </p:txBody>
-      </p:sp>
-      <p:sp>
-        <p:nvSpPr>
-          <p:cNvPr id="18" name="Snip and Round Single Corner of Rectangle 17">
-            <a:extLst>
-              <a:ext uri="{FF2B5EF4-FFF2-40B4-BE49-F238E27FC236}">
-                <a16:creationId xmlns:a16="http://schemas.microsoft.com/office/drawing/2014/main" id="{85017F13-1B0E-20BA-112F-43DCB3C5CD30}"/>
-              </a:ext>
-            </a:extLst>
-          </p:cNvPr>
-          <p:cNvSpPr/>
-          <p:nvPr/>
-        </p:nvSpPr>
-        <p:spPr>
-          <a:xfrm>
-            <a:off x="28775" y="3429000"/>
-            <a:ext cx="2634912" cy="3429000"/>
-          </a:xfrm>
-          <a:prstGeom prst="snipRoundRect">
-            <a:avLst/>
-          </a:prstGeom>
-        </p:spPr>
-        <p:style>
-          <a:lnRef idx="2">
-            <a:schemeClr val="accent1">
-              <a:shade val="50000"/>
-            </a:schemeClr>
-          </a:lnRef>
-          <a:fillRef idx="1">
-            <a:schemeClr val="accent1"/>
-          </a:fillRef>
-          <a:effectRef idx="0">
-            <a:schemeClr val="accent1"/>
-          </a:effectRef>
-          <a:fontRef idx="minor">
-            <a:schemeClr val="lt1"/>
-          </a:fontRef>
-        </p:style>
-        <p:txBody>
-          <a:bodyPr rtlCol="0" anchor="ctr"/>
-          <a:lstStyle/>
-          <a:p>
-            <a:pPr algn="ctr"/>
-            <a:r>
-              <a:rPr lang="en-US" b="1" dirty="0" err="1"/>
-              <a:t>Observ</a:t>
-            </a:r>
-            <a:r>
-              <a:rPr lang="en-US" b="1" dirty="0"/>
-              <a:t> Logs/Metrics</a:t>
-            </a:r>
-          </a:p>
-          <a:p>
-            <a:pPr algn="ctr"/>
-            <a:endParaRPr lang="en-US" dirty="0"/>
-          </a:p>
-          <a:p>
-            <a:pPr algn="ctr"/>
-            <a:r>
-              <a:rPr lang="en-US" dirty="0" err="1"/>
-              <a:t>Eth_protocol</a:t>
-            </a:r>
-            <a:r>
-              <a:rPr lang="en-US" dirty="0"/>
-              <a:t>, </a:t>
-            </a:r>
-            <a:r>
-              <a:rPr lang="en-US" dirty="0" err="1"/>
-              <a:t>Src_Mac</a:t>
-            </a:r>
-            <a:r>
-              <a:rPr lang="en-US" dirty="0"/>
-              <a:t>, </a:t>
-            </a:r>
-            <a:r>
-              <a:rPr lang="en-US" dirty="0" err="1"/>
-              <a:t>Dst_Mac</a:t>
-            </a:r>
-            <a:r>
-              <a:rPr lang="en-US" dirty="0"/>
-              <a:t>, </a:t>
-            </a:r>
-            <a:r>
-              <a:rPr lang="en-US" dirty="0" err="1"/>
-              <a:t>Src_IP</a:t>
-            </a:r>
-            <a:r>
-              <a:rPr lang="en-US" dirty="0"/>
-              <a:t>, </a:t>
-            </a:r>
-            <a:r>
-              <a:rPr lang="en-US" dirty="0" err="1"/>
-              <a:t>Dest_IP</a:t>
-            </a:r>
-            <a:r>
-              <a:rPr lang="en-US" dirty="0"/>
-              <a:t>, </a:t>
-            </a:r>
-            <a:r>
-              <a:rPr lang="en-US" dirty="0" err="1"/>
-              <a:t>Src_Port</a:t>
-            </a:r>
-            <a:r>
-              <a:rPr lang="en-US" dirty="0"/>
-              <a:t>, </a:t>
-            </a:r>
-            <a:r>
-              <a:rPr lang="en-US" dirty="0" err="1"/>
-              <a:t>Dst_port</a:t>
-            </a:r>
-            <a:r>
-              <a:rPr lang="en-US" dirty="0"/>
-              <a:t>, Protocol =&gt;</a:t>
-            </a:r>
-          </a:p>
-          <a:p>
-            <a:pPr algn="ctr"/>
-            <a:r>
-              <a:rPr lang="en-US" dirty="0">
-                <a:ln>
-                  <a:solidFill>
-                    <a:schemeClr val="bg1"/>
-                  </a:solidFill>
-                </a:ln>
-                <a:solidFill>
-                  <a:srgbClr val="FFFF00"/>
-                </a:solidFill>
-              </a:rPr>
-              <a:t>Packets, Bytes, </a:t>
-            </a:r>
-            <a:r>
-              <a:rPr lang="en-US" dirty="0" err="1">
-                <a:ln>
-                  <a:solidFill>
-                    <a:schemeClr val="bg1"/>
-                  </a:solidFill>
-                </a:ln>
-                <a:solidFill>
-                  <a:srgbClr val="FFFF00"/>
-                </a:solidFill>
-              </a:rPr>
-              <a:t>FlowStartTime</a:t>
-            </a:r>
-            <a:r>
-              <a:rPr lang="en-US" dirty="0">
-                <a:ln>
-                  <a:solidFill>
-                    <a:schemeClr val="bg1"/>
-                  </a:solidFill>
-                </a:ln>
-                <a:solidFill>
-                  <a:srgbClr val="FFFF00"/>
-                </a:solidFill>
-              </a:rPr>
-              <a:t>, </a:t>
-            </a:r>
-            <a:r>
-              <a:rPr lang="en-US" dirty="0" err="1">
-                <a:ln>
-                  <a:solidFill>
-                    <a:schemeClr val="bg1"/>
-                  </a:solidFill>
-                </a:ln>
-                <a:solidFill>
-                  <a:srgbClr val="FFFF00"/>
-                </a:solidFill>
-              </a:rPr>
-              <a:t>FlowEndTime</a:t>
-            </a:r>
-            <a:endParaRPr lang="en-US" dirty="0">
-              <a:ln>
-                <a:solidFill>
-                  <a:schemeClr val="bg1"/>
-                </a:solidFill>
-              </a:ln>
-              <a:solidFill>
-                <a:srgbClr val="FFFF00"/>
-              </a:solidFill>
-            </a:endParaRPr>
-          </a:p>
-        </p:txBody>
-      </p:sp>
-      <p:sp>
-        <p:nvSpPr>
-          <p:cNvPr id="13" name="TextBox 12">
-            <a:extLst>
-              <a:ext uri="{FF2B5EF4-FFF2-40B4-BE49-F238E27FC236}">
-                <a16:creationId xmlns:a16="http://schemas.microsoft.com/office/drawing/2014/main" id="{27485B32-7518-4148-6058-1913D416CA21}"/>
-              </a:ext>
-            </a:extLst>
-          </p:cNvPr>
-          <p:cNvSpPr txBox="1"/>
-          <p:nvPr/>
-        </p:nvSpPr>
-        <p:spPr>
-          <a:xfrm>
-            <a:off x="828313" y="1897132"/>
-            <a:ext cx="2046714" cy="1477328"/>
-          </a:xfrm>
-          <a:prstGeom prst="rect">
-            <a:avLst/>
-          </a:prstGeom>
-          <a:noFill/>
-        </p:spPr>
-        <p:txBody>
-          <a:bodyPr wrap="none" rtlCol="0">
-            <a:spAutoFit/>
-          </a:bodyPr>
-          <a:lstStyle/>
-          <a:p>
-            <a:r>
-              <a:rPr lang="en-US" dirty="0"/>
-              <a:t>100M (64B packets)</a:t>
-            </a:r>
-          </a:p>
-          <a:p>
-            <a:r>
-              <a:rPr lang="en-US" dirty="0"/>
-              <a:t>4.7 Mpps</a:t>
-            </a:r>
-          </a:p>
-          <a:p>
-            <a:endParaRPr lang="en-US" dirty="0"/>
-          </a:p>
-          <a:p>
-            <a:r>
-              <a:rPr lang="en-US" dirty="0"/>
-              <a:t>40 Flows:</a:t>
-            </a:r>
-          </a:p>
-          <a:p>
-            <a:r>
-              <a:rPr lang="en-US" dirty="0"/>
-              <a:t>1 Flow/Thread</a:t>
+              <a:t> agent”</a:t>
             </a:r>
           </a:p>
         </p:txBody>
@@ -8362,10 +8402,370 @@
           </a:p>
         </p:txBody>
       </p:sp>
+      <p:sp>
+        <p:nvSpPr>
+          <p:cNvPr id="19" name="TextBox 18">
+            <a:extLst>
+              <a:ext uri="{FF2B5EF4-FFF2-40B4-BE49-F238E27FC236}">
+                <a16:creationId xmlns:a16="http://schemas.microsoft.com/office/drawing/2014/main" id="{1014CECC-B639-0525-DEC7-3D9EE0DF26E3}"/>
+              </a:ext>
+            </a:extLst>
+          </p:cNvPr>
+          <p:cNvSpPr txBox="1"/>
+          <p:nvPr/>
+        </p:nvSpPr>
+        <p:spPr>
+          <a:xfrm>
+            <a:off x="427320" y="1823407"/>
+            <a:ext cx="2534540" cy="2031325"/>
+          </a:xfrm>
+          <a:prstGeom prst="rect">
+            <a:avLst/>
+          </a:prstGeom>
+          <a:noFill/>
+        </p:spPr>
+        <p:txBody>
+          <a:bodyPr wrap="none" rtlCol="0">
+            <a:spAutoFit/>
+          </a:bodyPr>
+          <a:lstStyle/>
+          <a:p>
+            <a:r>
+              <a:rPr lang="en-US" dirty="0">
+                <a:solidFill>
+                  <a:srgbClr val="FF0000"/>
+                </a:solidFill>
+              </a:rPr>
+              <a:t>Total Packets </a:t>
+            </a:r>
+            <a:r>
+              <a:rPr lang="en-US" dirty="0"/>
+              <a:t>= 100 M</a:t>
+            </a:r>
+          </a:p>
+          <a:p>
+            <a:r>
+              <a:rPr lang="en-US" dirty="0"/>
+              <a:t>        (75B packets)</a:t>
+            </a:r>
+          </a:p>
+          <a:p>
+            <a:endParaRPr lang="en-US" dirty="0"/>
+          </a:p>
+          <a:p>
+            <a:r>
+              <a:rPr lang="en-US" dirty="0">
+                <a:solidFill>
+                  <a:srgbClr val="FF0000"/>
+                </a:solidFill>
+              </a:rPr>
+              <a:t>Packet Rate </a:t>
+            </a:r>
+            <a:r>
+              <a:rPr lang="en-US" dirty="0"/>
+              <a:t>= ~4.7 Mpps </a:t>
+            </a:r>
+          </a:p>
+          <a:p>
+            <a:endParaRPr lang="en-US" dirty="0"/>
+          </a:p>
+          <a:p>
+            <a:r>
+              <a:rPr lang="en-US" dirty="0">
+                <a:solidFill>
+                  <a:srgbClr val="FF0000"/>
+                </a:solidFill>
+              </a:rPr>
+              <a:t>Total threads </a:t>
+            </a:r>
+            <a:r>
+              <a:rPr lang="en-US" dirty="0"/>
+              <a:t>= 40</a:t>
+            </a:r>
+          </a:p>
+          <a:p>
+            <a:r>
+              <a:rPr lang="en-US" dirty="0"/>
+              <a:t>(1 Flow per thread)</a:t>
+            </a:r>
+          </a:p>
+        </p:txBody>
+      </p:sp>
+      <p:pic>
+        <p:nvPicPr>
+          <p:cNvPr id="21" name="Graphic 20" descr="Magnifying glass with solid fill">
+            <a:extLst>
+              <a:ext uri="{FF2B5EF4-FFF2-40B4-BE49-F238E27FC236}">
+                <a16:creationId xmlns:a16="http://schemas.microsoft.com/office/drawing/2014/main" id="{56B1CB04-BCEA-12D3-FCC3-DDE8F435A7B4}"/>
+              </a:ext>
+            </a:extLst>
+          </p:cNvPr>
+          <p:cNvPicPr>
+            <a:picLocks noChangeAspect="1"/>
+          </p:cNvPicPr>
+          <p:nvPr/>
+        </p:nvPicPr>
+        <p:blipFill>
+          <a:blip r:embed="rId2">
+            <a:extLst>
+              <a:ext uri="{96DAC541-7B7A-43D3-8B79-37D633B846F1}">
+                <asvg:svgBlip xmlns:asvg="http://schemas.microsoft.com/office/drawing/2016/SVG/main" r:embed="rId3"/>
+              </a:ext>
+            </a:extLst>
+          </a:blip>
+          <a:stretch>
+            <a:fillRect/>
+          </a:stretch>
+        </p:blipFill>
+        <p:spPr>
+          <a:xfrm>
+            <a:off x="4314027" y="3626132"/>
+            <a:ext cx="457200" cy="457200"/>
+          </a:xfrm>
+          <a:prstGeom prst="rect">
+            <a:avLst/>
+          </a:prstGeom>
+        </p:spPr>
+      </p:pic>
+      <p:sp>
+        <p:nvSpPr>
+          <p:cNvPr id="22" name="Snip and Round Single Corner of Rectangle 21">
+            <a:extLst>
+              <a:ext uri="{FF2B5EF4-FFF2-40B4-BE49-F238E27FC236}">
+                <a16:creationId xmlns:a16="http://schemas.microsoft.com/office/drawing/2014/main" id="{2B1B186E-125E-FB62-F395-3728968A9CBB}"/>
+              </a:ext>
+            </a:extLst>
+          </p:cNvPr>
+          <p:cNvSpPr/>
+          <p:nvPr/>
+        </p:nvSpPr>
+        <p:spPr>
+          <a:xfrm>
+            <a:off x="28775" y="4083332"/>
+            <a:ext cx="2634912" cy="2774668"/>
+          </a:xfrm>
+          <a:prstGeom prst="snipRoundRect">
+            <a:avLst/>
+          </a:prstGeom>
+          <a:solidFill>
+            <a:schemeClr val="accent2">
+              <a:lumMod val="60000"/>
+              <a:lumOff val="40000"/>
+            </a:schemeClr>
+          </a:solidFill>
+          <a:ln>
+            <a:solidFill>
+              <a:srgbClr val="0070C0"/>
+            </a:solidFill>
+          </a:ln>
+        </p:spPr>
+        <p:style>
+          <a:lnRef idx="2">
+            <a:schemeClr val="accent1">
+              <a:shade val="50000"/>
+            </a:schemeClr>
+          </a:lnRef>
+          <a:fillRef idx="1">
+            <a:schemeClr val="accent1"/>
+          </a:fillRef>
+          <a:effectRef idx="0">
+            <a:schemeClr val="accent1"/>
+          </a:effectRef>
+          <a:fontRef idx="minor">
+            <a:schemeClr val="lt1"/>
+          </a:fontRef>
+        </p:style>
+        <p:txBody>
+          <a:bodyPr rtlCol="0" anchor="ctr"/>
+          <a:lstStyle/>
+          <a:p>
+            <a:pPr algn="ctr"/>
+            <a:r>
+              <a:rPr lang="en-US" b="1" dirty="0" err="1">
+                <a:solidFill>
+                  <a:schemeClr val="tx1"/>
+                </a:solidFill>
+              </a:rPr>
+              <a:t>Observ</a:t>
+            </a:r>
+            <a:r>
+              <a:rPr lang="en-US" b="1" dirty="0">
+                <a:solidFill>
+                  <a:schemeClr val="tx1"/>
+                </a:solidFill>
+              </a:rPr>
+              <a:t> Logs/Metrics</a:t>
+            </a:r>
+          </a:p>
+          <a:p>
+            <a:pPr algn="ctr"/>
+            <a:endParaRPr lang="en-US" dirty="0">
+              <a:solidFill>
+                <a:schemeClr val="tx1"/>
+              </a:solidFill>
+            </a:endParaRPr>
+          </a:p>
+          <a:p>
+            <a:pPr algn="ctr"/>
+            <a:r>
+              <a:rPr lang="en-US" dirty="0" err="1">
+                <a:solidFill>
+                  <a:schemeClr val="tx1"/>
+                </a:solidFill>
+              </a:rPr>
+              <a:t>Eth_protocol</a:t>
+            </a:r>
+            <a:r>
+              <a:rPr lang="en-US" dirty="0">
+                <a:solidFill>
+                  <a:schemeClr val="tx1"/>
+                </a:solidFill>
+              </a:rPr>
+              <a:t>, </a:t>
+            </a:r>
+            <a:r>
+              <a:rPr lang="en-US" dirty="0" err="1">
+                <a:solidFill>
+                  <a:schemeClr val="tx1"/>
+                </a:solidFill>
+              </a:rPr>
+              <a:t>Src_Mac</a:t>
+            </a:r>
+            <a:r>
+              <a:rPr lang="en-US" dirty="0">
+                <a:solidFill>
+                  <a:schemeClr val="tx1"/>
+                </a:solidFill>
+              </a:rPr>
+              <a:t>, </a:t>
+            </a:r>
+            <a:r>
+              <a:rPr lang="en-US" dirty="0" err="1">
+                <a:solidFill>
+                  <a:schemeClr val="tx1"/>
+                </a:solidFill>
+              </a:rPr>
+              <a:t>Dst_Mac</a:t>
+            </a:r>
+            <a:r>
+              <a:rPr lang="en-US" dirty="0">
+                <a:solidFill>
+                  <a:schemeClr val="tx1"/>
+                </a:solidFill>
+              </a:rPr>
+              <a:t>, </a:t>
+            </a:r>
+            <a:r>
+              <a:rPr lang="en-US" dirty="0" err="1">
+                <a:solidFill>
+                  <a:schemeClr val="tx1"/>
+                </a:solidFill>
+              </a:rPr>
+              <a:t>Src_IP</a:t>
+            </a:r>
+            <a:r>
+              <a:rPr lang="en-US" dirty="0">
+                <a:solidFill>
+                  <a:schemeClr val="tx1"/>
+                </a:solidFill>
+              </a:rPr>
+              <a:t>, </a:t>
+            </a:r>
+            <a:r>
+              <a:rPr lang="en-US" dirty="0" err="1">
+                <a:solidFill>
+                  <a:schemeClr val="tx1"/>
+                </a:solidFill>
+              </a:rPr>
+              <a:t>Dest_IP</a:t>
+            </a:r>
+            <a:r>
+              <a:rPr lang="en-US" dirty="0">
+                <a:solidFill>
+                  <a:schemeClr val="tx1"/>
+                </a:solidFill>
+              </a:rPr>
+              <a:t>, </a:t>
+            </a:r>
+            <a:r>
+              <a:rPr lang="en-US" dirty="0" err="1">
+                <a:solidFill>
+                  <a:schemeClr val="tx1"/>
+                </a:solidFill>
+              </a:rPr>
+              <a:t>Src_Port</a:t>
+            </a:r>
+            <a:r>
+              <a:rPr lang="en-US" dirty="0">
+                <a:solidFill>
+                  <a:schemeClr val="tx1"/>
+                </a:solidFill>
+              </a:rPr>
+              <a:t>, </a:t>
+            </a:r>
+            <a:r>
+              <a:rPr lang="en-US" dirty="0" err="1">
+                <a:solidFill>
+                  <a:schemeClr val="tx1"/>
+                </a:solidFill>
+              </a:rPr>
+              <a:t>Dst_port</a:t>
+            </a:r>
+            <a:r>
+              <a:rPr lang="en-US" dirty="0">
+                <a:solidFill>
+                  <a:schemeClr val="tx1"/>
+                </a:solidFill>
+              </a:rPr>
+              <a:t>, Protocol =&gt; </a:t>
+            </a:r>
+          </a:p>
+          <a:p>
+            <a:pPr algn="ctr"/>
+            <a:r>
+              <a:rPr lang="en-US" b="1" dirty="0">
+                <a:solidFill>
+                  <a:srgbClr val="002060"/>
+                </a:solidFill>
+              </a:rPr>
+              <a:t>Packets, Bytes, </a:t>
+            </a:r>
+            <a:r>
+              <a:rPr lang="en-US" b="1" dirty="0" err="1">
+                <a:solidFill>
+                  <a:srgbClr val="002060"/>
+                </a:solidFill>
+              </a:rPr>
+              <a:t>FlowStartTime</a:t>
+            </a:r>
+            <a:r>
+              <a:rPr lang="en-US" b="1" dirty="0">
+                <a:solidFill>
+                  <a:srgbClr val="002060"/>
+                </a:solidFill>
+              </a:rPr>
+              <a:t>, </a:t>
+            </a:r>
+            <a:r>
+              <a:rPr lang="en-US" b="1" dirty="0" err="1">
+                <a:solidFill>
+                  <a:srgbClr val="002060"/>
+                </a:solidFill>
+              </a:rPr>
+              <a:t>FlowEndTime</a:t>
+            </a:r>
+            <a:endParaRPr lang="en-US" b="1" dirty="0">
+              <a:solidFill>
+                <a:srgbClr val="002060"/>
+              </a:solidFill>
+            </a:endParaRPr>
+          </a:p>
+        </p:txBody>
+      </p:sp>
     </p:spTree>
     <p:extLst>
       <p:ext uri="{BB962C8B-B14F-4D97-AF65-F5344CB8AC3E}">
-        <p14:creationId xmlns:p14="http://schemas.microsoft.com/office/powerpoint/2010/main" val="51332045"/>
+        <p14:creationId xmlns:p14="http://schemas.microsoft.com/office/powerpoint/2010/main" val="2913128175"/>
       </p:ext>
     </p:extLst>
   </p:cSld>
@@ -11317,41 +11717,6 @@
           </a:graphicData>
         </a:graphic>
       </p:graphicFrame>
-      <p:sp>
-        <p:nvSpPr>
-          <p:cNvPr id="5" name="TextBox 4">
-            <a:extLst>
-              <a:ext uri="{FF2B5EF4-FFF2-40B4-BE49-F238E27FC236}">
-                <a16:creationId xmlns:a16="http://schemas.microsoft.com/office/drawing/2014/main" id="{68EF7A15-501B-4D1E-E48B-E200C2628A46}"/>
-              </a:ext>
-            </a:extLst>
-          </p:cNvPr>
-          <p:cNvSpPr txBox="1"/>
-          <p:nvPr/>
-        </p:nvSpPr>
-        <p:spPr>
-          <a:xfrm>
-            <a:off x="1510748" y="1506022"/>
-            <a:ext cx="7244932" cy="369332"/>
-          </a:xfrm>
-          <a:prstGeom prst="rect">
-            <a:avLst/>
-          </a:prstGeom>
-          <a:noFill/>
-        </p:spPr>
-        <p:txBody>
-          <a:bodyPr wrap="none" rtlCol="0">
-            <a:spAutoFit/>
-          </a:bodyPr>
-          <a:lstStyle/>
-          <a:p>
-            <a:r>
-              <a:rPr lang="en-US" dirty="0"/>
-              <a:t>5 Runs : On each run, 100Million packets are sent out through the interface</a:t>
-            </a:r>
-          </a:p>
-        </p:txBody>
-      </p:sp>
       <p:graphicFrame>
         <p:nvGraphicFramePr>
           <p:cNvPr id="6" name="Chart 5">
@@ -11431,6 +11796,10 @@
           <a:bodyPr/>
           <a:lstStyle/>
           <a:p>
+            <a:r>
+              <a:rPr lang="en-US" dirty="0"/>
+              <a:t>Appendix 1: </a:t>
+            </a:r>
             <a:r>
               <a:rPr lang="en-US" dirty="0" err="1"/>
               <a:t>Pmacctd</a:t>

</xml_diff>

<commit_message>
Add TCP measurements (#53)
</commit_message>
<xml_diff>
--- a/docs/measurements.pptx
+++ b/docs/measurements.pptx
@@ -10,7 +10,9 @@
     <p:sldId id="264" r:id="rId4"/>
     <p:sldId id="263" r:id="rId5"/>
     <p:sldId id="265" r:id="rId6"/>
-    <p:sldId id="261" r:id="rId7"/>
+    <p:sldId id="266" r:id="rId7"/>
+    <p:sldId id="267" r:id="rId8"/>
+    <p:sldId id="261" r:id="rId9"/>
   </p:sldIdLst>
   <p:sldSz cx="12192000" cy="6858000"/>
   <p:notesSz cx="6858000" cy="9144000"/>
@@ -1095,7 +1097,7 @@
           <a:p>
             <a:fld id="{861A233C-30F2-024D-AC2A-712D8D9BEB28}" type="datetimeFigureOut">
               <a:rPr lang="en-US" smtClean="0"/>
-              <a:t>9/7/22</a:t>
+              <a:t>9/8/22</a:t>
             </a:fld>
             <a:endParaRPr lang="en-US"/>
           </a:p>
@@ -1295,7 +1297,7 @@
           <a:p>
             <a:fld id="{861A233C-30F2-024D-AC2A-712D8D9BEB28}" type="datetimeFigureOut">
               <a:rPr lang="en-US" smtClean="0"/>
-              <a:t>9/7/22</a:t>
+              <a:t>9/8/22</a:t>
             </a:fld>
             <a:endParaRPr lang="en-US"/>
           </a:p>
@@ -1505,7 +1507,7 @@
           <a:p>
             <a:fld id="{861A233C-30F2-024D-AC2A-712D8D9BEB28}" type="datetimeFigureOut">
               <a:rPr lang="en-US" smtClean="0"/>
-              <a:t>9/7/22</a:t>
+              <a:t>9/8/22</a:t>
             </a:fld>
             <a:endParaRPr lang="en-US"/>
           </a:p>
@@ -1705,7 +1707,7 @@
           <a:p>
             <a:fld id="{861A233C-30F2-024D-AC2A-712D8D9BEB28}" type="datetimeFigureOut">
               <a:rPr lang="en-US" smtClean="0"/>
-              <a:t>9/7/22</a:t>
+              <a:t>9/8/22</a:t>
             </a:fld>
             <a:endParaRPr lang="en-US"/>
           </a:p>
@@ -1981,7 +1983,7 @@
           <a:p>
             <a:fld id="{861A233C-30F2-024D-AC2A-712D8D9BEB28}" type="datetimeFigureOut">
               <a:rPr lang="en-US" smtClean="0"/>
-              <a:t>9/7/22</a:t>
+              <a:t>9/8/22</a:t>
             </a:fld>
             <a:endParaRPr lang="en-US"/>
           </a:p>
@@ -2249,7 +2251,7 @@
           <a:p>
             <a:fld id="{861A233C-30F2-024D-AC2A-712D8D9BEB28}" type="datetimeFigureOut">
               <a:rPr lang="en-US" smtClean="0"/>
-              <a:t>9/7/22</a:t>
+              <a:t>9/8/22</a:t>
             </a:fld>
             <a:endParaRPr lang="en-US"/>
           </a:p>
@@ -2664,7 +2666,7 @@
           <a:p>
             <a:fld id="{861A233C-30F2-024D-AC2A-712D8D9BEB28}" type="datetimeFigureOut">
               <a:rPr lang="en-US" smtClean="0"/>
-              <a:t>9/7/22</a:t>
+              <a:t>9/8/22</a:t>
             </a:fld>
             <a:endParaRPr lang="en-US"/>
           </a:p>
@@ -2806,7 +2808,7 @@
           <a:p>
             <a:fld id="{861A233C-30F2-024D-AC2A-712D8D9BEB28}" type="datetimeFigureOut">
               <a:rPr lang="en-US" smtClean="0"/>
-              <a:t>9/7/22</a:t>
+              <a:t>9/8/22</a:t>
             </a:fld>
             <a:endParaRPr lang="en-US"/>
           </a:p>
@@ -2919,7 +2921,7 @@
           <a:p>
             <a:fld id="{861A233C-30F2-024D-AC2A-712D8D9BEB28}" type="datetimeFigureOut">
               <a:rPr lang="en-US" smtClean="0"/>
-              <a:t>9/7/22</a:t>
+              <a:t>9/8/22</a:t>
             </a:fld>
             <a:endParaRPr lang="en-US"/>
           </a:p>
@@ -3232,7 +3234,7 @@
           <a:p>
             <a:fld id="{861A233C-30F2-024D-AC2A-712D8D9BEB28}" type="datetimeFigureOut">
               <a:rPr lang="en-US" smtClean="0"/>
-              <a:t>9/7/22</a:t>
+              <a:t>9/8/22</a:t>
             </a:fld>
             <a:endParaRPr lang="en-US"/>
           </a:p>
@@ -3521,7 +3523,7 @@
           <a:p>
             <a:fld id="{861A233C-30F2-024D-AC2A-712D8D9BEB28}" type="datetimeFigureOut">
               <a:rPr lang="en-US" smtClean="0"/>
-              <a:t>9/7/22</a:t>
+              <a:t>9/8/22</a:t>
             </a:fld>
             <a:endParaRPr lang="en-US"/>
           </a:p>
@@ -3764,7 +3766,7 @@
           <a:p>
             <a:fld id="{861A233C-30F2-024D-AC2A-712D8D9BEB28}" type="datetimeFigureOut">
               <a:rPr lang="en-US" smtClean="0"/>
-              <a:t>9/7/22</a:t>
+              <a:t>9/8/22</a:t>
             </a:fld>
             <a:endParaRPr lang="en-US"/>
           </a:p>
@@ -11314,6 +11316,3019 @@
           <p:cNvPr id="2" name="Title 1">
             <a:extLst>
               <a:ext uri="{FF2B5EF4-FFF2-40B4-BE49-F238E27FC236}">
+                <a16:creationId xmlns:a16="http://schemas.microsoft.com/office/drawing/2014/main" id="{E1C70785-AFC0-BA72-58CC-72CEAA76EDDA}"/>
+              </a:ext>
+            </a:extLst>
+          </p:cNvPr>
+          <p:cNvSpPr>
+            <a:spLocks noGrp="1"/>
+          </p:cNvSpPr>
+          <p:nvPr>
+            <p:ph type="title"/>
+          </p:nvPr>
+        </p:nvSpPr>
+        <p:spPr/>
+        <p:txBody>
+          <a:bodyPr/>
+          <a:lstStyle/>
+          <a:p>
+            <a:r>
+              <a:rPr lang="en-US" dirty="0"/>
+              <a:t>Testbed Setup - TCP</a:t>
+            </a:r>
+          </a:p>
+        </p:txBody>
+      </p:sp>
+      <p:sp>
+        <p:nvSpPr>
+          <p:cNvPr id="4" name="Rounded Rectangle 3">
+            <a:extLst>
+              <a:ext uri="{FF2B5EF4-FFF2-40B4-BE49-F238E27FC236}">
+                <a16:creationId xmlns:a16="http://schemas.microsoft.com/office/drawing/2014/main" id="{20870BD4-D056-241C-2F04-1B9072CD6E67}"/>
+              </a:ext>
+            </a:extLst>
+          </p:cNvPr>
+          <p:cNvSpPr/>
+          <p:nvPr/>
+        </p:nvSpPr>
+        <p:spPr>
+          <a:xfrm>
+            <a:off x="2961861" y="2057400"/>
+            <a:ext cx="1570382" cy="2166730"/>
+          </a:xfrm>
+          <a:prstGeom prst="roundRect">
+            <a:avLst/>
+          </a:prstGeom>
+        </p:spPr>
+        <p:style>
+          <a:lnRef idx="2">
+            <a:schemeClr val="accent1">
+              <a:shade val="50000"/>
+            </a:schemeClr>
+          </a:lnRef>
+          <a:fillRef idx="1">
+            <a:schemeClr val="accent1"/>
+          </a:fillRef>
+          <a:effectRef idx="0">
+            <a:schemeClr val="accent1"/>
+          </a:effectRef>
+          <a:fontRef idx="minor">
+            <a:schemeClr val="lt1"/>
+          </a:fontRef>
+        </p:style>
+        <p:txBody>
+          <a:bodyPr rtlCol="0" anchor="ctr"/>
+          <a:lstStyle/>
+          <a:p>
+            <a:pPr algn="ctr"/>
+            <a:endParaRPr lang="en-US" dirty="0"/>
+          </a:p>
+        </p:txBody>
+      </p:sp>
+      <p:sp>
+        <p:nvSpPr>
+          <p:cNvPr id="5" name="Rounded Rectangle 4">
+            <a:extLst>
+              <a:ext uri="{FF2B5EF4-FFF2-40B4-BE49-F238E27FC236}">
+                <a16:creationId xmlns:a16="http://schemas.microsoft.com/office/drawing/2014/main" id="{84F558E6-4E35-A33F-DB76-EFA2B7479B4D}"/>
+              </a:ext>
+            </a:extLst>
+          </p:cNvPr>
+          <p:cNvSpPr/>
+          <p:nvPr/>
+        </p:nvSpPr>
+        <p:spPr>
+          <a:xfrm>
+            <a:off x="8054009" y="2057400"/>
+            <a:ext cx="1570382" cy="2166730"/>
+          </a:xfrm>
+          <a:prstGeom prst="roundRect">
+            <a:avLst/>
+          </a:prstGeom>
+        </p:spPr>
+        <p:style>
+          <a:lnRef idx="2">
+            <a:schemeClr val="accent1">
+              <a:shade val="50000"/>
+            </a:schemeClr>
+          </a:lnRef>
+          <a:fillRef idx="1">
+            <a:schemeClr val="accent1"/>
+          </a:fillRef>
+          <a:effectRef idx="0">
+            <a:schemeClr val="accent1"/>
+          </a:effectRef>
+          <a:fontRef idx="minor">
+            <a:schemeClr val="lt1"/>
+          </a:fontRef>
+        </p:style>
+        <p:txBody>
+          <a:bodyPr rtlCol="0" anchor="ctr"/>
+          <a:lstStyle/>
+          <a:p>
+            <a:pPr algn="ctr"/>
+            <a:endParaRPr lang="en-US" dirty="0"/>
+          </a:p>
+        </p:txBody>
+      </p:sp>
+      <p:sp>
+        <p:nvSpPr>
+          <p:cNvPr id="8" name="Rounded Rectangle 7">
+            <a:extLst>
+              <a:ext uri="{FF2B5EF4-FFF2-40B4-BE49-F238E27FC236}">
+                <a16:creationId xmlns:a16="http://schemas.microsoft.com/office/drawing/2014/main" id="{00BFD4D1-B998-4C77-8861-4D2B2C0CFF50}"/>
+              </a:ext>
+            </a:extLst>
+          </p:cNvPr>
+          <p:cNvSpPr/>
+          <p:nvPr/>
+        </p:nvSpPr>
+        <p:spPr>
+          <a:xfrm>
+            <a:off x="8297517" y="2425147"/>
+            <a:ext cx="1083365" cy="586409"/>
+          </a:xfrm>
+          <a:prstGeom prst="roundRect">
+            <a:avLst/>
+          </a:prstGeom>
+        </p:spPr>
+        <p:style>
+          <a:lnRef idx="2">
+            <a:schemeClr val="accent2">
+              <a:shade val="50000"/>
+            </a:schemeClr>
+          </a:lnRef>
+          <a:fillRef idx="1">
+            <a:schemeClr val="accent2"/>
+          </a:fillRef>
+          <a:effectRef idx="0">
+            <a:schemeClr val="accent2"/>
+          </a:effectRef>
+          <a:fontRef idx="minor">
+            <a:schemeClr val="lt1"/>
+          </a:fontRef>
+        </p:style>
+        <p:txBody>
+          <a:bodyPr rtlCol="0" anchor="ctr"/>
+          <a:lstStyle/>
+          <a:p>
+            <a:pPr algn="ctr"/>
+            <a:r>
+              <a:rPr lang="en-US" dirty="0"/>
+              <a:t>TCP</a:t>
+            </a:r>
+          </a:p>
+          <a:p>
+            <a:pPr algn="ctr"/>
+            <a:r>
+              <a:rPr lang="en-US" dirty="0"/>
+              <a:t>Receiver</a:t>
+            </a:r>
+          </a:p>
+        </p:txBody>
+      </p:sp>
+      <p:cxnSp>
+        <p:nvCxnSpPr>
+          <p:cNvPr id="10" name="Elbow Connector 9">
+            <a:extLst>
+              <a:ext uri="{FF2B5EF4-FFF2-40B4-BE49-F238E27FC236}">
+                <a16:creationId xmlns:a16="http://schemas.microsoft.com/office/drawing/2014/main" id="{0D3681F4-3E5A-104A-160C-69A7D8B4E23A}"/>
+              </a:ext>
+            </a:extLst>
+          </p:cNvPr>
+          <p:cNvCxnSpPr>
+            <a:cxnSpLocks/>
+          </p:cNvCxnSpPr>
+          <p:nvPr/>
+        </p:nvCxnSpPr>
+        <p:spPr>
+          <a:xfrm>
+            <a:off x="3322238" y="2784857"/>
+            <a:ext cx="5092149" cy="1461052"/>
+          </a:xfrm>
+          <a:prstGeom prst="bentConnector4">
+            <a:avLst>
+              <a:gd name="adj1" fmla="val 130"/>
+              <a:gd name="adj2" fmla="val 133333"/>
+            </a:avLst>
+          </a:prstGeom>
+          <a:ln>
+            <a:tailEnd type="triangle"/>
+          </a:ln>
+        </p:spPr>
+        <p:style>
+          <a:lnRef idx="3">
+            <a:schemeClr val="dk1"/>
+          </a:lnRef>
+          <a:fillRef idx="0">
+            <a:schemeClr val="dk1"/>
+          </a:fillRef>
+          <a:effectRef idx="2">
+            <a:schemeClr val="dk1"/>
+          </a:effectRef>
+          <a:fontRef idx="minor">
+            <a:schemeClr val="tx1"/>
+          </a:fontRef>
+        </p:style>
+      </p:cxnSp>
+      <p:sp>
+        <p:nvSpPr>
+          <p:cNvPr id="7" name="Rounded Rectangle 6">
+            <a:extLst>
+              <a:ext uri="{FF2B5EF4-FFF2-40B4-BE49-F238E27FC236}">
+                <a16:creationId xmlns:a16="http://schemas.microsoft.com/office/drawing/2014/main" id="{565E16E6-B267-49A7-B072-E7DD6DF0641A}"/>
+              </a:ext>
+            </a:extLst>
+          </p:cNvPr>
+          <p:cNvSpPr/>
+          <p:nvPr/>
+        </p:nvSpPr>
+        <p:spPr>
+          <a:xfrm>
+            <a:off x="8383619" y="3559666"/>
+            <a:ext cx="929306" cy="586409"/>
+          </a:xfrm>
+          <a:prstGeom prst="roundRect">
+            <a:avLst/>
+          </a:prstGeom>
+        </p:spPr>
+        <p:style>
+          <a:lnRef idx="1">
+            <a:schemeClr val="accent6"/>
+          </a:lnRef>
+          <a:fillRef idx="3">
+            <a:schemeClr val="accent6"/>
+          </a:fillRef>
+          <a:effectRef idx="2">
+            <a:schemeClr val="accent6"/>
+          </a:effectRef>
+          <a:fontRef idx="minor">
+            <a:schemeClr val="lt1"/>
+          </a:fontRef>
+        </p:style>
+        <p:txBody>
+          <a:bodyPr rtlCol="0" anchor="ctr"/>
+          <a:lstStyle/>
+          <a:p>
+            <a:pPr algn="ctr"/>
+            <a:r>
+              <a:rPr lang="en-US" dirty="0" err="1"/>
+              <a:t>Observ</a:t>
+            </a:r>
+            <a:r>
+              <a:rPr lang="en-US" dirty="0"/>
+              <a:t> Agent</a:t>
+            </a:r>
+          </a:p>
+        </p:txBody>
+      </p:sp>
+      <p:sp>
+        <p:nvSpPr>
+          <p:cNvPr id="15" name="TextBox 14">
+            <a:extLst>
+              <a:ext uri="{FF2B5EF4-FFF2-40B4-BE49-F238E27FC236}">
+                <a16:creationId xmlns:a16="http://schemas.microsoft.com/office/drawing/2014/main" id="{BD9B7463-935B-6E27-5C26-C48D47CAFB70}"/>
+              </a:ext>
+            </a:extLst>
+          </p:cNvPr>
+          <p:cNvSpPr txBox="1"/>
+          <p:nvPr/>
+        </p:nvSpPr>
+        <p:spPr>
+          <a:xfrm>
+            <a:off x="3226389" y="1712466"/>
+            <a:ext cx="1011752" cy="861774"/>
+          </a:xfrm>
+          <a:prstGeom prst="rect">
+            <a:avLst/>
+          </a:prstGeom>
+          <a:noFill/>
+        </p:spPr>
+        <p:txBody>
+          <a:bodyPr wrap="none" rtlCol="0">
+            <a:spAutoFit/>
+          </a:bodyPr>
+          <a:lstStyle/>
+          <a:p>
+            <a:r>
+              <a:rPr lang="en-US" dirty="0"/>
+              <a:t>Tcnode7</a:t>
+            </a:r>
+          </a:p>
+          <a:p>
+            <a:r>
+              <a:rPr lang="en-US" sz="1400" dirty="0">
+                <a:solidFill>
+                  <a:schemeClr val="bg1"/>
+                </a:solidFill>
+              </a:rPr>
+              <a:t>Kernel 5.13</a:t>
+            </a:r>
+          </a:p>
+          <a:p>
+            <a:endParaRPr lang="en-US" dirty="0"/>
+          </a:p>
+        </p:txBody>
+      </p:sp>
+      <p:sp>
+        <p:nvSpPr>
+          <p:cNvPr id="16" name="TextBox 15">
+            <a:extLst>
+              <a:ext uri="{FF2B5EF4-FFF2-40B4-BE49-F238E27FC236}">
+                <a16:creationId xmlns:a16="http://schemas.microsoft.com/office/drawing/2014/main" id="{1C3C7934-B920-8BFB-7666-831AA237E78E}"/>
+              </a:ext>
+            </a:extLst>
+          </p:cNvPr>
+          <p:cNvSpPr txBox="1"/>
+          <p:nvPr/>
+        </p:nvSpPr>
+        <p:spPr>
+          <a:xfrm>
+            <a:off x="8361953" y="1712466"/>
+            <a:ext cx="972639" cy="861774"/>
+          </a:xfrm>
+          <a:prstGeom prst="rect">
+            <a:avLst/>
+          </a:prstGeom>
+          <a:noFill/>
+        </p:spPr>
+        <p:txBody>
+          <a:bodyPr wrap="none" rtlCol="0">
+            <a:spAutoFit/>
+          </a:bodyPr>
+          <a:lstStyle/>
+          <a:p>
+            <a:r>
+              <a:rPr lang="en-US" dirty="0"/>
+              <a:t>Tcnode6</a:t>
+            </a:r>
+          </a:p>
+          <a:p>
+            <a:r>
+              <a:rPr lang="en-US" sz="1400" dirty="0">
+                <a:solidFill>
+                  <a:schemeClr val="bg1"/>
+                </a:solidFill>
+              </a:rPr>
+              <a:t>Kernel 5.4</a:t>
+            </a:r>
+          </a:p>
+          <a:p>
+            <a:endParaRPr lang="en-US" dirty="0"/>
+          </a:p>
+        </p:txBody>
+      </p:sp>
+      <p:sp>
+        <p:nvSpPr>
+          <p:cNvPr id="17" name="TextBox 16">
+            <a:extLst>
+              <a:ext uri="{FF2B5EF4-FFF2-40B4-BE49-F238E27FC236}">
+                <a16:creationId xmlns:a16="http://schemas.microsoft.com/office/drawing/2014/main" id="{657E70B6-F98C-A53A-B422-7E643FB37619}"/>
+              </a:ext>
+            </a:extLst>
+          </p:cNvPr>
+          <p:cNvSpPr txBox="1"/>
+          <p:nvPr/>
+        </p:nvSpPr>
+        <p:spPr>
+          <a:xfrm>
+            <a:off x="3359427" y="5335702"/>
+            <a:ext cx="7003584" cy="646331"/>
+          </a:xfrm>
+          <a:prstGeom prst="rect">
+            <a:avLst/>
+          </a:prstGeom>
+          <a:noFill/>
+        </p:spPr>
+        <p:txBody>
+          <a:bodyPr wrap="none" rtlCol="0">
+            <a:spAutoFit/>
+          </a:bodyPr>
+          <a:lstStyle/>
+          <a:p>
+            <a:r>
+              <a:rPr lang="en-US" b="1" dirty="0"/>
+              <a:t>Questions?</a:t>
+            </a:r>
+          </a:p>
+          <a:p>
+            <a:pPr marL="342900" indent="-342900">
+              <a:buAutoNum type="arabicParenR"/>
+            </a:pPr>
+            <a:r>
+              <a:rPr lang="en-US" dirty="0"/>
+              <a:t>How much does “</a:t>
+            </a:r>
+            <a:r>
+              <a:rPr lang="en-US" dirty="0" err="1"/>
+              <a:t>Observ</a:t>
+            </a:r>
+            <a:r>
+              <a:rPr lang="en-US" dirty="0"/>
+              <a:t> agent” </a:t>
+            </a:r>
+            <a:r>
+              <a:rPr lang="en-US" b="1" dirty="0"/>
+              <a:t>slow down throughput </a:t>
+            </a:r>
+            <a:r>
+              <a:rPr lang="en-US" dirty="0"/>
+              <a:t>of TCP Flows</a:t>
+            </a:r>
+          </a:p>
+        </p:txBody>
+      </p:sp>
+      <p:sp>
+        <p:nvSpPr>
+          <p:cNvPr id="14" name="TextBox 13">
+            <a:extLst>
+              <a:ext uri="{FF2B5EF4-FFF2-40B4-BE49-F238E27FC236}">
+                <a16:creationId xmlns:a16="http://schemas.microsoft.com/office/drawing/2014/main" id="{327132D8-D9EE-31D8-C9A5-4BBF886D8832}"/>
+              </a:ext>
+            </a:extLst>
+          </p:cNvPr>
+          <p:cNvSpPr txBox="1"/>
+          <p:nvPr/>
+        </p:nvSpPr>
+        <p:spPr>
+          <a:xfrm>
+            <a:off x="5462431" y="4325510"/>
+            <a:ext cx="949747" cy="369332"/>
+          </a:xfrm>
+          <a:prstGeom prst="rect">
+            <a:avLst/>
+          </a:prstGeom>
+          <a:noFill/>
+        </p:spPr>
+        <p:txBody>
+          <a:bodyPr wrap="none" rtlCol="0">
+            <a:spAutoFit/>
+          </a:bodyPr>
+          <a:lstStyle/>
+          <a:p>
+            <a:r>
+              <a:rPr lang="en-US" dirty="0"/>
+              <a:t>40 Gbps</a:t>
+            </a:r>
+          </a:p>
+        </p:txBody>
+      </p:sp>
+      <p:sp>
+        <p:nvSpPr>
+          <p:cNvPr id="19" name="TextBox 18">
+            <a:extLst>
+              <a:ext uri="{FF2B5EF4-FFF2-40B4-BE49-F238E27FC236}">
+                <a16:creationId xmlns:a16="http://schemas.microsoft.com/office/drawing/2014/main" id="{1014CECC-B639-0525-DEC7-3D9EE0DF26E3}"/>
+              </a:ext>
+            </a:extLst>
+          </p:cNvPr>
+          <p:cNvSpPr txBox="1"/>
+          <p:nvPr/>
+        </p:nvSpPr>
+        <p:spPr>
+          <a:xfrm>
+            <a:off x="427320" y="1823407"/>
+            <a:ext cx="1985800" cy="1200329"/>
+          </a:xfrm>
+          <a:prstGeom prst="rect">
+            <a:avLst/>
+          </a:prstGeom>
+          <a:noFill/>
+        </p:spPr>
+        <p:txBody>
+          <a:bodyPr wrap="none" rtlCol="0">
+            <a:spAutoFit/>
+          </a:bodyPr>
+          <a:lstStyle/>
+          <a:p>
+            <a:r>
+              <a:rPr lang="en-US" dirty="0">
+                <a:solidFill>
+                  <a:srgbClr val="FF0000"/>
+                </a:solidFill>
+              </a:rPr>
+              <a:t>Total Flows </a:t>
+            </a:r>
+            <a:r>
+              <a:rPr lang="en-US" dirty="0"/>
+              <a:t>= 128</a:t>
+            </a:r>
+          </a:p>
+          <a:p>
+            <a:r>
+              <a:rPr lang="en-US" dirty="0"/>
+              <a:t>        (100B packets)</a:t>
+            </a:r>
+          </a:p>
+          <a:p>
+            <a:endParaRPr lang="en-US" dirty="0"/>
+          </a:p>
+          <a:p>
+            <a:r>
+              <a:rPr lang="en-US" dirty="0">
+                <a:solidFill>
+                  <a:srgbClr val="FF0000"/>
+                </a:solidFill>
+              </a:rPr>
+              <a:t>Duration</a:t>
+            </a:r>
+            <a:r>
+              <a:rPr lang="en-US" dirty="0"/>
+              <a:t> = 60 sec</a:t>
+            </a:r>
+          </a:p>
+        </p:txBody>
+      </p:sp>
+      <p:pic>
+        <p:nvPicPr>
+          <p:cNvPr id="21" name="Graphic 20" descr="Magnifying glass with solid fill">
+            <a:extLst>
+              <a:ext uri="{FF2B5EF4-FFF2-40B4-BE49-F238E27FC236}">
+                <a16:creationId xmlns:a16="http://schemas.microsoft.com/office/drawing/2014/main" id="{56B1CB04-BCEA-12D3-FCC3-DDE8F435A7B4}"/>
+              </a:ext>
+            </a:extLst>
+          </p:cNvPr>
+          <p:cNvPicPr>
+            <a:picLocks noChangeAspect="1"/>
+          </p:cNvPicPr>
+          <p:nvPr/>
+        </p:nvPicPr>
+        <p:blipFill>
+          <a:blip r:embed="rId2">
+            <a:extLst>
+              <a:ext uri="{96DAC541-7B7A-43D3-8B79-37D633B846F1}">
+                <asvg:svgBlip xmlns:asvg="http://schemas.microsoft.com/office/drawing/2016/SVG/main" r:embed="rId3"/>
+              </a:ext>
+            </a:extLst>
+          </a:blip>
+          <a:stretch>
+            <a:fillRect/>
+          </a:stretch>
+        </p:blipFill>
+        <p:spPr>
+          <a:xfrm>
+            <a:off x="7533014" y="3626132"/>
+            <a:ext cx="457200" cy="457200"/>
+          </a:xfrm>
+          <a:prstGeom prst="rect">
+            <a:avLst/>
+          </a:prstGeom>
+        </p:spPr>
+      </p:pic>
+      <p:sp>
+        <p:nvSpPr>
+          <p:cNvPr id="22" name="Snip and Round Single Corner of Rectangle 21">
+            <a:extLst>
+              <a:ext uri="{FF2B5EF4-FFF2-40B4-BE49-F238E27FC236}">
+                <a16:creationId xmlns:a16="http://schemas.microsoft.com/office/drawing/2014/main" id="{2B1B186E-125E-FB62-F395-3728968A9CBB}"/>
+              </a:ext>
+            </a:extLst>
+          </p:cNvPr>
+          <p:cNvSpPr/>
+          <p:nvPr/>
+        </p:nvSpPr>
+        <p:spPr>
+          <a:xfrm>
+            <a:off x="28775" y="4083332"/>
+            <a:ext cx="2634912" cy="2774668"/>
+          </a:xfrm>
+          <a:prstGeom prst="snipRoundRect">
+            <a:avLst/>
+          </a:prstGeom>
+          <a:solidFill>
+            <a:schemeClr val="accent2">
+              <a:lumMod val="60000"/>
+              <a:lumOff val="40000"/>
+            </a:schemeClr>
+          </a:solidFill>
+          <a:ln>
+            <a:solidFill>
+              <a:srgbClr val="0070C0"/>
+            </a:solidFill>
+          </a:ln>
+        </p:spPr>
+        <p:style>
+          <a:lnRef idx="2">
+            <a:schemeClr val="accent1">
+              <a:shade val="50000"/>
+            </a:schemeClr>
+          </a:lnRef>
+          <a:fillRef idx="1">
+            <a:schemeClr val="accent1"/>
+          </a:fillRef>
+          <a:effectRef idx="0">
+            <a:schemeClr val="accent1"/>
+          </a:effectRef>
+          <a:fontRef idx="minor">
+            <a:schemeClr val="lt1"/>
+          </a:fontRef>
+        </p:style>
+        <p:txBody>
+          <a:bodyPr rtlCol="0" anchor="ctr"/>
+          <a:lstStyle/>
+          <a:p>
+            <a:pPr algn="ctr"/>
+            <a:r>
+              <a:rPr lang="en-US" b="1" dirty="0" err="1">
+                <a:solidFill>
+                  <a:schemeClr val="tx1"/>
+                </a:solidFill>
+              </a:rPr>
+              <a:t>Observ</a:t>
+            </a:r>
+            <a:r>
+              <a:rPr lang="en-US" b="1" dirty="0">
+                <a:solidFill>
+                  <a:schemeClr val="tx1"/>
+                </a:solidFill>
+              </a:rPr>
+              <a:t> Logs/Metrics</a:t>
+            </a:r>
+          </a:p>
+          <a:p>
+            <a:pPr algn="ctr"/>
+            <a:endParaRPr lang="en-US" dirty="0">
+              <a:solidFill>
+                <a:schemeClr val="tx1"/>
+              </a:solidFill>
+            </a:endParaRPr>
+          </a:p>
+          <a:p>
+            <a:pPr algn="ctr"/>
+            <a:r>
+              <a:rPr lang="en-US" dirty="0" err="1">
+                <a:solidFill>
+                  <a:schemeClr val="tx1"/>
+                </a:solidFill>
+              </a:rPr>
+              <a:t>Eth_protocol</a:t>
+            </a:r>
+            <a:r>
+              <a:rPr lang="en-US" dirty="0">
+                <a:solidFill>
+                  <a:schemeClr val="tx1"/>
+                </a:solidFill>
+              </a:rPr>
+              <a:t>, </a:t>
+            </a:r>
+            <a:r>
+              <a:rPr lang="en-US" dirty="0" err="1">
+                <a:solidFill>
+                  <a:schemeClr val="tx1"/>
+                </a:solidFill>
+              </a:rPr>
+              <a:t>Src_Mac</a:t>
+            </a:r>
+            <a:r>
+              <a:rPr lang="en-US" dirty="0">
+                <a:solidFill>
+                  <a:schemeClr val="tx1"/>
+                </a:solidFill>
+              </a:rPr>
+              <a:t>, </a:t>
+            </a:r>
+            <a:r>
+              <a:rPr lang="en-US" dirty="0" err="1">
+                <a:solidFill>
+                  <a:schemeClr val="tx1"/>
+                </a:solidFill>
+              </a:rPr>
+              <a:t>Dst_Mac</a:t>
+            </a:r>
+            <a:r>
+              <a:rPr lang="en-US" dirty="0">
+                <a:solidFill>
+                  <a:schemeClr val="tx1"/>
+                </a:solidFill>
+              </a:rPr>
+              <a:t>, </a:t>
+            </a:r>
+            <a:r>
+              <a:rPr lang="en-US" dirty="0" err="1">
+                <a:solidFill>
+                  <a:schemeClr val="tx1"/>
+                </a:solidFill>
+              </a:rPr>
+              <a:t>Src_IP</a:t>
+            </a:r>
+            <a:r>
+              <a:rPr lang="en-US" dirty="0">
+                <a:solidFill>
+                  <a:schemeClr val="tx1"/>
+                </a:solidFill>
+              </a:rPr>
+              <a:t>, </a:t>
+            </a:r>
+            <a:r>
+              <a:rPr lang="en-US" dirty="0" err="1">
+                <a:solidFill>
+                  <a:schemeClr val="tx1"/>
+                </a:solidFill>
+              </a:rPr>
+              <a:t>Dest_IP</a:t>
+            </a:r>
+            <a:r>
+              <a:rPr lang="en-US" dirty="0">
+                <a:solidFill>
+                  <a:schemeClr val="tx1"/>
+                </a:solidFill>
+              </a:rPr>
+              <a:t>, </a:t>
+            </a:r>
+            <a:r>
+              <a:rPr lang="en-US" dirty="0" err="1">
+                <a:solidFill>
+                  <a:schemeClr val="tx1"/>
+                </a:solidFill>
+              </a:rPr>
+              <a:t>Src_Port</a:t>
+            </a:r>
+            <a:r>
+              <a:rPr lang="en-US" dirty="0">
+                <a:solidFill>
+                  <a:schemeClr val="tx1"/>
+                </a:solidFill>
+              </a:rPr>
+              <a:t>, </a:t>
+            </a:r>
+            <a:r>
+              <a:rPr lang="en-US" dirty="0" err="1">
+                <a:solidFill>
+                  <a:schemeClr val="tx1"/>
+                </a:solidFill>
+              </a:rPr>
+              <a:t>Dst_port</a:t>
+            </a:r>
+            <a:r>
+              <a:rPr lang="en-US" dirty="0">
+                <a:solidFill>
+                  <a:schemeClr val="tx1"/>
+                </a:solidFill>
+              </a:rPr>
+              <a:t>, Protocol =&gt; </a:t>
+            </a:r>
+          </a:p>
+          <a:p>
+            <a:pPr algn="ctr"/>
+            <a:r>
+              <a:rPr lang="en-US" b="1" dirty="0">
+                <a:solidFill>
+                  <a:srgbClr val="002060"/>
+                </a:solidFill>
+              </a:rPr>
+              <a:t>Packets, Bytes, </a:t>
+            </a:r>
+            <a:r>
+              <a:rPr lang="en-US" b="1" dirty="0" err="1">
+                <a:solidFill>
+                  <a:srgbClr val="002060"/>
+                </a:solidFill>
+              </a:rPr>
+              <a:t>FlowStartTime</a:t>
+            </a:r>
+            <a:r>
+              <a:rPr lang="en-US" b="1" dirty="0">
+                <a:solidFill>
+                  <a:srgbClr val="002060"/>
+                </a:solidFill>
+              </a:rPr>
+              <a:t>, </a:t>
+            </a:r>
+            <a:r>
+              <a:rPr lang="en-US" b="1" dirty="0" err="1">
+                <a:solidFill>
+                  <a:srgbClr val="002060"/>
+                </a:solidFill>
+              </a:rPr>
+              <a:t>FlowEndTime</a:t>
+            </a:r>
+            <a:endParaRPr lang="en-US" b="1" dirty="0">
+              <a:solidFill>
+                <a:srgbClr val="002060"/>
+              </a:solidFill>
+            </a:endParaRPr>
+          </a:p>
+        </p:txBody>
+      </p:sp>
+      <p:sp>
+        <p:nvSpPr>
+          <p:cNvPr id="3" name="TextBox 2">
+            <a:extLst>
+              <a:ext uri="{FF2B5EF4-FFF2-40B4-BE49-F238E27FC236}">
+                <a16:creationId xmlns:a16="http://schemas.microsoft.com/office/drawing/2014/main" id="{EC97886B-21A8-C3BB-85CE-D18E097A4127}"/>
+              </a:ext>
+            </a:extLst>
+          </p:cNvPr>
+          <p:cNvSpPr txBox="1"/>
+          <p:nvPr/>
+        </p:nvSpPr>
+        <p:spPr>
+          <a:xfrm>
+            <a:off x="2663687" y="4888315"/>
+            <a:ext cx="9254008" cy="369332"/>
+          </a:xfrm>
+          <a:prstGeom prst="rect">
+            <a:avLst/>
+          </a:prstGeom>
+          <a:noFill/>
+        </p:spPr>
+        <p:txBody>
+          <a:bodyPr wrap="none" rtlCol="0">
+            <a:spAutoFit/>
+          </a:bodyPr>
+          <a:lstStyle/>
+          <a:p>
+            <a:r>
+              <a:rPr lang="en-US" dirty="0"/>
+              <a:t>The TCP Flows are allowed to run for 60 sec, and the final packet throughput (Mpps) is measured</a:t>
+            </a:r>
+          </a:p>
+        </p:txBody>
+      </p:sp>
+      <p:sp>
+        <p:nvSpPr>
+          <p:cNvPr id="6" name="Rounded Rectangle 5">
+            <a:extLst>
+              <a:ext uri="{FF2B5EF4-FFF2-40B4-BE49-F238E27FC236}">
+                <a16:creationId xmlns:a16="http://schemas.microsoft.com/office/drawing/2014/main" id="{7A866D67-F831-0490-FA61-C3616B8C4091}"/>
+              </a:ext>
+            </a:extLst>
+          </p:cNvPr>
+          <p:cNvSpPr/>
+          <p:nvPr/>
+        </p:nvSpPr>
+        <p:spPr>
+          <a:xfrm>
+            <a:off x="3205369" y="2425148"/>
+            <a:ext cx="1083365" cy="494026"/>
+          </a:xfrm>
+          <a:prstGeom prst="roundRect">
+            <a:avLst/>
+          </a:prstGeom>
+        </p:spPr>
+        <p:style>
+          <a:lnRef idx="2">
+            <a:schemeClr val="accent2">
+              <a:shade val="50000"/>
+            </a:schemeClr>
+          </a:lnRef>
+          <a:fillRef idx="1">
+            <a:schemeClr val="accent2"/>
+          </a:fillRef>
+          <a:effectRef idx="0">
+            <a:schemeClr val="accent2"/>
+          </a:effectRef>
+          <a:fontRef idx="minor">
+            <a:schemeClr val="lt1"/>
+          </a:fontRef>
+        </p:style>
+        <p:txBody>
+          <a:bodyPr rtlCol="0" anchor="ctr"/>
+          <a:lstStyle/>
+          <a:p>
+            <a:pPr algn="ctr"/>
+            <a:r>
+              <a:rPr lang="en-US" dirty="0"/>
+              <a:t>TCP Sender</a:t>
+            </a:r>
+          </a:p>
+        </p:txBody>
+      </p:sp>
+    </p:spTree>
+    <p:extLst>
+      <p:ext uri="{BB962C8B-B14F-4D97-AF65-F5344CB8AC3E}">
+        <p14:creationId xmlns:p14="http://schemas.microsoft.com/office/powerpoint/2010/main" val="2448456603"/>
+      </p:ext>
+    </p:extLst>
+  </p:cSld>
+  <p:clrMapOvr>
+    <a:masterClrMapping/>
+  </p:clrMapOvr>
+</p:sld>
+</file>
+
+<file path=ppt/slides/slide7.xml><?xml version="1.0" encoding="utf-8"?>
+<p:sld xmlns:a="http://schemas.openxmlformats.org/drawingml/2006/main" xmlns:r="http://schemas.openxmlformats.org/officeDocument/2006/relationships" xmlns:p="http://schemas.openxmlformats.org/presentationml/2006/main">
+  <p:cSld>
+    <p:spTree>
+      <p:nvGrpSpPr>
+        <p:cNvPr id="1" name=""/>
+        <p:cNvGrpSpPr/>
+        <p:nvPr/>
+      </p:nvGrpSpPr>
+      <p:grpSpPr>
+        <a:xfrm>
+          <a:off x="0" y="0"/>
+          <a:ext cx="0" cy="0"/>
+          <a:chOff x="0" y="0"/>
+          <a:chExt cx="0" cy="0"/>
+        </a:xfrm>
+      </p:grpSpPr>
+      <p:sp>
+        <p:nvSpPr>
+          <p:cNvPr id="2" name="Title 1">
+            <a:extLst>
+              <a:ext uri="{FF2B5EF4-FFF2-40B4-BE49-F238E27FC236}">
+                <a16:creationId xmlns:a16="http://schemas.microsoft.com/office/drawing/2014/main" id="{2EC5040F-C556-3E91-8963-A7C849496B1C}"/>
+              </a:ext>
+            </a:extLst>
+          </p:cNvPr>
+          <p:cNvSpPr>
+            <a:spLocks noGrp="1"/>
+          </p:cNvSpPr>
+          <p:nvPr>
+            <p:ph type="title"/>
+          </p:nvPr>
+        </p:nvSpPr>
+        <p:spPr/>
+        <p:txBody>
+          <a:bodyPr/>
+          <a:lstStyle/>
+          <a:p>
+            <a:r>
+              <a:rPr lang="en-US" dirty="0"/>
+              <a:t>Results – Monitoring TCP traffic</a:t>
+            </a:r>
+          </a:p>
+        </p:txBody>
+      </p:sp>
+      <p:graphicFrame>
+        <p:nvGraphicFramePr>
+          <p:cNvPr id="4" name="Content Placeholder 3">
+            <a:extLst>
+              <a:ext uri="{FF2B5EF4-FFF2-40B4-BE49-F238E27FC236}">
+                <a16:creationId xmlns:a16="http://schemas.microsoft.com/office/drawing/2014/main" id="{7508EEDB-C666-C3C0-3EEE-14E321DA6733}"/>
+              </a:ext>
+            </a:extLst>
+          </p:cNvPr>
+          <p:cNvGraphicFramePr>
+            <a:graphicFrameLocks noGrp="1"/>
+          </p:cNvGraphicFramePr>
+          <p:nvPr>
+            <p:ph idx="1"/>
+            <p:extLst>
+              <p:ext uri="{D42A27DB-BD31-4B8C-83A1-F6EECF244321}">
+                <p14:modId xmlns:p14="http://schemas.microsoft.com/office/powerpoint/2010/main" val="1434917402"/>
+              </p:ext>
+            </p:extLst>
+          </p:nvPr>
+        </p:nvGraphicFramePr>
+        <p:xfrm>
+          <a:off x="1411357" y="2171774"/>
+          <a:ext cx="9084365" cy="3565488"/>
+        </p:xfrm>
+        <a:graphic>
+          <a:graphicData uri="http://schemas.openxmlformats.org/drawingml/2006/table">
+            <a:tbl>
+              <a:tblPr/>
+              <a:tblGrid>
+                <a:gridCol w="2145082">
+                  <a:extLst>
+                    <a:ext uri="{9D8B030D-6E8A-4147-A177-3AD203B41FA5}">
+                      <a16:colId xmlns:a16="http://schemas.microsoft.com/office/drawing/2014/main" val="1447024036"/>
+                    </a:ext>
+                  </a:extLst>
+                </a:gridCol>
+                <a:gridCol w="1172176">
+                  <a:extLst>
+                    <a:ext uri="{9D8B030D-6E8A-4147-A177-3AD203B41FA5}">
+                      <a16:colId xmlns:a16="http://schemas.microsoft.com/office/drawing/2014/main" val="464156079"/>
+                    </a:ext>
+                  </a:extLst>
+                </a:gridCol>
+                <a:gridCol w="1441777">
+                  <a:extLst>
+                    <a:ext uri="{9D8B030D-6E8A-4147-A177-3AD203B41FA5}">
+                      <a16:colId xmlns:a16="http://schemas.microsoft.com/office/drawing/2014/main" val="2357686796"/>
+                    </a:ext>
+                  </a:extLst>
+                </a:gridCol>
+                <a:gridCol w="1512108">
+                  <a:extLst>
+                    <a:ext uri="{9D8B030D-6E8A-4147-A177-3AD203B41FA5}">
+                      <a16:colId xmlns:a16="http://schemas.microsoft.com/office/drawing/2014/main" val="822451429"/>
+                    </a:ext>
+                  </a:extLst>
+                </a:gridCol>
+                <a:gridCol w="1406611">
+                  <a:extLst>
+                    <a:ext uri="{9D8B030D-6E8A-4147-A177-3AD203B41FA5}">
+                      <a16:colId xmlns:a16="http://schemas.microsoft.com/office/drawing/2014/main" val="1794610317"/>
+                    </a:ext>
+                  </a:extLst>
+                </a:gridCol>
+                <a:gridCol w="1406611">
+                  <a:extLst>
+                    <a:ext uri="{9D8B030D-6E8A-4147-A177-3AD203B41FA5}">
+                      <a16:colId xmlns:a16="http://schemas.microsoft.com/office/drawing/2014/main" val="845358463"/>
+                    </a:ext>
+                  </a:extLst>
+                </a:gridCol>
+              </a:tblGrid>
+              <a:tr h="804748">
+                <a:tc>
+                  <a:txBody>
+                    <a:bodyPr/>
+                    <a:lstStyle/>
+                    <a:p>
+                      <a:pPr rtl="0" fontAlgn="b"/>
+                      <a:r>
+                        <a:rPr lang="en-IN" sz="1700" b="1" dirty="0">
+                          <a:effectLst/>
+                        </a:rPr>
+                        <a:t>Agent</a:t>
+                      </a:r>
+                    </a:p>
+                  </a:txBody>
+                  <a:tcPr marL="26706" marR="26706" marT="17804" marB="17804" anchor="b">
+                    <a:lnL w="9525" cap="flat" cmpd="sng" algn="ctr">
+                      <a:solidFill>
+                        <a:srgbClr val="000000"/>
+                      </a:solidFill>
+                      <a:prstDash val="solid"/>
+                      <a:round/>
+                      <a:headEnd type="none" w="med" len="med"/>
+                      <a:tailEnd type="none" w="med" len="med"/>
+                    </a:lnL>
+                    <a:lnR w="9525" cap="flat" cmpd="sng" algn="ctr">
+                      <a:solidFill>
+                        <a:srgbClr val="CCCCCC"/>
+                      </a:solidFill>
+                      <a:prstDash val="solid"/>
+                      <a:round/>
+                      <a:headEnd type="none" w="med" len="med"/>
+                      <a:tailEnd type="none" w="med" len="med"/>
+                    </a:lnR>
+                    <a:lnT w="9525" cap="flat" cmpd="sng" algn="ctr">
+                      <a:solidFill>
+                        <a:srgbClr val="CCCCCC"/>
+                      </a:solidFill>
+                      <a:prstDash val="solid"/>
+                      <a:round/>
+                      <a:headEnd type="none" w="med" len="med"/>
+                      <a:tailEnd type="none" w="med" len="med"/>
+                    </a:lnT>
+                    <a:lnB w="9525" cap="flat" cmpd="sng" algn="ctr">
+                      <a:solidFill>
+                        <a:srgbClr val="CCCCCC"/>
+                      </a:solidFill>
+                      <a:prstDash val="solid"/>
+                      <a:round/>
+                      <a:headEnd type="none" w="med" len="med"/>
+                      <a:tailEnd type="none" w="med" len="med"/>
+                    </a:lnB>
+                    <a:noFill/>
+                  </a:tcPr>
+                </a:tc>
+                <a:tc>
+                  <a:txBody>
+                    <a:bodyPr/>
+                    <a:lstStyle/>
+                    <a:p>
+                      <a:pPr rtl="0" fontAlgn="b"/>
+                      <a:r>
+                        <a:rPr lang="en-IN" sz="1700" b="1" dirty="0">
+                          <a:effectLst/>
+                        </a:rPr>
+                        <a:t>Packets sent (over 60sec period)</a:t>
+                      </a:r>
+                    </a:p>
+                  </a:txBody>
+                  <a:tcPr marL="26706" marR="26706" marT="17804" marB="17804" anchor="b">
+                    <a:lnL w="9525" cap="flat" cmpd="sng" algn="ctr">
+                      <a:solidFill>
+                        <a:srgbClr val="CCCCCC"/>
+                      </a:solidFill>
+                      <a:prstDash val="solid"/>
+                      <a:round/>
+                      <a:headEnd type="none" w="med" len="med"/>
+                      <a:tailEnd type="none" w="med" len="med"/>
+                    </a:lnL>
+                    <a:lnR w="9525" cap="flat" cmpd="sng" algn="ctr">
+                      <a:solidFill>
+                        <a:srgbClr val="CCCCCC"/>
+                      </a:solidFill>
+                      <a:prstDash val="solid"/>
+                      <a:round/>
+                      <a:headEnd type="none" w="med" len="med"/>
+                      <a:tailEnd type="none" w="med" len="med"/>
+                    </a:lnR>
+                    <a:lnT w="9525" cap="flat" cmpd="sng" algn="ctr">
+                      <a:solidFill>
+                        <a:srgbClr val="CCCCCC"/>
+                      </a:solidFill>
+                      <a:prstDash val="solid"/>
+                      <a:round/>
+                      <a:headEnd type="none" w="med" len="med"/>
+                      <a:tailEnd type="none" w="med" len="med"/>
+                    </a:lnT>
+                    <a:lnB w="9525" cap="flat" cmpd="sng" algn="ctr">
+                      <a:solidFill>
+                        <a:srgbClr val="CCCCCC"/>
+                      </a:solidFill>
+                      <a:prstDash val="solid"/>
+                      <a:round/>
+                      <a:headEnd type="none" w="med" len="med"/>
+                      <a:tailEnd type="none" w="med" len="med"/>
+                    </a:lnB>
+                    <a:noFill/>
+                  </a:tcPr>
+                </a:tc>
+                <a:tc>
+                  <a:txBody>
+                    <a:bodyPr/>
+                    <a:lstStyle/>
+                    <a:p>
+                      <a:pPr rtl="0" fontAlgn="b"/>
+                      <a:r>
+                        <a:rPr lang="en-IN" sz="1700" b="1" dirty="0">
+                          <a:effectLst/>
+                        </a:rPr>
+                        <a:t>Packets observed by agent</a:t>
+                      </a:r>
+                    </a:p>
+                  </a:txBody>
+                  <a:tcPr marL="26706" marR="26706" marT="17804" marB="17804" anchor="b">
+                    <a:lnL w="9525" cap="flat" cmpd="sng" algn="ctr">
+                      <a:solidFill>
+                        <a:srgbClr val="CCCCCC"/>
+                      </a:solidFill>
+                      <a:prstDash val="solid"/>
+                      <a:round/>
+                      <a:headEnd type="none" w="med" len="med"/>
+                      <a:tailEnd type="none" w="med" len="med"/>
+                    </a:lnL>
+                    <a:lnR w="9525" cap="flat" cmpd="sng" algn="ctr">
+                      <a:solidFill>
+                        <a:srgbClr val="CCCCCC"/>
+                      </a:solidFill>
+                      <a:prstDash val="solid"/>
+                      <a:round/>
+                      <a:headEnd type="none" w="med" len="med"/>
+                      <a:tailEnd type="none" w="med" len="med"/>
+                    </a:lnR>
+                    <a:lnT w="9525" cap="flat" cmpd="sng" algn="ctr">
+                      <a:solidFill>
+                        <a:srgbClr val="CCCCCC"/>
+                      </a:solidFill>
+                      <a:prstDash val="solid"/>
+                      <a:round/>
+                      <a:headEnd type="none" w="med" len="med"/>
+                      <a:tailEnd type="none" w="med" len="med"/>
+                    </a:lnT>
+                    <a:lnB w="9525" cap="flat" cmpd="sng" algn="ctr">
+                      <a:solidFill>
+                        <a:srgbClr val="CCCCCC"/>
+                      </a:solidFill>
+                      <a:prstDash val="solid"/>
+                      <a:round/>
+                      <a:headEnd type="none" w="med" len="med"/>
+                      <a:tailEnd type="none" w="med" len="med"/>
+                    </a:lnB>
+                    <a:noFill/>
+                  </a:tcPr>
+                </a:tc>
+                <a:tc>
+                  <a:txBody>
+                    <a:bodyPr/>
+                    <a:lstStyle/>
+                    <a:p>
+                      <a:pPr rtl="0" fontAlgn="b"/>
+                      <a:r>
+                        <a:rPr lang="en-IN" sz="1700" b="1" dirty="0">
+                          <a:effectLst/>
+                        </a:rPr>
+                        <a:t>Monitoring efficacy (%)</a:t>
+                      </a:r>
+                    </a:p>
+                  </a:txBody>
+                  <a:tcPr marL="26706" marR="26706" marT="17804" marB="17804" anchor="b">
+                    <a:lnL w="9525" cap="flat" cmpd="sng" algn="ctr">
+                      <a:solidFill>
+                        <a:srgbClr val="CCCCCC"/>
+                      </a:solidFill>
+                      <a:prstDash val="solid"/>
+                      <a:round/>
+                      <a:headEnd type="none" w="med" len="med"/>
+                      <a:tailEnd type="none" w="med" len="med"/>
+                    </a:lnL>
+                    <a:lnR w="9525" cap="flat" cmpd="sng" algn="ctr">
+                      <a:solidFill>
+                        <a:srgbClr val="CCCCCC"/>
+                      </a:solidFill>
+                      <a:prstDash val="solid"/>
+                      <a:round/>
+                      <a:headEnd type="none" w="med" len="med"/>
+                      <a:tailEnd type="none" w="med" len="med"/>
+                    </a:lnR>
+                    <a:lnT w="9525" cap="flat" cmpd="sng" algn="ctr">
+                      <a:solidFill>
+                        <a:srgbClr val="CCCCCC"/>
+                      </a:solidFill>
+                      <a:prstDash val="solid"/>
+                      <a:round/>
+                      <a:headEnd type="none" w="med" len="med"/>
+                      <a:tailEnd type="none" w="med" len="med"/>
+                    </a:lnT>
+                    <a:lnB w="9525" cap="flat" cmpd="sng" algn="ctr">
+                      <a:solidFill>
+                        <a:srgbClr val="CCCCCC"/>
+                      </a:solidFill>
+                      <a:prstDash val="solid"/>
+                      <a:round/>
+                      <a:headEnd type="none" w="med" len="med"/>
+                      <a:tailEnd type="none" w="med" len="med"/>
+                    </a:lnB>
+                    <a:noFill/>
+                  </a:tcPr>
+                </a:tc>
+                <a:tc>
+                  <a:txBody>
+                    <a:bodyPr/>
+                    <a:lstStyle/>
+                    <a:p>
+                      <a:pPr rtl="0" fontAlgn="b"/>
+                      <a:r>
+                        <a:rPr lang="en-IN" sz="1700" b="1" dirty="0">
+                          <a:effectLst/>
+                        </a:rPr>
+                        <a:t>Packet Rate (Mpps)</a:t>
+                      </a:r>
+                    </a:p>
+                  </a:txBody>
+                  <a:tcPr marL="26706" marR="26706" marT="17804" marB="17804" anchor="b">
+                    <a:lnL w="9525" cap="flat" cmpd="sng" algn="ctr">
+                      <a:solidFill>
+                        <a:srgbClr val="CCCCCC"/>
+                      </a:solidFill>
+                      <a:prstDash val="solid"/>
+                      <a:round/>
+                      <a:headEnd type="none" w="med" len="med"/>
+                      <a:tailEnd type="none" w="med" len="med"/>
+                    </a:lnL>
+                    <a:lnR w="9525" cap="flat" cmpd="sng" algn="ctr">
+                      <a:solidFill>
+                        <a:srgbClr val="CCCCCC"/>
+                      </a:solidFill>
+                      <a:prstDash val="solid"/>
+                      <a:round/>
+                      <a:headEnd type="none" w="med" len="med"/>
+                      <a:tailEnd type="none" w="med" len="med"/>
+                    </a:lnR>
+                    <a:lnT w="9525" cap="flat" cmpd="sng" algn="ctr">
+                      <a:solidFill>
+                        <a:srgbClr val="CCCCCC"/>
+                      </a:solidFill>
+                      <a:prstDash val="solid"/>
+                      <a:round/>
+                      <a:headEnd type="none" w="med" len="med"/>
+                      <a:tailEnd type="none" w="med" len="med"/>
+                    </a:lnT>
+                    <a:lnB w="9525" cap="flat" cmpd="sng" algn="ctr">
+                      <a:solidFill>
+                        <a:srgbClr val="CCCCCC"/>
+                      </a:solidFill>
+                      <a:prstDash val="solid"/>
+                      <a:round/>
+                      <a:headEnd type="none" w="med" len="med"/>
+                      <a:tailEnd type="none" w="med" len="med"/>
+                    </a:lnB>
+                    <a:noFill/>
+                  </a:tcPr>
+                </a:tc>
+                <a:tc>
+                  <a:txBody>
+                    <a:bodyPr/>
+                    <a:lstStyle/>
+                    <a:p>
+                      <a:pPr rtl="0" fontAlgn="b"/>
+                      <a:r>
+                        <a:rPr lang="en-IN" sz="1700" b="1" dirty="0">
+                          <a:effectLst/>
+                        </a:rPr>
+                        <a:t>CPU Extra Overhead (%)</a:t>
+                      </a:r>
+                    </a:p>
+                  </a:txBody>
+                  <a:tcPr marL="26706" marR="26706" marT="17804" marB="17804" anchor="b">
+                    <a:lnL w="9525" cap="flat" cmpd="sng" algn="ctr">
+                      <a:solidFill>
+                        <a:srgbClr val="CCCCCC"/>
+                      </a:solidFill>
+                      <a:prstDash val="solid"/>
+                      <a:round/>
+                      <a:headEnd type="none" w="med" len="med"/>
+                      <a:tailEnd type="none" w="med" len="med"/>
+                    </a:lnL>
+                    <a:lnR w="9525" cap="flat" cmpd="sng" algn="ctr">
+                      <a:solidFill>
+                        <a:srgbClr val="000000"/>
+                      </a:solidFill>
+                      <a:prstDash val="solid"/>
+                      <a:round/>
+                      <a:headEnd type="none" w="med" len="med"/>
+                      <a:tailEnd type="none" w="med" len="med"/>
+                    </a:lnR>
+                    <a:lnT w="9525" cap="flat" cmpd="sng" algn="ctr">
+                      <a:solidFill>
+                        <a:srgbClr val="CCCCCC"/>
+                      </a:solidFill>
+                      <a:prstDash val="solid"/>
+                      <a:round/>
+                      <a:headEnd type="none" w="med" len="med"/>
+                      <a:tailEnd type="none" w="med" len="med"/>
+                    </a:lnT>
+                    <a:lnB w="9525" cap="flat" cmpd="sng" algn="ctr">
+                      <a:solidFill>
+                        <a:srgbClr val="CCCCCC"/>
+                      </a:solidFill>
+                      <a:prstDash val="solid"/>
+                      <a:round/>
+                      <a:headEnd type="none" w="med" len="med"/>
+                      <a:tailEnd type="none" w="med" len="med"/>
+                    </a:lnB>
+                    <a:noFill/>
+                  </a:tcPr>
+                </a:tc>
+                <a:extLst>
+                  <a:ext uri="{0D108BD9-81ED-4DB2-BD59-A6C34878D82A}">
+                    <a16:rowId xmlns:a16="http://schemas.microsoft.com/office/drawing/2014/main" val="2503229334"/>
+                  </a:ext>
+                </a:extLst>
+              </a:tr>
+              <a:tr h="548368">
+                <a:tc>
+                  <a:txBody>
+                    <a:bodyPr/>
+                    <a:lstStyle/>
+                    <a:p>
+                      <a:pPr rtl="0" fontAlgn="b"/>
+                      <a:r>
+                        <a:rPr lang="en-IN" sz="1700" dirty="0">
+                          <a:solidFill>
+                            <a:srgbClr val="FF0000"/>
+                          </a:solidFill>
+                          <a:effectLst/>
+                        </a:rPr>
+                        <a:t>None</a:t>
+                      </a:r>
+                    </a:p>
+                  </a:txBody>
+                  <a:tcPr marL="26706" marR="26706" marT="17804" marB="17804" anchor="b">
+                    <a:lnL w="9525" cap="flat" cmpd="sng" algn="ctr">
+                      <a:solidFill>
+                        <a:srgbClr val="000000"/>
+                      </a:solidFill>
+                      <a:prstDash val="solid"/>
+                      <a:round/>
+                      <a:headEnd type="none" w="med" len="med"/>
+                      <a:tailEnd type="none" w="med" len="med"/>
+                    </a:lnL>
+                    <a:lnR w="9525" cap="flat" cmpd="sng" algn="ctr">
+                      <a:solidFill>
+                        <a:srgbClr val="CCCCCC"/>
+                      </a:solidFill>
+                      <a:prstDash val="solid"/>
+                      <a:round/>
+                      <a:headEnd type="none" w="med" len="med"/>
+                      <a:tailEnd type="none" w="med" len="med"/>
+                    </a:lnR>
+                    <a:lnT w="9525" cap="flat" cmpd="sng" algn="ctr">
+                      <a:solidFill>
+                        <a:srgbClr val="CCCCCC"/>
+                      </a:solidFill>
+                      <a:prstDash val="solid"/>
+                      <a:round/>
+                      <a:headEnd type="none" w="med" len="med"/>
+                      <a:tailEnd type="none" w="med" len="med"/>
+                    </a:lnT>
+                    <a:lnB w="9525" cap="flat" cmpd="sng" algn="ctr">
+                      <a:solidFill>
+                        <a:srgbClr val="CCCCCC"/>
+                      </a:solidFill>
+                      <a:prstDash val="solid"/>
+                      <a:round/>
+                      <a:headEnd type="none" w="med" len="med"/>
+                      <a:tailEnd type="none" w="med" len="med"/>
+                    </a:lnB>
+                  </a:tcPr>
+                </a:tc>
+                <a:tc>
+                  <a:txBody>
+                    <a:bodyPr/>
+                    <a:lstStyle/>
+                    <a:p>
+                      <a:pPr algn="r" rtl="0" fontAlgn="b"/>
+                      <a:r>
+                        <a:rPr lang="en-IN" sz="1700">
+                          <a:effectLst/>
+                        </a:rPr>
+                        <a:t>657,309,157</a:t>
+                      </a:r>
+                    </a:p>
+                  </a:txBody>
+                  <a:tcPr marL="26706" marR="26706" marT="17804" marB="17804" anchor="b">
+                    <a:lnL w="9525" cap="flat" cmpd="sng" algn="ctr">
+                      <a:solidFill>
+                        <a:srgbClr val="CCCCCC"/>
+                      </a:solidFill>
+                      <a:prstDash val="solid"/>
+                      <a:round/>
+                      <a:headEnd type="none" w="med" len="med"/>
+                      <a:tailEnd type="none" w="med" len="med"/>
+                    </a:lnL>
+                    <a:lnR w="9525" cap="flat" cmpd="sng" algn="ctr">
+                      <a:solidFill>
+                        <a:srgbClr val="CCCCCC"/>
+                      </a:solidFill>
+                      <a:prstDash val="solid"/>
+                      <a:round/>
+                      <a:headEnd type="none" w="med" len="med"/>
+                      <a:tailEnd type="none" w="med" len="med"/>
+                    </a:lnR>
+                    <a:lnT w="9525" cap="flat" cmpd="sng" algn="ctr">
+                      <a:solidFill>
+                        <a:srgbClr val="CCCCCC"/>
+                      </a:solidFill>
+                      <a:prstDash val="solid"/>
+                      <a:round/>
+                      <a:headEnd type="none" w="med" len="med"/>
+                      <a:tailEnd type="none" w="med" len="med"/>
+                    </a:lnT>
+                    <a:lnB w="9525" cap="flat" cmpd="sng" algn="ctr">
+                      <a:solidFill>
+                        <a:srgbClr val="CCCCCC"/>
+                      </a:solidFill>
+                      <a:prstDash val="solid"/>
+                      <a:round/>
+                      <a:headEnd type="none" w="med" len="med"/>
+                      <a:tailEnd type="none" w="med" len="med"/>
+                    </a:lnB>
+                  </a:tcPr>
+                </a:tc>
+                <a:tc>
+                  <a:txBody>
+                    <a:bodyPr/>
+                    <a:lstStyle/>
+                    <a:p>
+                      <a:pPr algn="r" rtl="0" fontAlgn="b"/>
+                      <a:r>
+                        <a:rPr lang="en-IN" sz="1700">
+                          <a:effectLst/>
+                        </a:rPr>
+                        <a:t>0</a:t>
+                      </a:r>
+                    </a:p>
+                  </a:txBody>
+                  <a:tcPr marL="26706" marR="26706" marT="17804" marB="17804" anchor="b">
+                    <a:lnL w="9525" cap="flat" cmpd="sng" algn="ctr">
+                      <a:solidFill>
+                        <a:srgbClr val="CCCCCC"/>
+                      </a:solidFill>
+                      <a:prstDash val="solid"/>
+                      <a:round/>
+                      <a:headEnd type="none" w="med" len="med"/>
+                      <a:tailEnd type="none" w="med" len="med"/>
+                    </a:lnL>
+                    <a:lnR w="9525" cap="flat" cmpd="sng" algn="ctr">
+                      <a:solidFill>
+                        <a:srgbClr val="CCCCCC"/>
+                      </a:solidFill>
+                      <a:prstDash val="solid"/>
+                      <a:round/>
+                      <a:headEnd type="none" w="med" len="med"/>
+                      <a:tailEnd type="none" w="med" len="med"/>
+                    </a:lnR>
+                    <a:lnT w="9525" cap="flat" cmpd="sng" algn="ctr">
+                      <a:solidFill>
+                        <a:srgbClr val="CCCCCC"/>
+                      </a:solidFill>
+                      <a:prstDash val="solid"/>
+                      <a:round/>
+                      <a:headEnd type="none" w="med" len="med"/>
+                      <a:tailEnd type="none" w="med" len="med"/>
+                    </a:lnT>
+                    <a:lnB w="9525" cap="flat" cmpd="sng" algn="ctr">
+                      <a:solidFill>
+                        <a:srgbClr val="CCCCCC"/>
+                      </a:solidFill>
+                      <a:prstDash val="solid"/>
+                      <a:round/>
+                      <a:headEnd type="none" w="med" len="med"/>
+                      <a:tailEnd type="none" w="med" len="med"/>
+                    </a:lnB>
+                  </a:tcPr>
+                </a:tc>
+                <a:tc>
+                  <a:txBody>
+                    <a:bodyPr/>
+                    <a:lstStyle/>
+                    <a:p>
+                      <a:pPr algn="r" rtl="0" fontAlgn="b"/>
+                      <a:r>
+                        <a:rPr lang="en-IN" sz="1700">
+                          <a:effectLst/>
+                        </a:rPr>
+                        <a:t>0</a:t>
+                      </a:r>
+                    </a:p>
+                  </a:txBody>
+                  <a:tcPr marL="26706" marR="26706" marT="17804" marB="17804" anchor="b">
+                    <a:lnL w="9525" cap="flat" cmpd="sng" algn="ctr">
+                      <a:solidFill>
+                        <a:srgbClr val="CCCCCC"/>
+                      </a:solidFill>
+                      <a:prstDash val="solid"/>
+                      <a:round/>
+                      <a:headEnd type="none" w="med" len="med"/>
+                      <a:tailEnd type="none" w="med" len="med"/>
+                    </a:lnL>
+                    <a:lnR w="9525" cap="flat" cmpd="sng" algn="ctr">
+                      <a:solidFill>
+                        <a:srgbClr val="CCCCCC"/>
+                      </a:solidFill>
+                      <a:prstDash val="solid"/>
+                      <a:round/>
+                      <a:headEnd type="none" w="med" len="med"/>
+                      <a:tailEnd type="none" w="med" len="med"/>
+                    </a:lnR>
+                    <a:lnT w="9525" cap="flat" cmpd="sng" algn="ctr">
+                      <a:solidFill>
+                        <a:srgbClr val="CCCCCC"/>
+                      </a:solidFill>
+                      <a:prstDash val="solid"/>
+                      <a:round/>
+                      <a:headEnd type="none" w="med" len="med"/>
+                      <a:tailEnd type="none" w="med" len="med"/>
+                    </a:lnT>
+                    <a:lnB w="9525" cap="flat" cmpd="sng" algn="ctr">
+                      <a:solidFill>
+                        <a:srgbClr val="CCCCCC"/>
+                      </a:solidFill>
+                      <a:prstDash val="solid"/>
+                      <a:round/>
+                      <a:headEnd type="none" w="med" len="med"/>
+                      <a:tailEnd type="none" w="med" len="med"/>
+                    </a:lnB>
+                  </a:tcPr>
+                </a:tc>
+                <a:tc>
+                  <a:txBody>
+                    <a:bodyPr/>
+                    <a:lstStyle/>
+                    <a:p>
+                      <a:pPr algn="r" rtl="0" fontAlgn="b"/>
+                      <a:r>
+                        <a:rPr lang="en-IN" sz="1700" dirty="0">
+                          <a:effectLst/>
+                        </a:rPr>
+                        <a:t>11.75</a:t>
+                      </a:r>
+                    </a:p>
+                  </a:txBody>
+                  <a:tcPr marL="26706" marR="26706" marT="17804" marB="17804" anchor="b">
+                    <a:lnL w="9525" cap="flat" cmpd="sng" algn="ctr">
+                      <a:solidFill>
+                        <a:srgbClr val="CCCCCC"/>
+                      </a:solidFill>
+                      <a:prstDash val="solid"/>
+                      <a:round/>
+                      <a:headEnd type="none" w="med" len="med"/>
+                      <a:tailEnd type="none" w="med" len="med"/>
+                    </a:lnL>
+                    <a:lnR w="9525" cap="flat" cmpd="sng" algn="ctr">
+                      <a:solidFill>
+                        <a:srgbClr val="CCCCCC"/>
+                      </a:solidFill>
+                      <a:prstDash val="solid"/>
+                      <a:round/>
+                      <a:headEnd type="none" w="med" len="med"/>
+                      <a:tailEnd type="none" w="med" len="med"/>
+                    </a:lnR>
+                    <a:lnT w="9525" cap="flat" cmpd="sng" algn="ctr">
+                      <a:solidFill>
+                        <a:srgbClr val="CCCCCC"/>
+                      </a:solidFill>
+                      <a:prstDash val="solid"/>
+                      <a:round/>
+                      <a:headEnd type="none" w="med" len="med"/>
+                      <a:tailEnd type="none" w="med" len="med"/>
+                    </a:lnT>
+                    <a:lnB w="9525" cap="flat" cmpd="sng" algn="ctr">
+                      <a:solidFill>
+                        <a:srgbClr val="CCCCCC"/>
+                      </a:solidFill>
+                      <a:prstDash val="solid"/>
+                      <a:round/>
+                      <a:headEnd type="none" w="med" len="med"/>
+                      <a:tailEnd type="none" w="med" len="med"/>
+                    </a:lnB>
+                  </a:tcPr>
+                </a:tc>
+                <a:tc>
+                  <a:txBody>
+                    <a:bodyPr/>
+                    <a:lstStyle/>
+                    <a:p>
+                      <a:pPr algn="r" rtl="0" fontAlgn="b"/>
+                      <a:r>
+                        <a:rPr lang="en-IN" dirty="0">
+                          <a:effectLst/>
+                        </a:rPr>
+                        <a:t>0</a:t>
+                      </a:r>
+                    </a:p>
+                  </a:txBody>
+                  <a:tcPr marL="28575" marR="28575" marT="19050" marB="19050" anchor="b">
+                    <a:lnL w="9525" cap="flat" cmpd="sng" algn="ctr">
+                      <a:solidFill>
+                        <a:srgbClr val="CCCCCC"/>
+                      </a:solidFill>
+                      <a:prstDash val="solid"/>
+                      <a:round/>
+                      <a:headEnd type="none" w="med" len="med"/>
+                      <a:tailEnd type="none" w="med" len="med"/>
+                    </a:lnL>
+                    <a:lnR w="9525" cap="flat" cmpd="sng" algn="ctr">
+                      <a:solidFill>
+                        <a:srgbClr val="000000"/>
+                      </a:solidFill>
+                      <a:prstDash val="solid"/>
+                      <a:round/>
+                      <a:headEnd type="none" w="med" len="med"/>
+                      <a:tailEnd type="none" w="med" len="med"/>
+                    </a:lnR>
+                    <a:lnT w="9525" cap="flat" cmpd="sng" algn="ctr">
+                      <a:solidFill>
+                        <a:srgbClr val="CCCCCC"/>
+                      </a:solidFill>
+                      <a:prstDash val="solid"/>
+                      <a:round/>
+                      <a:headEnd type="none" w="med" len="med"/>
+                      <a:tailEnd type="none" w="med" len="med"/>
+                    </a:lnT>
+                    <a:lnB w="9525" cap="flat" cmpd="sng" algn="ctr">
+                      <a:solidFill>
+                        <a:srgbClr val="CCCCCC"/>
+                      </a:solidFill>
+                      <a:prstDash val="solid"/>
+                      <a:round/>
+                      <a:headEnd type="none" w="med" len="med"/>
+                      <a:tailEnd type="none" w="med" len="med"/>
+                    </a:lnB>
+                  </a:tcPr>
+                </a:tc>
+                <a:extLst>
+                  <a:ext uri="{0D108BD9-81ED-4DB2-BD59-A6C34878D82A}">
+                    <a16:rowId xmlns:a16="http://schemas.microsoft.com/office/drawing/2014/main" val="1490704280"/>
+                  </a:ext>
+                </a:extLst>
+              </a:tr>
+              <a:tr h="548368">
+                <a:tc>
+                  <a:txBody>
+                    <a:bodyPr/>
+                    <a:lstStyle/>
+                    <a:p>
+                      <a:pPr rtl="0" fontAlgn="b"/>
+                      <a:r>
+                        <a:rPr lang="en-IN" sz="1700">
+                          <a:effectLst/>
+                        </a:rPr>
+                        <a:t>pmacct(print) </a:t>
+                      </a:r>
+                    </a:p>
+                  </a:txBody>
+                  <a:tcPr marL="26706" marR="26706" marT="17804" marB="17804" anchor="b">
+                    <a:lnL w="9525" cap="flat" cmpd="sng" algn="ctr">
+                      <a:solidFill>
+                        <a:srgbClr val="000000"/>
+                      </a:solidFill>
+                      <a:prstDash val="solid"/>
+                      <a:round/>
+                      <a:headEnd type="none" w="med" len="med"/>
+                      <a:tailEnd type="none" w="med" len="med"/>
+                    </a:lnL>
+                    <a:lnR w="9525" cap="flat" cmpd="sng" algn="ctr">
+                      <a:solidFill>
+                        <a:srgbClr val="CCCCCC"/>
+                      </a:solidFill>
+                      <a:prstDash val="solid"/>
+                      <a:round/>
+                      <a:headEnd type="none" w="med" len="med"/>
+                      <a:tailEnd type="none" w="med" len="med"/>
+                    </a:lnR>
+                    <a:lnT w="9525" cap="flat" cmpd="sng" algn="ctr">
+                      <a:solidFill>
+                        <a:srgbClr val="CCCCCC"/>
+                      </a:solidFill>
+                      <a:prstDash val="solid"/>
+                      <a:round/>
+                      <a:headEnd type="none" w="med" len="med"/>
+                      <a:tailEnd type="none" w="med" len="med"/>
+                    </a:lnT>
+                    <a:lnB w="9525" cap="flat" cmpd="sng" algn="ctr">
+                      <a:solidFill>
+                        <a:srgbClr val="CCCCCC"/>
+                      </a:solidFill>
+                      <a:prstDash val="solid"/>
+                      <a:round/>
+                      <a:headEnd type="none" w="med" len="med"/>
+                      <a:tailEnd type="none" w="med" len="med"/>
+                    </a:lnB>
+                  </a:tcPr>
+                </a:tc>
+                <a:tc>
+                  <a:txBody>
+                    <a:bodyPr/>
+                    <a:lstStyle/>
+                    <a:p>
+                      <a:pPr algn="r" rtl="0" fontAlgn="b"/>
+                      <a:r>
+                        <a:rPr lang="en-IN" sz="1700">
+                          <a:effectLst/>
+                        </a:rPr>
+                        <a:t>225,467,753</a:t>
+                      </a:r>
+                    </a:p>
+                  </a:txBody>
+                  <a:tcPr marL="26706" marR="26706" marT="17804" marB="17804" anchor="b">
+                    <a:lnL w="9525" cap="flat" cmpd="sng" algn="ctr">
+                      <a:solidFill>
+                        <a:srgbClr val="CCCCCC"/>
+                      </a:solidFill>
+                      <a:prstDash val="solid"/>
+                      <a:round/>
+                      <a:headEnd type="none" w="med" len="med"/>
+                      <a:tailEnd type="none" w="med" len="med"/>
+                    </a:lnL>
+                    <a:lnR w="9525" cap="flat" cmpd="sng" algn="ctr">
+                      <a:solidFill>
+                        <a:srgbClr val="CCCCCC"/>
+                      </a:solidFill>
+                      <a:prstDash val="solid"/>
+                      <a:round/>
+                      <a:headEnd type="none" w="med" len="med"/>
+                      <a:tailEnd type="none" w="med" len="med"/>
+                    </a:lnR>
+                    <a:lnT w="9525" cap="flat" cmpd="sng" algn="ctr">
+                      <a:solidFill>
+                        <a:srgbClr val="CCCCCC"/>
+                      </a:solidFill>
+                      <a:prstDash val="solid"/>
+                      <a:round/>
+                      <a:headEnd type="none" w="med" len="med"/>
+                      <a:tailEnd type="none" w="med" len="med"/>
+                    </a:lnT>
+                    <a:lnB w="9525" cap="flat" cmpd="sng" algn="ctr">
+                      <a:solidFill>
+                        <a:srgbClr val="CCCCCC"/>
+                      </a:solidFill>
+                      <a:prstDash val="solid"/>
+                      <a:round/>
+                      <a:headEnd type="none" w="med" len="med"/>
+                      <a:tailEnd type="none" w="med" len="med"/>
+                    </a:lnB>
+                  </a:tcPr>
+                </a:tc>
+                <a:tc>
+                  <a:txBody>
+                    <a:bodyPr/>
+                    <a:lstStyle/>
+                    <a:p>
+                      <a:pPr algn="r" rtl="0" fontAlgn="b"/>
+                      <a:r>
+                        <a:rPr lang="en-IN" sz="1700">
+                          <a:effectLst/>
+                        </a:rPr>
+                        <a:t>71,410,449</a:t>
+                      </a:r>
+                    </a:p>
+                  </a:txBody>
+                  <a:tcPr marL="26706" marR="26706" marT="17804" marB="17804" anchor="b">
+                    <a:lnL w="9525" cap="flat" cmpd="sng" algn="ctr">
+                      <a:solidFill>
+                        <a:srgbClr val="CCCCCC"/>
+                      </a:solidFill>
+                      <a:prstDash val="solid"/>
+                      <a:round/>
+                      <a:headEnd type="none" w="med" len="med"/>
+                      <a:tailEnd type="none" w="med" len="med"/>
+                    </a:lnL>
+                    <a:lnR w="9525" cap="flat" cmpd="sng" algn="ctr">
+                      <a:solidFill>
+                        <a:srgbClr val="CCCCCC"/>
+                      </a:solidFill>
+                      <a:prstDash val="solid"/>
+                      <a:round/>
+                      <a:headEnd type="none" w="med" len="med"/>
+                      <a:tailEnd type="none" w="med" len="med"/>
+                    </a:lnR>
+                    <a:lnT w="9525" cap="flat" cmpd="sng" algn="ctr">
+                      <a:solidFill>
+                        <a:srgbClr val="CCCCCC"/>
+                      </a:solidFill>
+                      <a:prstDash val="solid"/>
+                      <a:round/>
+                      <a:headEnd type="none" w="med" len="med"/>
+                      <a:tailEnd type="none" w="med" len="med"/>
+                    </a:lnT>
+                    <a:lnB w="9525" cap="flat" cmpd="sng" algn="ctr">
+                      <a:solidFill>
+                        <a:srgbClr val="CCCCCC"/>
+                      </a:solidFill>
+                      <a:prstDash val="solid"/>
+                      <a:round/>
+                      <a:headEnd type="none" w="med" len="med"/>
+                      <a:tailEnd type="none" w="med" len="med"/>
+                    </a:lnB>
+                  </a:tcPr>
+                </a:tc>
+                <a:tc>
+                  <a:txBody>
+                    <a:bodyPr/>
+                    <a:lstStyle/>
+                    <a:p>
+                      <a:pPr algn="r" rtl="0" fontAlgn="b"/>
+                      <a:r>
+                        <a:rPr lang="en-IN" sz="1700">
+                          <a:effectLst/>
+                        </a:rPr>
+                        <a:t>31.67213411</a:t>
+                      </a:r>
+                    </a:p>
+                  </a:txBody>
+                  <a:tcPr marL="26706" marR="26706" marT="17804" marB="17804" anchor="b">
+                    <a:lnL w="9525" cap="flat" cmpd="sng" algn="ctr">
+                      <a:solidFill>
+                        <a:srgbClr val="CCCCCC"/>
+                      </a:solidFill>
+                      <a:prstDash val="solid"/>
+                      <a:round/>
+                      <a:headEnd type="none" w="med" len="med"/>
+                      <a:tailEnd type="none" w="med" len="med"/>
+                    </a:lnL>
+                    <a:lnR w="9525" cap="flat" cmpd="sng" algn="ctr">
+                      <a:solidFill>
+                        <a:srgbClr val="CCCCCC"/>
+                      </a:solidFill>
+                      <a:prstDash val="solid"/>
+                      <a:round/>
+                      <a:headEnd type="none" w="med" len="med"/>
+                      <a:tailEnd type="none" w="med" len="med"/>
+                    </a:lnR>
+                    <a:lnT w="9525" cap="flat" cmpd="sng" algn="ctr">
+                      <a:solidFill>
+                        <a:srgbClr val="CCCCCC"/>
+                      </a:solidFill>
+                      <a:prstDash val="solid"/>
+                      <a:round/>
+                      <a:headEnd type="none" w="med" len="med"/>
+                      <a:tailEnd type="none" w="med" len="med"/>
+                    </a:lnT>
+                    <a:lnB w="9525" cap="flat" cmpd="sng" algn="ctr">
+                      <a:solidFill>
+                        <a:srgbClr val="CCCCCC"/>
+                      </a:solidFill>
+                      <a:prstDash val="solid"/>
+                      <a:round/>
+                      <a:headEnd type="none" w="med" len="med"/>
+                      <a:tailEnd type="none" w="med" len="med"/>
+                    </a:lnB>
+                  </a:tcPr>
+                </a:tc>
+                <a:tc>
+                  <a:txBody>
+                    <a:bodyPr/>
+                    <a:lstStyle/>
+                    <a:p>
+                      <a:pPr algn="r" rtl="0" fontAlgn="b"/>
+                      <a:r>
+                        <a:rPr lang="en-IN" sz="1700">
+                          <a:effectLst/>
+                        </a:rPr>
+                        <a:t>3.5</a:t>
+                      </a:r>
+                    </a:p>
+                  </a:txBody>
+                  <a:tcPr marL="26706" marR="26706" marT="17804" marB="17804" anchor="b">
+                    <a:lnL w="9525" cap="flat" cmpd="sng" algn="ctr">
+                      <a:solidFill>
+                        <a:srgbClr val="CCCCCC"/>
+                      </a:solidFill>
+                      <a:prstDash val="solid"/>
+                      <a:round/>
+                      <a:headEnd type="none" w="med" len="med"/>
+                      <a:tailEnd type="none" w="med" len="med"/>
+                    </a:lnL>
+                    <a:lnR w="9525" cap="flat" cmpd="sng" algn="ctr">
+                      <a:solidFill>
+                        <a:srgbClr val="CCCCCC"/>
+                      </a:solidFill>
+                      <a:prstDash val="solid"/>
+                      <a:round/>
+                      <a:headEnd type="none" w="med" len="med"/>
+                      <a:tailEnd type="none" w="med" len="med"/>
+                    </a:lnR>
+                    <a:lnT w="9525" cap="flat" cmpd="sng" algn="ctr">
+                      <a:solidFill>
+                        <a:srgbClr val="CCCCCC"/>
+                      </a:solidFill>
+                      <a:prstDash val="solid"/>
+                      <a:round/>
+                      <a:headEnd type="none" w="med" len="med"/>
+                      <a:tailEnd type="none" w="med" len="med"/>
+                    </a:lnT>
+                    <a:lnB w="9525" cap="flat" cmpd="sng" algn="ctr">
+                      <a:solidFill>
+                        <a:srgbClr val="CCCCCC"/>
+                      </a:solidFill>
+                      <a:prstDash val="solid"/>
+                      <a:round/>
+                      <a:headEnd type="none" w="med" len="med"/>
+                      <a:tailEnd type="none" w="med" len="med"/>
+                    </a:lnB>
+                  </a:tcPr>
+                </a:tc>
+                <a:tc>
+                  <a:txBody>
+                    <a:bodyPr/>
+                    <a:lstStyle/>
+                    <a:p>
+                      <a:pPr algn="r" rtl="0" fontAlgn="b"/>
+                      <a:r>
+                        <a:rPr lang="en-IN">
+                          <a:effectLst/>
+                        </a:rPr>
+                        <a:t>234.2980543</a:t>
+                      </a:r>
+                    </a:p>
+                  </a:txBody>
+                  <a:tcPr marL="28575" marR="28575" marT="19050" marB="19050" anchor="b">
+                    <a:lnL w="9525" cap="flat" cmpd="sng" algn="ctr">
+                      <a:solidFill>
+                        <a:srgbClr val="CCCCCC"/>
+                      </a:solidFill>
+                      <a:prstDash val="solid"/>
+                      <a:round/>
+                      <a:headEnd type="none" w="med" len="med"/>
+                      <a:tailEnd type="none" w="med" len="med"/>
+                    </a:lnL>
+                    <a:lnR w="9525" cap="flat" cmpd="sng" algn="ctr">
+                      <a:solidFill>
+                        <a:srgbClr val="000000"/>
+                      </a:solidFill>
+                      <a:prstDash val="solid"/>
+                      <a:round/>
+                      <a:headEnd type="none" w="med" len="med"/>
+                      <a:tailEnd type="none" w="med" len="med"/>
+                    </a:lnR>
+                    <a:lnT w="9525" cap="flat" cmpd="sng" algn="ctr">
+                      <a:solidFill>
+                        <a:srgbClr val="CCCCCC"/>
+                      </a:solidFill>
+                      <a:prstDash val="solid"/>
+                      <a:round/>
+                      <a:headEnd type="none" w="med" len="med"/>
+                      <a:tailEnd type="none" w="med" len="med"/>
+                    </a:lnT>
+                    <a:lnB w="9525" cap="flat" cmpd="sng" algn="ctr">
+                      <a:solidFill>
+                        <a:srgbClr val="CCCCCC"/>
+                      </a:solidFill>
+                      <a:prstDash val="solid"/>
+                      <a:round/>
+                      <a:headEnd type="none" w="med" len="med"/>
+                      <a:tailEnd type="none" w="med" len="med"/>
+                    </a:lnB>
+                  </a:tcPr>
+                </a:tc>
+                <a:extLst>
+                  <a:ext uri="{0D108BD9-81ED-4DB2-BD59-A6C34878D82A}">
+                    <a16:rowId xmlns:a16="http://schemas.microsoft.com/office/drawing/2014/main" val="2448890767"/>
+                  </a:ext>
+                </a:extLst>
+              </a:tr>
+              <a:tr h="548368">
+                <a:tc>
+                  <a:txBody>
+                    <a:bodyPr/>
+                    <a:lstStyle/>
+                    <a:p>
+                      <a:pPr rtl="0" fontAlgn="b"/>
+                      <a:r>
+                        <a:rPr lang="en-IN" sz="1700">
+                          <a:effectLst/>
+                        </a:rPr>
+                        <a:t>tcpdump</a:t>
+                      </a:r>
+                    </a:p>
+                  </a:txBody>
+                  <a:tcPr marL="26706" marR="26706" marT="17804" marB="17804" anchor="b">
+                    <a:lnL w="9525" cap="flat" cmpd="sng" algn="ctr">
+                      <a:solidFill>
+                        <a:srgbClr val="000000"/>
+                      </a:solidFill>
+                      <a:prstDash val="solid"/>
+                      <a:round/>
+                      <a:headEnd type="none" w="med" len="med"/>
+                      <a:tailEnd type="none" w="med" len="med"/>
+                    </a:lnL>
+                    <a:lnR w="9525" cap="flat" cmpd="sng" algn="ctr">
+                      <a:solidFill>
+                        <a:srgbClr val="CCCCCC"/>
+                      </a:solidFill>
+                      <a:prstDash val="solid"/>
+                      <a:round/>
+                      <a:headEnd type="none" w="med" len="med"/>
+                      <a:tailEnd type="none" w="med" len="med"/>
+                    </a:lnR>
+                    <a:lnT w="9525" cap="flat" cmpd="sng" algn="ctr">
+                      <a:solidFill>
+                        <a:srgbClr val="CCCCCC"/>
+                      </a:solidFill>
+                      <a:prstDash val="solid"/>
+                      <a:round/>
+                      <a:headEnd type="none" w="med" len="med"/>
+                      <a:tailEnd type="none" w="med" len="med"/>
+                    </a:lnT>
+                    <a:lnB w="9525" cap="flat" cmpd="sng" algn="ctr">
+                      <a:solidFill>
+                        <a:srgbClr val="CCCCCC"/>
+                      </a:solidFill>
+                      <a:prstDash val="solid"/>
+                      <a:round/>
+                      <a:headEnd type="none" w="med" len="med"/>
+                      <a:tailEnd type="none" w="med" len="med"/>
+                    </a:lnB>
+                  </a:tcPr>
+                </a:tc>
+                <a:tc>
+                  <a:txBody>
+                    <a:bodyPr/>
+                    <a:lstStyle/>
+                    <a:p>
+                      <a:pPr algn="r" rtl="0" fontAlgn="b"/>
+                      <a:r>
+                        <a:rPr lang="en-IN" sz="1700">
+                          <a:effectLst/>
+                        </a:rPr>
+                        <a:t>497,131,749</a:t>
+                      </a:r>
+                    </a:p>
+                  </a:txBody>
+                  <a:tcPr marL="26706" marR="26706" marT="17804" marB="17804" anchor="b">
+                    <a:lnL w="9525" cap="flat" cmpd="sng" algn="ctr">
+                      <a:solidFill>
+                        <a:srgbClr val="CCCCCC"/>
+                      </a:solidFill>
+                      <a:prstDash val="solid"/>
+                      <a:round/>
+                      <a:headEnd type="none" w="med" len="med"/>
+                      <a:tailEnd type="none" w="med" len="med"/>
+                    </a:lnL>
+                    <a:lnR w="9525" cap="flat" cmpd="sng" algn="ctr">
+                      <a:solidFill>
+                        <a:srgbClr val="CCCCCC"/>
+                      </a:solidFill>
+                      <a:prstDash val="solid"/>
+                      <a:round/>
+                      <a:headEnd type="none" w="med" len="med"/>
+                      <a:tailEnd type="none" w="med" len="med"/>
+                    </a:lnR>
+                    <a:lnT w="9525" cap="flat" cmpd="sng" algn="ctr">
+                      <a:solidFill>
+                        <a:srgbClr val="CCCCCC"/>
+                      </a:solidFill>
+                      <a:prstDash val="solid"/>
+                      <a:round/>
+                      <a:headEnd type="none" w="med" len="med"/>
+                      <a:tailEnd type="none" w="med" len="med"/>
+                    </a:lnT>
+                    <a:lnB w="9525" cap="flat" cmpd="sng" algn="ctr">
+                      <a:solidFill>
+                        <a:srgbClr val="CCCCCC"/>
+                      </a:solidFill>
+                      <a:prstDash val="solid"/>
+                      <a:round/>
+                      <a:headEnd type="none" w="med" len="med"/>
+                      <a:tailEnd type="none" w="med" len="med"/>
+                    </a:lnB>
+                  </a:tcPr>
+                </a:tc>
+                <a:tc>
+                  <a:txBody>
+                    <a:bodyPr/>
+                    <a:lstStyle/>
+                    <a:p>
+                      <a:pPr algn="r" rtl="0" fontAlgn="b"/>
+                      <a:r>
+                        <a:rPr lang="en-IN" sz="1700">
+                          <a:effectLst/>
+                        </a:rPr>
+                        <a:t>34420750</a:t>
+                      </a:r>
+                    </a:p>
+                  </a:txBody>
+                  <a:tcPr marL="26706" marR="26706" marT="17804" marB="17804" anchor="b">
+                    <a:lnL w="9525" cap="flat" cmpd="sng" algn="ctr">
+                      <a:solidFill>
+                        <a:srgbClr val="CCCCCC"/>
+                      </a:solidFill>
+                      <a:prstDash val="solid"/>
+                      <a:round/>
+                      <a:headEnd type="none" w="med" len="med"/>
+                      <a:tailEnd type="none" w="med" len="med"/>
+                    </a:lnL>
+                    <a:lnR w="9525" cap="flat" cmpd="sng" algn="ctr">
+                      <a:solidFill>
+                        <a:srgbClr val="CCCCCC"/>
+                      </a:solidFill>
+                      <a:prstDash val="solid"/>
+                      <a:round/>
+                      <a:headEnd type="none" w="med" len="med"/>
+                      <a:tailEnd type="none" w="med" len="med"/>
+                    </a:lnR>
+                    <a:lnT w="9525" cap="flat" cmpd="sng" algn="ctr">
+                      <a:solidFill>
+                        <a:srgbClr val="CCCCCC"/>
+                      </a:solidFill>
+                      <a:prstDash val="solid"/>
+                      <a:round/>
+                      <a:headEnd type="none" w="med" len="med"/>
+                      <a:tailEnd type="none" w="med" len="med"/>
+                    </a:lnT>
+                    <a:lnB w="9525" cap="flat" cmpd="sng" algn="ctr">
+                      <a:solidFill>
+                        <a:srgbClr val="CCCCCC"/>
+                      </a:solidFill>
+                      <a:prstDash val="solid"/>
+                      <a:round/>
+                      <a:headEnd type="none" w="med" len="med"/>
+                      <a:tailEnd type="none" w="med" len="med"/>
+                    </a:lnB>
+                  </a:tcPr>
+                </a:tc>
+                <a:tc>
+                  <a:txBody>
+                    <a:bodyPr/>
+                    <a:lstStyle/>
+                    <a:p>
+                      <a:pPr algn="r" rtl="0" fontAlgn="b"/>
+                      <a:r>
+                        <a:rPr lang="en-IN" sz="1700">
+                          <a:effectLst/>
+                        </a:rPr>
+                        <a:t>6.923868787</a:t>
+                      </a:r>
+                    </a:p>
+                  </a:txBody>
+                  <a:tcPr marL="26706" marR="26706" marT="17804" marB="17804" anchor="b">
+                    <a:lnL w="9525" cap="flat" cmpd="sng" algn="ctr">
+                      <a:solidFill>
+                        <a:srgbClr val="CCCCCC"/>
+                      </a:solidFill>
+                      <a:prstDash val="solid"/>
+                      <a:round/>
+                      <a:headEnd type="none" w="med" len="med"/>
+                      <a:tailEnd type="none" w="med" len="med"/>
+                    </a:lnL>
+                    <a:lnR w="9525" cap="flat" cmpd="sng" algn="ctr">
+                      <a:solidFill>
+                        <a:srgbClr val="CCCCCC"/>
+                      </a:solidFill>
+                      <a:prstDash val="solid"/>
+                      <a:round/>
+                      <a:headEnd type="none" w="med" len="med"/>
+                      <a:tailEnd type="none" w="med" len="med"/>
+                    </a:lnR>
+                    <a:lnT w="9525" cap="flat" cmpd="sng" algn="ctr">
+                      <a:solidFill>
+                        <a:srgbClr val="CCCCCC"/>
+                      </a:solidFill>
+                      <a:prstDash val="solid"/>
+                      <a:round/>
+                      <a:headEnd type="none" w="med" len="med"/>
+                      <a:tailEnd type="none" w="med" len="med"/>
+                    </a:lnT>
+                    <a:lnB w="9525" cap="flat" cmpd="sng" algn="ctr">
+                      <a:solidFill>
+                        <a:srgbClr val="CCCCCC"/>
+                      </a:solidFill>
+                      <a:prstDash val="solid"/>
+                      <a:round/>
+                      <a:headEnd type="none" w="med" len="med"/>
+                      <a:tailEnd type="none" w="med" len="med"/>
+                    </a:lnB>
+                  </a:tcPr>
+                </a:tc>
+                <a:tc>
+                  <a:txBody>
+                    <a:bodyPr/>
+                    <a:lstStyle/>
+                    <a:p>
+                      <a:pPr algn="r" rtl="0" fontAlgn="b"/>
+                      <a:r>
+                        <a:rPr lang="en-IN" sz="1700">
+                          <a:effectLst/>
+                        </a:rPr>
+                        <a:t>7.25</a:t>
+                      </a:r>
+                    </a:p>
+                  </a:txBody>
+                  <a:tcPr marL="26706" marR="26706" marT="17804" marB="17804" anchor="b">
+                    <a:lnL w="9525" cap="flat" cmpd="sng" algn="ctr">
+                      <a:solidFill>
+                        <a:srgbClr val="CCCCCC"/>
+                      </a:solidFill>
+                      <a:prstDash val="solid"/>
+                      <a:round/>
+                      <a:headEnd type="none" w="med" len="med"/>
+                      <a:tailEnd type="none" w="med" len="med"/>
+                    </a:lnL>
+                    <a:lnR w="9525" cap="flat" cmpd="sng" algn="ctr">
+                      <a:solidFill>
+                        <a:srgbClr val="CCCCCC"/>
+                      </a:solidFill>
+                      <a:prstDash val="solid"/>
+                      <a:round/>
+                      <a:headEnd type="none" w="med" len="med"/>
+                      <a:tailEnd type="none" w="med" len="med"/>
+                    </a:lnR>
+                    <a:lnT w="9525" cap="flat" cmpd="sng" algn="ctr">
+                      <a:solidFill>
+                        <a:srgbClr val="CCCCCC"/>
+                      </a:solidFill>
+                      <a:prstDash val="solid"/>
+                      <a:round/>
+                      <a:headEnd type="none" w="med" len="med"/>
+                      <a:tailEnd type="none" w="med" len="med"/>
+                    </a:lnT>
+                    <a:lnB w="9525" cap="flat" cmpd="sng" algn="ctr">
+                      <a:solidFill>
+                        <a:srgbClr val="CCCCCC"/>
+                      </a:solidFill>
+                      <a:prstDash val="solid"/>
+                      <a:round/>
+                      <a:headEnd type="none" w="med" len="med"/>
+                      <a:tailEnd type="none" w="med" len="med"/>
+                    </a:lnB>
+                  </a:tcPr>
+                </a:tc>
+                <a:tc>
+                  <a:txBody>
+                    <a:bodyPr/>
+                    <a:lstStyle/>
+                    <a:p>
+                      <a:pPr algn="r" rtl="0" fontAlgn="b"/>
+                      <a:r>
+                        <a:rPr lang="en-IN">
+                          <a:effectLst/>
+                        </a:rPr>
+                        <a:t>51.48792619</a:t>
+                      </a:r>
+                    </a:p>
+                  </a:txBody>
+                  <a:tcPr marL="28575" marR="28575" marT="19050" marB="19050" anchor="b">
+                    <a:lnL w="9525" cap="flat" cmpd="sng" algn="ctr">
+                      <a:solidFill>
+                        <a:srgbClr val="CCCCCC"/>
+                      </a:solidFill>
+                      <a:prstDash val="solid"/>
+                      <a:round/>
+                      <a:headEnd type="none" w="med" len="med"/>
+                      <a:tailEnd type="none" w="med" len="med"/>
+                    </a:lnL>
+                    <a:lnR w="9525" cap="flat" cmpd="sng" algn="ctr">
+                      <a:solidFill>
+                        <a:srgbClr val="000000"/>
+                      </a:solidFill>
+                      <a:prstDash val="solid"/>
+                      <a:round/>
+                      <a:headEnd type="none" w="med" len="med"/>
+                      <a:tailEnd type="none" w="med" len="med"/>
+                    </a:lnR>
+                    <a:lnT w="9525" cap="flat" cmpd="sng" algn="ctr">
+                      <a:solidFill>
+                        <a:srgbClr val="CCCCCC"/>
+                      </a:solidFill>
+                      <a:prstDash val="solid"/>
+                      <a:round/>
+                      <a:headEnd type="none" w="med" len="med"/>
+                      <a:tailEnd type="none" w="med" len="med"/>
+                    </a:lnT>
+                    <a:lnB w="9525" cap="flat" cmpd="sng" algn="ctr">
+                      <a:solidFill>
+                        <a:srgbClr val="CCCCCC"/>
+                      </a:solidFill>
+                      <a:prstDash val="solid"/>
+                      <a:round/>
+                      <a:headEnd type="none" w="med" len="med"/>
+                      <a:tailEnd type="none" w="med" len="med"/>
+                    </a:lnB>
+                  </a:tcPr>
+                </a:tc>
+                <a:extLst>
+                  <a:ext uri="{0D108BD9-81ED-4DB2-BD59-A6C34878D82A}">
+                    <a16:rowId xmlns:a16="http://schemas.microsoft.com/office/drawing/2014/main" val="1395624395"/>
+                  </a:ext>
+                </a:extLst>
+              </a:tr>
+              <a:tr h="548368">
+                <a:tc>
+                  <a:txBody>
+                    <a:bodyPr/>
+                    <a:lstStyle/>
+                    <a:p>
+                      <a:pPr rtl="0" fontAlgn="b"/>
+                      <a:r>
+                        <a:rPr lang="en-IN" sz="1700">
+                          <a:effectLst/>
+                        </a:rPr>
+                        <a:t>netobserv-ebpf-agent_V1</a:t>
+                      </a:r>
+                    </a:p>
+                  </a:txBody>
+                  <a:tcPr marL="26706" marR="26706" marT="17804" marB="17804" anchor="b">
+                    <a:lnL w="9525" cap="flat" cmpd="sng" algn="ctr">
+                      <a:solidFill>
+                        <a:srgbClr val="000000"/>
+                      </a:solidFill>
+                      <a:prstDash val="solid"/>
+                      <a:round/>
+                      <a:headEnd type="none" w="med" len="med"/>
+                      <a:tailEnd type="none" w="med" len="med"/>
+                    </a:lnL>
+                    <a:lnR w="9525" cap="flat" cmpd="sng" algn="ctr">
+                      <a:solidFill>
+                        <a:srgbClr val="CCCCCC"/>
+                      </a:solidFill>
+                      <a:prstDash val="solid"/>
+                      <a:round/>
+                      <a:headEnd type="none" w="med" len="med"/>
+                      <a:tailEnd type="none" w="med" len="med"/>
+                    </a:lnR>
+                    <a:lnT w="9525" cap="flat" cmpd="sng" algn="ctr">
+                      <a:solidFill>
+                        <a:srgbClr val="CCCCCC"/>
+                      </a:solidFill>
+                      <a:prstDash val="solid"/>
+                      <a:round/>
+                      <a:headEnd type="none" w="med" len="med"/>
+                      <a:tailEnd type="none" w="med" len="med"/>
+                    </a:lnT>
+                    <a:lnB w="9525" cap="flat" cmpd="sng" algn="ctr">
+                      <a:solidFill>
+                        <a:srgbClr val="CCCCCC"/>
+                      </a:solidFill>
+                      <a:prstDash val="solid"/>
+                      <a:round/>
+                      <a:headEnd type="none" w="med" len="med"/>
+                      <a:tailEnd type="none" w="med" len="med"/>
+                    </a:lnB>
+                  </a:tcPr>
+                </a:tc>
+                <a:tc>
+                  <a:txBody>
+                    <a:bodyPr/>
+                    <a:lstStyle/>
+                    <a:p>
+                      <a:pPr algn="r" rtl="0" fontAlgn="b"/>
+                      <a:r>
+                        <a:rPr lang="en-IN" sz="1700">
+                          <a:effectLst/>
+                        </a:rPr>
+                        <a:t>220,042,728</a:t>
+                      </a:r>
+                    </a:p>
+                  </a:txBody>
+                  <a:tcPr marL="26706" marR="26706" marT="17804" marB="17804" anchor="b">
+                    <a:lnL w="9525" cap="flat" cmpd="sng" algn="ctr">
+                      <a:solidFill>
+                        <a:srgbClr val="CCCCCC"/>
+                      </a:solidFill>
+                      <a:prstDash val="solid"/>
+                      <a:round/>
+                      <a:headEnd type="none" w="med" len="med"/>
+                      <a:tailEnd type="none" w="med" len="med"/>
+                    </a:lnL>
+                    <a:lnR w="9525" cap="flat" cmpd="sng" algn="ctr">
+                      <a:solidFill>
+                        <a:srgbClr val="CCCCCC"/>
+                      </a:solidFill>
+                      <a:prstDash val="solid"/>
+                      <a:round/>
+                      <a:headEnd type="none" w="med" len="med"/>
+                      <a:tailEnd type="none" w="med" len="med"/>
+                    </a:lnR>
+                    <a:lnT w="9525" cap="flat" cmpd="sng" algn="ctr">
+                      <a:solidFill>
+                        <a:srgbClr val="CCCCCC"/>
+                      </a:solidFill>
+                      <a:prstDash val="solid"/>
+                      <a:round/>
+                      <a:headEnd type="none" w="med" len="med"/>
+                      <a:tailEnd type="none" w="med" len="med"/>
+                    </a:lnT>
+                    <a:lnB w="9525" cap="flat" cmpd="sng" algn="ctr">
+                      <a:solidFill>
+                        <a:srgbClr val="CCCCCC"/>
+                      </a:solidFill>
+                      <a:prstDash val="solid"/>
+                      <a:round/>
+                      <a:headEnd type="none" w="med" len="med"/>
+                      <a:tailEnd type="none" w="med" len="med"/>
+                    </a:lnB>
+                  </a:tcPr>
+                </a:tc>
+                <a:tc>
+                  <a:txBody>
+                    <a:bodyPr/>
+                    <a:lstStyle/>
+                    <a:p>
+                      <a:pPr algn="r" rtl="0" fontAlgn="b"/>
+                      <a:r>
+                        <a:rPr lang="en-IN" sz="1700">
+                          <a:effectLst/>
+                        </a:rPr>
+                        <a:t>14,577,508</a:t>
+                      </a:r>
+                    </a:p>
+                  </a:txBody>
+                  <a:tcPr marL="26706" marR="26706" marT="17804" marB="17804" anchor="b">
+                    <a:lnL w="9525" cap="flat" cmpd="sng" algn="ctr">
+                      <a:solidFill>
+                        <a:srgbClr val="CCCCCC"/>
+                      </a:solidFill>
+                      <a:prstDash val="solid"/>
+                      <a:round/>
+                      <a:headEnd type="none" w="med" len="med"/>
+                      <a:tailEnd type="none" w="med" len="med"/>
+                    </a:lnL>
+                    <a:lnR w="9525" cap="flat" cmpd="sng" algn="ctr">
+                      <a:solidFill>
+                        <a:srgbClr val="CCCCCC"/>
+                      </a:solidFill>
+                      <a:prstDash val="solid"/>
+                      <a:round/>
+                      <a:headEnd type="none" w="med" len="med"/>
+                      <a:tailEnd type="none" w="med" len="med"/>
+                    </a:lnR>
+                    <a:lnT w="9525" cap="flat" cmpd="sng" algn="ctr">
+                      <a:solidFill>
+                        <a:srgbClr val="CCCCCC"/>
+                      </a:solidFill>
+                      <a:prstDash val="solid"/>
+                      <a:round/>
+                      <a:headEnd type="none" w="med" len="med"/>
+                      <a:tailEnd type="none" w="med" len="med"/>
+                    </a:lnT>
+                    <a:lnB w="9525" cap="flat" cmpd="sng" algn="ctr">
+                      <a:solidFill>
+                        <a:srgbClr val="CCCCCC"/>
+                      </a:solidFill>
+                      <a:prstDash val="solid"/>
+                      <a:round/>
+                      <a:headEnd type="none" w="med" len="med"/>
+                      <a:tailEnd type="none" w="med" len="med"/>
+                    </a:lnB>
+                  </a:tcPr>
+                </a:tc>
+                <a:tc>
+                  <a:txBody>
+                    <a:bodyPr/>
+                    <a:lstStyle/>
+                    <a:p>
+                      <a:pPr algn="r" rtl="0" fontAlgn="b"/>
+                      <a:r>
+                        <a:rPr lang="en-IN" sz="1700">
+                          <a:effectLst/>
+                        </a:rPr>
+                        <a:t>6.624853348</a:t>
+                      </a:r>
+                    </a:p>
+                  </a:txBody>
+                  <a:tcPr marL="26706" marR="26706" marT="17804" marB="17804" anchor="b">
+                    <a:lnL w="9525" cap="flat" cmpd="sng" algn="ctr">
+                      <a:solidFill>
+                        <a:srgbClr val="CCCCCC"/>
+                      </a:solidFill>
+                      <a:prstDash val="solid"/>
+                      <a:round/>
+                      <a:headEnd type="none" w="med" len="med"/>
+                      <a:tailEnd type="none" w="med" len="med"/>
+                    </a:lnL>
+                    <a:lnR w="9525" cap="flat" cmpd="sng" algn="ctr">
+                      <a:solidFill>
+                        <a:srgbClr val="CCCCCC"/>
+                      </a:solidFill>
+                      <a:prstDash val="solid"/>
+                      <a:round/>
+                      <a:headEnd type="none" w="med" len="med"/>
+                      <a:tailEnd type="none" w="med" len="med"/>
+                    </a:lnR>
+                    <a:lnT w="9525" cap="flat" cmpd="sng" algn="ctr">
+                      <a:solidFill>
+                        <a:srgbClr val="CCCCCC"/>
+                      </a:solidFill>
+                      <a:prstDash val="solid"/>
+                      <a:round/>
+                      <a:headEnd type="none" w="med" len="med"/>
+                      <a:tailEnd type="none" w="med" len="med"/>
+                    </a:lnT>
+                    <a:lnB w="9525" cap="flat" cmpd="sng" algn="ctr">
+                      <a:solidFill>
+                        <a:srgbClr val="CCCCCC"/>
+                      </a:solidFill>
+                      <a:prstDash val="solid"/>
+                      <a:round/>
+                      <a:headEnd type="none" w="med" len="med"/>
+                      <a:tailEnd type="none" w="med" len="med"/>
+                    </a:lnB>
+                  </a:tcPr>
+                </a:tc>
+                <a:tc>
+                  <a:txBody>
+                    <a:bodyPr/>
+                    <a:lstStyle/>
+                    <a:p>
+                      <a:pPr algn="r" rtl="0" fontAlgn="b"/>
+                      <a:r>
+                        <a:rPr lang="en-IN" sz="1700">
+                          <a:effectLst/>
+                        </a:rPr>
+                        <a:t>3.7</a:t>
+                      </a:r>
+                    </a:p>
+                  </a:txBody>
+                  <a:tcPr marL="26706" marR="26706" marT="17804" marB="17804" anchor="b">
+                    <a:lnL w="9525" cap="flat" cmpd="sng" algn="ctr">
+                      <a:solidFill>
+                        <a:srgbClr val="CCCCCC"/>
+                      </a:solidFill>
+                      <a:prstDash val="solid"/>
+                      <a:round/>
+                      <a:headEnd type="none" w="med" len="med"/>
+                      <a:tailEnd type="none" w="med" len="med"/>
+                    </a:lnL>
+                    <a:lnR w="9525" cap="flat" cmpd="sng" algn="ctr">
+                      <a:solidFill>
+                        <a:srgbClr val="CCCCCC"/>
+                      </a:solidFill>
+                      <a:prstDash val="solid"/>
+                      <a:round/>
+                      <a:headEnd type="none" w="med" len="med"/>
+                      <a:tailEnd type="none" w="med" len="med"/>
+                    </a:lnR>
+                    <a:lnT w="9525" cap="flat" cmpd="sng" algn="ctr">
+                      <a:solidFill>
+                        <a:srgbClr val="CCCCCC"/>
+                      </a:solidFill>
+                      <a:prstDash val="solid"/>
+                      <a:round/>
+                      <a:headEnd type="none" w="med" len="med"/>
+                      <a:tailEnd type="none" w="med" len="med"/>
+                    </a:lnT>
+                    <a:lnB w="9525" cap="flat" cmpd="sng" algn="ctr">
+                      <a:solidFill>
+                        <a:srgbClr val="CCCCCC"/>
+                      </a:solidFill>
+                      <a:prstDash val="solid"/>
+                      <a:round/>
+                      <a:headEnd type="none" w="med" len="med"/>
+                      <a:tailEnd type="none" w="med" len="med"/>
+                    </a:lnB>
+                    <a:solidFill>
+                      <a:srgbClr val="FFFFFF"/>
+                    </a:solidFill>
+                  </a:tcPr>
+                </a:tc>
+                <a:tc>
+                  <a:txBody>
+                    <a:bodyPr/>
+                    <a:lstStyle/>
+                    <a:p>
+                      <a:pPr algn="r" rtl="0" fontAlgn="b"/>
+                      <a:r>
+                        <a:rPr lang="en-IN">
+                          <a:effectLst/>
+                        </a:rPr>
+                        <a:t>220.4064098</a:t>
+                      </a:r>
+                    </a:p>
+                  </a:txBody>
+                  <a:tcPr marL="28575" marR="28575" marT="19050" marB="19050" anchor="b">
+                    <a:lnL w="9525" cap="flat" cmpd="sng" algn="ctr">
+                      <a:solidFill>
+                        <a:srgbClr val="CCCCCC"/>
+                      </a:solidFill>
+                      <a:prstDash val="solid"/>
+                      <a:round/>
+                      <a:headEnd type="none" w="med" len="med"/>
+                      <a:tailEnd type="none" w="med" len="med"/>
+                    </a:lnL>
+                    <a:lnR w="9525" cap="flat" cmpd="sng" algn="ctr">
+                      <a:solidFill>
+                        <a:srgbClr val="000000"/>
+                      </a:solidFill>
+                      <a:prstDash val="solid"/>
+                      <a:round/>
+                      <a:headEnd type="none" w="med" len="med"/>
+                      <a:tailEnd type="none" w="med" len="med"/>
+                    </a:lnR>
+                    <a:lnT w="9525" cap="flat" cmpd="sng" algn="ctr">
+                      <a:solidFill>
+                        <a:srgbClr val="CCCCCC"/>
+                      </a:solidFill>
+                      <a:prstDash val="solid"/>
+                      <a:round/>
+                      <a:headEnd type="none" w="med" len="med"/>
+                      <a:tailEnd type="none" w="med" len="med"/>
+                    </a:lnT>
+                    <a:lnB w="9525" cap="flat" cmpd="sng" algn="ctr">
+                      <a:solidFill>
+                        <a:srgbClr val="CCCCCC"/>
+                      </a:solidFill>
+                      <a:prstDash val="solid"/>
+                      <a:round/>
+                      <a:headEnd type="none" w="med" len="med"/>
+                      <a:tailEnd type="none" w="med" len="med"/>
+                    </a:lnB>
+                    <a:solidFill>
+                      <a:srgbClr val="FFFFFF"/>
+                    </a:solidFill>
+                  </a:tcPr>
+                </a:tc>
+                <a:extLst>
+                  <a:ext uri="{0D108BD9-81ED-4DB2-BD59-A6C34878D82A}">
+                    <a16:rowId xmlns:a16="http://schemas.microsoft.com/office/drawing/2014/main" val="1477508286"/>
+                  </a:ext>
+                </a:extLst>
+              </a:tr>
+              <a:tr h="548368">
+                <a:tc>
+                  <a:txBody>
+                    <a:bodyPr/>
+                    <a:lstStyle/>
+                    <a:p>
+                      <a:pPr rtl="0" fontAlgn="b"/>
+                      <a:r>
+                        <a:rPr lang="en-IN" sz="1700">
+                          <a:effectLst/>
+                        </a:rPr>
+                        <a:t>netobserv-ebpf-agent_V2</a:t>
+                      </a:r>
+                    </a:p>
+                  </a:txBody>
+                  <a:tcPr marL="26706" marR="26706" marT="17804" marB="17804" anchor="b">
+                    <a:lnL w="9525" cap="flat" cmpd="sng" algn="ctr">
+                      <a:solidFill>
+                        <a:srgbClr val="000000"/>
+                      </a:solidFill>
+                      <a:prstDash val="solid"/>
+                      <a:round/>
+                      <a:headEnd type="none" w="med" len="med"/>
+                      <a:tailEnd type="none" w="med" len="med"/>
+                    </a:lnL>
+                    <a:lnR w="9525" cap="flat" cmpd="sng" algn="ctr">
+                      <a:solidFill>
+                        <a:srgbClr val="CCCCCC"/>
+                      </a:solidFill>
+                      <a:prstDash val="solid"/>
+                      <a:round/>
+                      <a:headEnd type="none" w="med" len="med"/>
+                      <a:tailEnd type="none" w="med" len="med"/>
+                    </a:lnR>
+                    <a:lnT w="9525" cap="flat" cmpd="sng" algn="ctr">
+                      <a:solidFill>
+                        <a:srgbClr val="CCCCCC"/>
+                      </a:solidFill>
+                      <a:prstDash val="solid"/>
+                      <a:round/>
+                      <a:headEnd type="none" w="med" len="med"/>
+                      <a:tailEnd type="none" w="med" len="med"/>
+                    </a:lnT>
+                    <a:lnB w="9525" cap="flat" cmpd="sng" algn="ctr">
+                      <a:solidFill>
+                        <a:srgbClr val="000000"/>
+                      </a:solidFill>
+                      <a:prstDash val="solid"/>
+                      <a:round/>
+                      <a:headEnd type="none" w="med" len="med"/>
+                      <a:tailEnd type="none" w="med" len="med"/>
+                    </a:lnB>
+                  </a:tcPr>
+                </a:tc>
+                <a:tc>
+                  <a:txBody>
+                    <a:bodyPr/>
+                    <a:lstStyle/>
+                    <a:p>
+                      <a:pPr algn="r" rtl="0" fontAlgn="b"/>
+                      <a:r>
+                        <a:rPr lang="en-IN" sz="1700" dirty="0">
+                          <a:effectLst/>
+                        </a:rPr>
+                        <a:t>611,224,733</a:t>
+                      </a:r>
+                    </a:p>
+                  </a:txBody>
+                  <a:tcPr marL="26706" marR="26706" marT="17804" marB="17804" anchor="b">
+                    <a:lnL w="9525" cap="flat" cmpd="sng" algn="ctr">
+                      <a:solidFill>
+                        <a:srgbClr val="CCCCCC"/>
+                      </a:solidFill>
+                      <a:prstDash val="solid"/>
+                      <a:round/>
+                      <a:headEnd type="none" w="med" len="med"/>
+                      <a:tailEnd type="none" w="med" len="med"/>
+                    </a:lnL>
+                    <a:lnR w="9525" cap="flat" cmpd="sng" algn="ctr">
+                      <a:solidFill>
+                        <a:srgbClr val="CCCCCC"/>
+                      </a:solidFill>
+                      <a:prstDash val="solid"/>
+                      <a:round/>
+                      <a:headEnd type="none" w="med" len="med"/>
+                      <a:tailEnd type="none" w="med" len="med"/>
+                    </a:lnR>
+                    <a:lnT w="9525" cap="flat" cmpd="sng" algn="ctr">
+                      <a:solidFill>
+                        <a:srgbClr val="CCCCCC"/>
+                      </a:solidFill>
+                      <a:prstDash val="solid"/>
+                      <a:round/>
+                      <a:headEnd type="none" w="med" len="med"/>
+                      <a:tailEnd type="none" w="med" len="med"/>
+                    </a:lnT>
+                    <a:lnB w="9525" cap="flat" cmpd="sng" algn="ctr">
+                      <a:solidFill>
+                        <a:srgbClr val="000000"/>
+                      </a:solidFill>
+                      <a:prstDash val="solid"/>
+                      <a:round/>
+                      <a:headEnd type="none" w="med" len="med"/>
+                      <a:tailEnd type="none" w="med" len="med"/>
+                    </a:lnB>
+                  </a:tcPr>
+                </a:tc>
+                <a:tc>
+                  <a:txBody>
+                    <a:bodyPr/>
+                    <a:lstStyle/>
+                    <a:p>
+                      <a:pPr algn="r" rtl="0" fontAlgn="b"/>
+                      <a:r>
+                        <a:rPr lang="en-IN" sz="1700">
+                          <a:effectLst/>
+                        </a:rPr>
+                        <a:t>611,224,733</a:t>
+                      </a:r>
+                    </a:p>
+                  </a:txBody>
+                  <a:tcPr marL="26706" marR="26706" marT="17804" marB="17804" anchor="b">
+                    <a:lnL w="9525" cap="flat" cmpd="sng" algn="ctr">
+                      <a:solidFill>
+                        <a:srgbClr val="CCCCCC"/>
+                      </a:solidFill>
+                      <a:prstDash val="solid"/>
+                      <a:round/>
+                      <a:headEnd type="none" w="med" len="med"/>
+                      <a:tailEnd type="none" w="med" len="med"/>
+                    </a:lnL>
+                    <a:lnR w="9525" cap="flat" cmpd="sng" algn="ctr">
+                      <a:solidFill>
+                        <a:srgbClr val="CCCCCC"/>
+                      </a:solidFill>
+                      <a:prstDash val="solid"/>
+                      <a:round/>
+                      <a:headEnd type="none" w="med" len="med"/>
+                      <a:tailEnd type="none" w="med" len="med"/>
+                    </a:lnR>
+                    <a:lnT w="9525" cap="flat" cmpd="sng" algn="ctr">
+                      <a:solidFill>
+                        <a:srgbClr val="CCCCCC"/>
+                      </a:solidFill>
+                      <a:prstDash val="solid"/>
+                      <a:round/>
+                      <a:headEnd type="none" w="med" len="med"/>
+                      <a:tailEnd type="none" w="med" len="med"/>
+                    </a:lnT>
+                    <a:lnB w="9525" cap="flat" cmpd="sng" algn="ctr">
+                      <a:solidFill>
+                        <a:srgbClr val="000000"/>
+                      </a:solidFill>
+                      <a:prstDash val="solid"/>
+                      <a:round/>
+                      <a:headEnd type="none" w="med" len="med"/>
+                      <a:tailEnd type="none" w="med" len="med"/>
+                    </a:lnB>
+                  </a:tcPr>
+                </a:tc>
+                <a:tc>
+                  <a:txBody>
+                    <a:bodyPr/>
+                    <a:lstStyle/>
+                    <a:p>
+                      <a:pPr algn="r" rtl="0" fontAlgn="b"/>
+                      <a:r>
+                        <a:rPr lang="en-IN" sz="1700">
+                          <a:effectLst/>
+                        </a:rPr>
+                        <a:t>100</a:t>
+                      </a:r>
+                    </a:p>
+                  </a:txBody>
+                  <a:tcPr marL="26706" marR="26706" marT="17804" marB="17804" anchor="b">
+                    <a:lnL w="9525" cap="flat" cmpd="sng" algn="ctr">
+                      <a:solidFill>
+                        <a:srgbClr val="CCCCCC"/>
+                      </a:solidFill>
+                      <a:prstDash val="solid"/>
+                      <a:round/>
+                      <a:headEnd type="none" w="med" len="med"/>
+                      <a:tailEnd type="none" w="med" len="med"/>
+                    </a:lnL>
+                    <a:lnR w="9525" cap="flat" cmpd="sng" algn="ctr">
+                      <a:solidFill>
+                        <a:srgbClr val="CCCCCC"/>
+                      </a:solidFill>
+                      <a:prstDash val="solid"/>
+                      <a:round/>
+                      <a:headEnd type="none" w="med" len="med"/>
+                      <a:tailEnd type="none" w="med" len="med"/>
+                    </a:lnR>
+                    <a:lnT w="9525" cap="flat" cmpd="sng" algn="ctr">
+                      <a:solidFill>
+                        <a:srgbClr val="CCCCCC"/>
+                      </a:solidFill>
+                      <a:prstDash val="solid"/>
+                      <a:round/>
+                      <a:headEnd type="none" w="med" len="med"/>
+                      <a:tailEnd type="none" w="med" len="med"/>
+                    </a:lnT>
+                    <a:lnB w="9525" cap="flat" cmpd="sng" algn="ctr">
+                      <a:solidFill>
+                        <a:srgbClr val="000000"/>
+                      </a:solidFill>
+                      <a:prstDash val="solid"/>
+                      <a:round/>
+                      <a:headEnd type="none" w="med" len="med"/>
+                      <a:tailEnd type="none" w="med" len="med"/>
+                    </a:lnB>
+                  </a:tcPr>
+                </a:tc>
+                <a:tc>
+                  <a:txBody>
+                    <a:bodyPr/>
+                    <a:lstStyle/>
+                    <a:p>
+                      <a:pPr algn="r" rtl="0" fontAlgn="b"/>
+                      <a:r>
+                        <a:rPr lang="en-IN" sz="1700" dirty="0">
+                          <a:effectLst/>
+                        </a:rPr>
+                        <a:t>10.4</a:t>
+                      </a:r>
+                    </a:p>
+                  </a:txBody>
+                  <a:tcPr marL="26706" marR="26706" marT="17804" marB="17804" anchor="b">
+                    <a:lnL w="9525" cap="flat" cmpd="sng" algn="ctr">
+                      <a:solidFill>
+                        <a:srgbClr val="CCCCCC"/>
+                      </a:solidFill>
+                      <a:prstDash val="solid"/>
+                      <a:round/>
+                      <a:headEnd type="none" w="med" len="med"/>
+                      <a:tailEnd type="none" w="med" len="med"/>
+                    </a:lnL>
+                    <a:lnR w="9525" cap="flat" cmpd="sng" algn="ctr">
+                      <a:solidFill>
+                        <a:srgbClr val="CCCCCC"/>
+                      </a:solidFill>
+                      <a:prstDash val="solid"/>
+                      <a:round/>
+                      <a:headEnd type="none" w="med" len="med"/>
+                      <a:tailEnd type="none" w="med" len="med"/>
+                    </a:lnR>
+                    <a:lnT w="9525" cap="flat" cmpd="sng" algn="ctr">
+                      <a:solidFill>
+                        <a:srgbClr val="CCCCCC"/>
+                      </a:solidFill>
+                      <a:prstDash val="solid"/>
+                      <a:round/>
+                      <a:headEnd type="none" w="med" len="med"/>
+                      <a:tailEnd type="none" w="med" len="med"/>
+                    </a:lnT>
+                    <a:lnB w="9525" cap="flat" cmpd="sng" algn="ctr">
+                      <a:solidFill>
+                        <a:srgbClr val="000000"/>
+                      </a:solidFill>
+                      <a:prstDash val="solid"/>
+                      <a:round/>
+                      <a:headEnd type="none" w="med" len="med"/>
+                      <a:tailEnd type="none" w="med" len="med"/>
+                    </a:lnB>
+                  </a:tcPr>
+                </a:tc>
+                <a:tc>
+                  <a:txBody>
+                    <a:bodyPr/>
+                    <a:lstStyle/>
+                    <a:p>
+                      <a:pPr algn="r" rtl="0" fontAlgn="b"/>
+                      <a:r>
+                        <a:rPr lang="en-IN" dirty="0">
+                          <a:effectLst/>
+                        </a:rPr>
+                        <a:t>11.19913195</a:t>
+                      </a:r>
+                    </a:p>
+                  </a:txBody>
+                  <a:tcPr marL="28575" marR="28575" marT="19050" marB="19050" anchor="b">
+                    <a:lnL w="9525" cap="flat" cmpd="sng" algn="ctr">
+                      <a:solidFill>
+                        <a:srgbClr val="CCCCCC"/>
+                      </a:solidFill>
+                      <a:prstDash val="solid"/>
+                      <a:round/>
+                      <a:headEnd type="none" w="med" len="med"/>
+                      <a:tailEnd type="none" w="med" len="med"/>
+                    </a:lnL>
+                    <a:lnR w="9525" cap="flat" cmpd="sng" algn="ctr">
+                      <a:solidFill>
+                        <a:srgbClr val="000000"/>
+                      </a:solidFill>
+                      <a:prstDash val="solid"/>
+                      <a:round/>
+                      <a:headEnd type="none" w="med" len="med"/>
+                      <a:tailEnd type="none" w="med" len="med"/>
+                    </a:lnR>
+                    <a:lnT w="9525" cap="flat" cmpd="sng" algn="ctr">
+                      <a:solidFill>
+                        <a:srgbClr val="CCCCCC"/>
+                      </a:solidFill>
+                      <a:prstDash val="solid"/>
+                      <a:round/>
+                      <a:headEnd type="none" w="med" len="med"/>
+                      <a:tailEnd type="none" w="med" len="med"/>
+                    </a:lnT>
+                    <a:lnB w="9525" cap="flat" cmpd="sng" algn="ctr">
+                      <a:solidFill>
+                        <a:srgbClr val="000000"/>
+                      </a:solidFill>
+                      <a:prstDash val="solid"/>
+                      <a:round/>
+                      <a:headEnd type="none" w="med" len="med"/>
+                      <a:tailEnd type="none" w="med" len="med"/>
+                    </a:lnB>
+                  </a:tcPr>
+                </a:tc>
+                <a:extLst>
+                  <a:ext uri="{0D108BD9-81ED-4DB2-BD59-A6C34878D82A}">
+                    <a16:rowId xmlns:a16="http://schemas.microsoft.com/office/drawing/2014/main" val="2310876333"/>
+                  </a:ext>
+                </a:extLst>
+              </a:tr>
+            </a:tbl>
+          </a:graphicData>
+        </a:graphic>
+      </p:graphicFrame>
+    </p:spTree>
+    <p:extLst>
+      <p:ext uri="{BB962C8B-B14F-4D97-AF65-F5344CB8AC3E}">
+        <p14:creationId xmlns:p14="http://schemas.microsoft.com/office/powerpoint/2010/main" val="2440269023"/>
+      </p:ext>
+    </p:extLst>
+  </p:cSld>
+  <p:clrMapOvr>
+    <a:masterClrMapping/>
+  </p:clrMapOvr>
+</p:sld>
+</file>
+
+<file path=ppt/slides/slide8.xml><?xml version="1.0" encoding="utf-8"?>
+<p:sld xmlns:a="http://schemas.openxmlformats.org/drawingml/2006/main" xmlns:r="http://schemas.openxmlformats.org/officeDocument/2006/relationships" xmlns:p="http://schemas.openxmlformats.org/presentationml/2006/main">
+  <p:cSld>
+    <p:spTree>
+      <p:nvGrpSpPr>
+        <p:cNvPr id="1" name=""/>
+        <p:cNvGrpSpPr/>
+        <p:nvPr/>
+      </p:nvGrpSpPr>
+      <p:grpSpPr>
+        <a:xfrm>
+          <a:off x="0" y="0"/>
+          <a:ext cx="0" cy="0"/>
+          <a:chOff x="0" y="0"/>
+          <a:chExt cx="0" cy="0"/>
+        </a:xfrm>
+      </p:grpSpPr>
+      <p:sp>
+        <p:nvSpPr>
+          <p:cNvPr id="2" name="Title 1">
+            <a:extLst>
+              <a:ext uri="{FF2B5EF4-FFF2-40B4-BE49-F238E27FC236}">
                 <a16:creationId xmlns:a16="http://schemas.microsoft.com/office/drawing/2014/main" id="{6F692D09-1107-D6D2-D5E2-F537E4D6A4E4}"/>
               </a:ext>
             </a:extLst>

</xml_diff>